<commit_message>
remove ppt format and add mohammad shahriari
</commit_message>
<xml_diff>
--- a/osi-presentation.pptx
+++ b/osi-presentation.pptx
@@ -1,40 +1,135 @@
 
 <file path=ppt/presentation.xml><?xml version="1.0" encoding="utf-8"?>
-<p:presentation xmlns:a="http://schemas.openxmlformats.org/drawingml/2006/main" xmlns:p="http://schemas.openxmlformats.org/presentationml/2006/main" xmlns:r="http://schemas.openxmlformats.org/officeDocument/2006/relationships">
+<p:presentation xmlns:a="http://schemas.openxmlformats.org/drawingml/2006/main" xmlns:r="http://schemas.openxmlformats.org/officeDocument/2006/relationships" xmlns:p="http://schemas.openxmlformats.org/presentationml/2006/main">
   <p:sldMasterIdLst>
-    <p:sldMasterId id="2147483648" r:id="rId2"/>
-    <p:sldMasterId id="2147483661" r:id="rId3"/>
+    <p:sldMasterId id="2147483648" r:id="rId1"/>
+    <p:sldMasterId id="2147483661" r:id="rId2"/>
   </p:sldMasterIdLst>
   <p:sldIdLst>
-    <p:sldId id="256" r:id="rId4"/>
-    <p:sldId id="257" r:id="rId5"/>
-    <p:sldId id="258" r:id="rId6"/>
-    <p:sldId id="259" r:id="rId7"/>
-    <p:sldId id="260" r:id="rId8"/>
-    <p:sldId id="261" r:id="rId9"/>
-    <p:sldId id="262" r:id="rId10"/>
-    <p:sldId id="263" r:id="rId11"/>
-    <p:sldId id="264" r:id="rId12"/>
-    <p:sldId id="265" r:id="rId13"/>
-    <p:sldId id="266" r:id="rId14"/>
-    <p:sldId id="267" r:id="rId15"/>
-    <p:sldId id="268" r:id="rId16"/>
-    <p:sldId id="269" r:id="rId17"/>
-    <p:sldId id="270" r:id="rId18"/>
-    <p:sldId id="271" r:id="rId19"/>
-    <p:sldId id="272" r:id="rId20"/>
-    <p:sldId id="273" r:id="rId21"/>
-    <p:sldId id="274" r:id="rId22"/>
-    <p:sldId id="275" r:id="rId23"/>
-    <p:sldId id="276" r:id="rId24"/>
+    <p:sldId id="256" r:id="rId3"/>
+    <p:sldId id="257" r:id="rId4"/>
+    <p:sldId id="258" r:id="rId5"/>
+    <p:sldId id="259" r:id="rId6"/>
+    <p:sldId id="260" r:id="rId7"/>
+    <p:sldId id="261" r:id="rId8"/>
+    <p:sldId id="262" r:id="rId9"/>
+    <p:sldId id="263" r:id="rId10"/>
+    <p:sldId id="264" r:id="rId11"/>
+    <p:sldId id="265" r:id="rId12"/>
+    <p:sldId id="266" r:id="rId13"/>
+    <p:sldId id="267" r:id="rId14"/>
+    <p:sldId id="268" r:id="rId15"/>
+    <p:sldId id="269" r:id="rId16"/>
+    <p:sldId id="270" r:id="rId17"/>
+    <p:sldId id="271" r:id="rId18"/>
+    <p:sldId id="272" r:id="rId19"/>
+    <p:sldId id="273" r:id="rId20"/>
+    <p:sldId id="274" r:id="rId21"/>
+    <p:sldId id="275" r:id="rId22"/>
+    <p:sldId id="276" r:id="rId23"/>
   </p:sldIdLst>
   <p:sldSz cx="10080625" cy="7559675"/>
   <p:notesSz cx="7772400" cy="10058400"/>
+  <p:defaultTextStyle>
+    <a:defPPr>
+      <a:defRPr lang="en-US"/>
+    </a:defPPr>
+    <a:lvl1pPr marL="0" algn="l" defTabSz="914400" rtl="0" eaLnBrk="1" latinLnBrk="0" hangingPunct="1">
+      <a:defRPr sz="1800" kern="1200">
+        <a:solidFill>
+          <a:schemeClr val="tx1"/>
+        </a:solidFill>
+        <a:latin typeface="+mn-lt"/>
+        <a:ea typeface="+mn-ea"/>
+        <a:cs typeface="+mn-cs"/>
+      </a:defRPr>
+    </a:lvl1pPr>
+    <a:lvl2pPr marL="457200" algn="l" defTabSz="914400" rtl="0" eaLnBrk="1" latinLnBrk="0" hangingPunct="1">
+      <a:defRPr sz="1800" kern="1200">
+        <a:solidFill>
+          <a:schemeClr val="tx1"/>
+        </a:solidFill>
+        <a:latin typeface="+mn-lt"/>
+        <a:ea typeface="+mn-ea"/>
+        <a:cs typeface="+mn-cs"/>
+      </a:defRPr>
+    </a:lvl2pPr>
+    <a:lvl3pPr marL="914400" algn="l" defTabSz="914400" rtl="0" eaLnBrk="1" latinLnBrk="0" hangingPunct="1">
+      <a:defRPr sz="1800" kern="1200">
+        <a:solidFill>
+          <a:schemeClr val="tx1"/>
+        </a:solidFill>
+        <a:latin typeface="+mn-lt"/>
+        <a:ea typeface="+mn-ea"/>
+        <a:cs typeface="+mn-cs"/>
+      </a:defRPr>
+    </a:lvl3pPr>
+    <a:lvl4pPr marL="1371600" algn="l" defTabSz="914400" rtl="0" eaLnBrk="1" latinLnBrk="0" hangingPunct="1">
+      <a:defRPr sz="1800" kern="1200">
+        <a:solidFill>
+          <a:schemeClr val="tx1"/>
+        </a:solidFill>
+        <a:latin typeface="+mn-lt"/>
+        <a:ea typeface="+mn-ea"/>
+        <a:cs typeface="+mn-cs"/>
+      </a:defRPr>
+    </a:lvl4pPr>
+    <a:lvl5pPr marL="1828800" algn="l" defTabSz="914400" rtl="0" eaLnBrk="1" latinLnBrk="0" hangingPunct="1">
+      <a:defRPr sz="1800" kern="1200">
+        <a:solidFill>
+          <a:schemeClr val="tx1"/>
+        </a:solidFill>
+        <a:latin typeface="+mn-lt"/>
+        <a:ea typeface="+mn-ea"/>
+        <a:cs typeface="+mn-cs"/>
+      </a:defRPr>
+    </a:lvl5pPr>
+    <a:lvl6pPr marL="2286000" algn="l" defTabSz="914400" rtl="0" eaLnBrk="1" latinLnBrk="0" hangingPunct="1">
+      <a:defRPr sz="1800" kern="1200">
+        <a:solidFill>
+          <a:schemeClr val="tx1"/>
+        </a:solidFill>
+        <a:latin typeface="+mn-lt"/>
+        <a:ea typeface="+mn-ea"/>
+        <a:cs typeface="+mn-cs"/>
+      </a:defRPr>
+    </a:lvl6pPr>
+    <a:lvl7pPr marL="2743200" algn="l" defTabSz="914400" rtl="0" eaLnBrk="1" latinLnBrk="0" hangingPunct="1">
+      <a:defRPr sz="1800" kern="1200">
+        <a:solidFill>
+          <a:schemeClr val="tx1"/>
+        </a:solidFill>
+        <a:latin typeface="+mn-lt"/>
+        <a:ea typeface="+mn-ea"/>
+        <a:cs typeface="+mn-cs"/>
+      </a:defRPr>
+    </a:lvl7pPr>
+    <a:lvl8pPr marL="3200400" algn="l" defTabSz="914400" rtl="0" eaLnBrk="1" latinLnBrk="0" hangingPunct="1">
+      <a:defRPr sz="1800" kern="1200">
+        <a:solidFill>
+          <a:schemeClr val="tx1"/>
+        </a:solidFill>
+        <a:latin typeface="+mn-lt"/>
+        <a:ea typeface="+mn-ea"/>
+        <a:cs typeface="+mn-cs"/>
+      </a:defRPr>
+    </a:lvl8pPr>
+    <a:lvl9pPr marL="3657600" algn="l" defTabSz="914400" rtl="0" eaLnBrk="1" latinLnBrk="0" hangingPunct="1">
+      <a:defRPr sz="1800" kern="1200">
+        <a:solidFill>
+          <a:schemeClr val="tx1"/>
+        </a:solidFill>
+        <a:latin typeface="+mn-lt"/>
+        <a:ea typeface="+mn-ea"/>
+        <a:cs typeface="+mn-cs"/>
+      </a:defRPr>
+    </a:lvl9pPr>
+  </p:defaultTextStyle>
 </p:presentation>
 </file>
 
 <file path=ppt/slideLayouts/slideLayout1.xml><?xml version="1.0" encoding="utf-8"?>
-<p:sldLayout xmlns:a="http://schemas.openxmlformats.org/drawingml/2006/main" xmlns:p="http://schemas.openxmlformats.org/presentationml/2006/main" xmlns:r="http://schemas.openxmlformats.org/officeDocument/2006/relationships" type="blank" preserve="1">
+<p:sldLayout xmlns:a="http://schemas.openxmlformats.org/drawingml/2006/main" xmlns:r="http://schemas.openxmlformats.org/officeDocument/2006/relationships" xmlns:p="http://schemas.openxmlformats.org/presentationml/2006/main" type="blank" preserve="1">
   <p:cSld name="Blank Slide">
     <p:spTree>
       <p:nvGrpSpPr>
@@ -52,11 +147,14 @@
       </p:grpSpPr>
     </p:spTree>
   </p:cSld>
+  <p:clrMapOvr>
+    <a:masterClrMapping/>
+  </p:clrMapOvr>
 </p:sldLayout>
 </file>
 
 <file path=ppt/slideLayouts/slideLayout10.xml><?xml version="1.0" encoding="utf-8"?>
-<p:sldLayout xmlns:a="http://schemas.openxmlformats.org/drawingml/2006/main" xmlns:p="http://schemas.openxmlformats.org/presentationml/2006/main" xmlns:r="http://schemas.openxmlformats.org/officeDocument/2006/relationships" type="objOverTx" preserve="1">
+<p:sldLayout xmlns:a="http://schemas.openxmlformats.org/drawingml/2006/main" xmlns:r="http://schemas.openxmlformats.org/officeDocument/2006/relationships" xmlns:p="http://schemas.openxmlformats.org/presentationml/2006/main" type="objOverTx" preserve="1">
   <p:cSld name="Title, Content over Content">
     <p:spTree>
       <p:nvGrpSpPr>
@@ -92,7 +190,8 @@
           </a:prstGeom>
         </p:spPr>
         <p:txBody>
-          <a:bodyPr lIns="0" rIns="0" tIns="0" bIns="0" anchor="ctr"/>
+          <a:bodyPr lIns="0" tIns="0" rIns="0" bIns="0" anchor="ctr"/>
+          <a:lstStyle/>
           <a:p>
             <a:pPr algn="ctr"/>
             <a:endParaRPr/>
@@ -119,7 +218,8 @@
           </a:prstGeom>
         </p:spPr>
         <p:txBody>
-          <a:bodyPr lIns="0" rIns="0" tIns="0" bIns="0"/>
+          <a:bodyPr lIns="0" tIns="0" rIns="0" bIns="0"/>
+          <a:lstStyle/>
           <a:p>
             <a:endParaRPr/>
           </a:p>
@@ -145,7 +245,8 @@
           </a:prstGeom>
         </p:spPr>
         <p:txBody>
-          <a:bodyPr lIns="0" rIns="0" tIns="0" bIns="0"/>
+          <a:bodyPr lIns="0" tIns="0" rIns="0" bIns="0"/>
+          <a:lstStyle/>
           <a:p>
             <a:endParaRPr/>
           </a:p>
@@ -153,11 +254,14 @@
       </p:sp>
     </p:spTree>
   </p:cSld>
+  <p:clrMapOvr>
+    <a:masterClrMapping/>
+  </p:clrMapOvr>
 </p:sldLayout>
 </file>
 
 <file path=ppt/slideLayouts/slideLayout11.xml><?xml version="1.0" encoding="utf-8"?>
-<p:sldLayout xmlns:a="http://schemas.openxmlformats.org/drawingml/2006/main" xmlns:p="http://schemas.openxmlformats.org/presentationml/2006/main" xmlns:r="http://schemas.openxmlformats.org/officeDocument/2006/relationships" type="fourObj" preserve="1">
+<p:sldLayout xmlns:a="http://schemas.openxmlformats.org/drawingml/2006/main" xmlns:r="http://schemas.openxmlformats.org/officeDocument/2006/relationships" xmlns:p="http://schemas.openxmlformats.org/presentationml/2006/main" type="fourObj" preserve="1">
   <p:cSld name="Title, 4 Content">
     <p:spTree>
       <p:nvGrpSpPr>
@@ -193,7 +297,8 @@
           </a:prstGeom>
         </p:spPr>
         <p:txBody>
-          <a:bodyPr lIns="0" rIns="0" tIns="0" bIns="0" anchor="ctr"/>
+          <a:bodyPr lIns="0" tIns="0" rIns="0" bIns="0" anchor="ctr"/>
+          <a:lstStyle/>
           <a:p>
             <a:pPr algn="ctr"/>
             <a:endParaRPr/>
@@ -220,7 +325,8 @@
           </a:prstGeom>
         </p:spPr>
         <p:txBody>
-          <a:bodyPr lIns="0" rIns="0" tIns="0" bIns="0"/>
+          <a:bodyPr lIns="0" tIns="0" rIns="0" bIns="0"/>
+          <a:lstStyle/>
           <a:p>
             <a:endParaRPr/>
           </a:p>
@@ -246,7 +352,8 @@
           </a:prstGeom>
         </p:spPr>
         <p:txBody>
-          <a:bodyPr lIns="0" rIns="0" tIns="0" bIns="0"/>
+          <a:bodyPr lIns="0" tIns="0" rIns="0" bIns="0"/>
+          <a:lstStyle/>
           <a:p>
             <a:endParaRPr/>
           </a:p>
@@ -272,7 +379,8 @@
           </a:prstGeom>
         </p:spPr>
         <p:txBody>
-          <a:bodyPr lIns="0" rIns="0" tIns="0" bIns="0"/>
+          <a:bodyPr lIns="0" tIns="0" rIns="0" bIns="0"/>
+          <a:lstStyle/>
           <a:p>
             <a:endParaRPr/>
           </a:p>
@@ -298,7 +406,8 @@
           </a:prstGeom>
         </p:spPr>
         <p:txBody>
-          <a:bodyPr lIns="0" rIns="0" tIns="0" bIns="0"/>
+          <a:bodyPr lIns="0" tIns="0" rIns="0" bIns="0"/>
+          <a:lstStyle/>
           <a:p>
             <a:endParaRPr/>
           </a:p>
@@ -306,11 +415,14 @@
       </p:sp>
     </p:spTree>
   </p:cSld>
+  <p:clrMapOvr>
+    <a:masterClrMapping/>
+  </p:clrMapOvr>
 </p:sldLayout>
 </file>
 
 <file path=ppt/slideLayouts/slideLayout12.xml><?xml version="1.0" encoding="utf-8"?>
-<p:sldLayout xmlns:a="http://schemas.openxmlformats.org/drawingml/2006/main" xmlns:p="http://schemas.openxmlformats.org/presentationml/2006/main" xmlns:r="http://schemas.openxmlformats.org/officeDocument/2006/relationships" type="blank" preserve="1">
+<p:sldLayout xmlns:a="http://schemas.openxmlformats.org/drawingml/2006/main" xmlns:r="http://schemas.openxmlformats.org/officeDocument/2006/relationships" xmlns:p="http://schemas.openxmlformats.org/presentationml/2006/main" type="blank" preserve="1">
   <p:cSld name="Title, 6 Content">
     <p:spTree>
       <p:nvGrpSpPr>
@@ -346,7 +458,8 @@
           </a:prstGeom>
         </p:spPr>
         <p:txBody>
-          <a:bodyPr lIns="0" rIns="0" tIns="0" bIns="0" anchor="ctr"/>
+          <a:bodyPr lIns="0" tIns="0" rIns="0" bIns="0" anchor="ctr"/>
+          <a:lstStyle/>
           <a:p>
             <a:pPr algn="ctr"/>
             <a:endParaRPr/>
@@ -373,7 +486,8 @@
           </a:prstGeom>
         </p:spPr>
         <p:txBody>
-          <a:bodyPr lIns="0" rIns="0" tIns="0" bIns="0"/>
+          <a:bodyPr lIns="0" tIns="0" rIns="0" bIns="0"/>
+          <a:lstStyle/>
           <a:p>
             <a:endParaRPr/>
           </a:p>
@@ -399,7 +513,8 @@
           </a:prstGeom>
         </p:spPr>
         <p:txBody>
-          <a:bodyPr lIns="0" rIns="0" tIns="0" bIns="0"/>
+          <a:bodyPr lIns="0" tIns="0" rIns="0" bIns="0"/>
+          <a:lstStyle/>
           <a:p>
             <a:endParaRPr/>
           </a:p>
@@ -407,7 +522,7 @@
       </p:sp>
       <p:pic>
         <p:nvPicPr>
-          <p:cNvPr id="37" name="" descr=""/>
+          <p:cNvPr id="37" name="Picture 36"/>
           <p:cNvPicPr/>
           <p:nvPr/>
         </p:nvPicPr>
@@ -430,12 +545,12 @@
       </p:pic>
       <p:pic>
         <p:nvPicPr>
-          <p:cNvPr id="38" name="" descr=""/>
+          <p:cNvPr id="38" name="Picture 37"/>
           <p:cNvPicPr/>
           <p:nvPr/>
         </p:nvPicPr>
         <p:blipFill>
-          <a:blip r:embed="rId3"/>
+          <a:blip r:embed="rId2"/>
           <a:stretch/>
         </p:blipFill>
         <p:spPr>
@@ -453,11 +568,14 @@
       </p:pic>
     </p:spTree>
   </p:cSld>
+  <p:clrMapOvr>
+    <a:masterClrMapping/>
+  </p:clrMapOvr>
 </p:sldLayout>
 </file>
 
 <file path=ppt/slideLayouts/slideLayout13.xml><?xml version="1.0" encoding="utf-8"?>
-<p:sldLayout xmlns:a="http://schemas.openxmlformats.org/drawingml/2006/main" xmlns:p="http://schemas.openxmlformats.org/presentationml/2006/main" xmlns:r="http://schemas.openxmlformats.org/officeDocument/2006/relationships" type="blank" preserve="1">
+<p:sldLayout xmlns:a="http://schemas.openxmlformats.org/drawingml/2006/main" xmlns:r="http://schemas.openxmlformats.org/officeDocument/2006/relationships" xmlns:p="http://schemas.openxmlformats.org/presentationml/2006/main" type="blank" preserve="1">
   <p:cSld name="Blank Slide">
     <p:spTree>
       <p:nvGrpSpPr>
@@ -475,11 +593,14 @@
       </p:grpSpPr>
     </p:spTree>
   </p:cSld>
+  <p:clrMapOvr>
+    <a:masterClrMapping/>
+  </p:clrMapOvr>
 </p:sldLayout>
 </file>
 
 <file path=ppt/slideLayouts/slideLayout14.xml><?xml version="1.0" encoding="utf-8"?>
-<p:sldLayout xmlns:a="http://schemas.openxmlformats.org/drawingml/2006/main" xmlns:p="http://schemas.openxmlformats.org/presentationml/2006/main" xmlns:r="http://schemas.openxmlformats.org/officeDocument/2006/relationships" type="tx" preserve="1">
+<p:sldLayout xmlns:a="http://schemas.openxmlformats.org/drawingml/2006/main" xmlns:r="http://schemas.openxmlformats.org/officeDocument/2006/relationships" xmlns:p="http://schemas.openxmlformats.org/presentationml/2006/main" type="tx" preserve="1">
   <p:cSld name="Title Slide">
     <p:spTree>
       <p:nvGrpSpPr>
@@ -515,7 +636,8 @@
           </a:prstGeom>
         </p:spPr>
         <p:txBody>
-          <a:bodyPr lIns="0" rIns="0" tIns="0" bIns="0" anchor="ctr"/>
+          <a:bodyPr lIns="0" tIns="0" rIns="0" bIns="0" anchor="ctr"/>
+          <a:lstStyle/>
           <a:p>
             <a:pPr algn="ctr"/>
             <a:endParaRPr/>
@@ -542,7 +664,8 @@
           </a:prstGeom>
         </p:spPr>
         <p:txBody>
-          <a:bodyPr lIns="0" rIns="0" tIns="0" bIns="0" anchor="ctr"/>
+          <a:bodyPr lIns="0" tIns="0" rIns="0" bIns="0" anchor="ctr"/>
+          <a:lstStyle/>
           <a:p>
             <a:pPr algn="ctr"/>
             <a:endParaRPr/>
@@ -551,11 +674,14 @@
       </p:sp>
     </p:spTree>
   </p:cSld>
+  <p:clrMapOvr>
+    <a:masterClrMapping/>
+  </p:clrMapOvr>
 </p:sldLayout>
 </file>
 
 <file path=ppt/slideLayouts/slideLayout15.xml><?xml version="1.0" encoding="utf-8"?>
-<p:sldLayout xmlns:a="http://schemas.openxmlformats.org/drawingml/2006/main" xmlns:p="http://schemas.openxmlformats.org/presentationml/2006/main" xmlns:r="http://schemas.openxmlformats.org/officeDocument/2006/relationships" type="obj" preserve="1">
+<p:sldLayout xmlns:a="http://schemas.openxmlformats.org/drawingml/2006/main" xmlns:r="http://schemas.openxmlformats.org/officeDocument/2006/relationships" xmlns:p="http://schemas.openxmlformats.org/presentationml/2006/main" type="obj" preserve="1">
   <p:cSld name="Title, Content">
     <p:spTree>
       <p:nvGrpSpPr>
@@ -591,7 +717,8 @@
           </a:prstGeom>
         </p:spPr>
         <p:txBody>
-          <a:bodyPr lIns="0" rIns="0" tIns="0" bIns="0" anchor="ctr"/>
+          <a:bodyPr lIns="0" tIns="0" rIns="0" bIns="0" anchor="ctr"/>
+          <a:lstStyle/>
           <a:p>
             <a:pPr algn="ctr"/>
             <a:endParaRPr/>
@@ -618,7 +745,8 @@
           </a:prstGeom>
         </p:spPr>
         <p:txBody>
-          <a:bodyPr lIns="0" rIns="0" tIns="0" bIns="0"/>
+          <a:bodyPr lIns="0" tIns="0" rIns="0" bIns="0"/>
+          <a:lstStyle/>
           <a:p>
             <a:endParaRPr/>
           </a:p>
@@ -626,11 +754,14 @@
       </p:sp>
     </p:spTree>
   </p:cSld>
+  <p:clrMapOvr>
+    <a:masterClrMapping/>
+  </p:clrMapOvr>
 </p:sldLayout>
 </file>
 
 <file path=ppt/slideLayouts/slideLayout16.xml><?xml version="1.0" encoding="utf-8"?>
-<p:sldLayout xmlns:a="http://schemas.openxmlformats.org/drawingml/2006/main" xmlns:p="http://schemas.openxmlformats.org/presentationml/2006/main" xmlns:r="http://schemas.openxmlformats.org/officeDocument/2006/relationships" type="twoObj" preserve="1">
+<p:sldLayout xmlns:a="http://schemas.openxmlformats.org/drawingml/2006/main" xmlns:r="http://schemas.openxmlformats.org/officeDocument/2006/relationships" xmlns:p="http://schemas.openxmlformats.org/presentationml/2006/main" type="twoObj" preserve="1">
   <p:cSld name="Title, 2 Content">
     <p:spTree>
       <p:nvGrpSpPr>
@@ -666,7 +797,8 @@
           </a:prstGeom>
         </p:spPr>
         <p:txBody>
-          <a:bodyPr lIns="0" rIns="0" tIns="0" bIns="0" anchor="ctr"/>
+          <a:bodyPr lIns="0" tIns="0" rIns="0" bIns="0" anchor="ctr"/>
+          <a:lstStyle/>
           <a:p>
             <a:pPr algn="ctr"/>
             <a:endParaRPr/>
@@ -693,7 +825,8 @@
           </a:prstGeom>
         </p:spPr>
         <p:txBody>
-          <a:bodyPr lIns="0" rIns="0" tIns="0" bIns="0"/>
+          <a:bodyPr lIns="0" tIns="0" rIns="0" bIns="0"/>
+          <a:lstStyle/>
           <a:p>
             <a:endParaRPr/>
           </a:p>
@@ -719,7 +852,8 @@
           </a:prstGeom>
         </p:spPr>
         <p:txBody>
-          <a:bodyPr lIns="0" rIns="0" tIns="0" bIns="0"/>
+          <a:bodyPr lIns="0" tIns="0" rIns="0" bIns="0"/>
+          <a:lstStyle/>
           <a:p>
             <a:endParaRPr/>
           </a:p>
@@ -727,11 +861,14 @@
       </p:sp>
     </p:spTree>
   </p:cSld>
+  <p:clrMapOvr>
+    <a:masterClrMapping/>
+  </p:clrMapOvr>
 </p:sldLayout>
 </file>
 
 <file path=ppt/slideLayouts/slideLayout17.xml><?xml version="1.0" encoding="utf-8"?>
-<p:sldLayout xmlns:a="http://schemas.openxmlformats.org/drawingml/2006/main" xmlns:p="http://schemas.openxmlformats.org/presentationml/2006/main" xmlns:r="http://schemas.openxmlformats.org/officeDocument/2006/relationships" type="titleOnly" preserve="1">
+<p:sldLayout xmlns:a="http://schemas.openxmlformats.org/drawingml/2006/main" xmlns:r="http://schemas.openxmlformats.org/officeDocument/2006/relationships" xmlns:p="http://schemas.openxmlformats.org/presentationml/2006/main" type="titleOnly" preserve="1">
   <p:cSld name="Title Only">
     <p:spTree>
       <p:nvGrpSpPr>
@@ -767,7 +904,8 @@
           </a:prstGeom>
         </p:spPr>
         <p:txBody>
-          <a:bodyPr lIns="0" rIns="0" tIns="0" bIns="0" anchor="ctr"/>
+          <a:bodyPr lIns="0" tIns="0" rIns="0" bIns="0" anchor="ctr"/>
+          <a:lstStyle/>
           <a:p>
             <a:pPr algn="ctr"/>
             <a:endParaRPr/>
@@ -776,11 +914,14 @@
       </p:sp>
     </p:spTree>
   </p:cSld>
+  <p:clrMapOvr>
+    <a:masterClrMapping/>
+  </p:clrMapOvr>
 </p:sldLayout>
 </file>
 
 <file path=ppt/slideLayouts/slideLayout18.xml><?xml version="1.0" encoding="utf-8"?>
-<p:sldLayout xmlns:a="http://schemas.openxmlformats.org/drawingml/2006/main" xmlns:p="http://schemas.openxmlformats.org/presentationml/2006/main" xmlns:r="http://schemas.openxmlformats.org/officeDocument/2006/relationships" type="objOnly" preserve="1">
+<p:sldLayout xmlns:a="http://schemas.openxmlformats.org/drawingml/2006/main" xmlns:r="http://schemas.openxmlformats.org/officeDocument/2006/relationships" xmlns:p="http://schemas.openxmlformats.org/presentationml/2006/main" type="objOnly" preserve="1">
   <p:cSld name="Centered Text">
     <p:spTree>
       <p:nvGrpSpPr>
@@ -816,7 +957,8 @@
           </a:prstGeom>
         </p:spPr>
         <p:txBody>
-          <a:bodyPr lIns="0" rIns="0" tIns="0" bIns="0" anchor="ctr"/>
+          <a:bodyPr lIns="0" tIns="0" rIns="0" bIns="0" anchor="ctr"/>
+          <a:lstStyle/>
           <a:p>
             <a:pPr algn="ctr"/>
             <a:endParaRPr/>
@@ -825,11 +967,14 @@
       </p:sp>
     </p:spTree>
   </p:cSld>
+  <p:clrMapOvr>
+    <a:masterClrMapping/>
+  </p:clrMapOvr>
 </p:sldLayout>
 </file>
 
 <file path=ppt/slideLayouts/slideLayout19.xml><?xml version="1.0" encoding="utf-8"?>
-<p:sldLayout xmlns:a="http://schemas.openxmlformats.org/drawingml/2006/main" xmlns:p="http://schemas.openxmlformats.org/presentationml/2006/main" xmlns:r="http://schemas.openxmlformats.org/officeDocument/2006/relationships" type="twoObjAndObj" preserve="1">
+<p:sldLayout xmlns:a="http://schemas.openxmlformats.org/drawingml/2006/main" xmlns:r="http://schemas.openxmlformats.org/officeDocument/2006/relationships" xmlns:p="http://schemas.openxmlformats.org/presentationml/2006/main" type="twoObjAndObj" preserve="1">
   <p:cSld name="Title, 2 Content and Content">
     <p:spTree>
       <p:nvGrpSpPr>
@@ -865,7 +1010,8 @@
           </a:prstGeom>
         </p:spPr>
         <p:txBody>
-          <a:bodyPr lIns="0" rIns="0" tIns="0" bIns="0" anchor="ctr"/>
+          <a:bodyPr lIns="0" tIns="0" rIns="0" bIns="0" anchor="ctr"/>
+          <a:lstStyle/>
           <a:p>
             <a:pPr algn="ctr"/>
             <a:endParaRPr/>
@@ -892,7 +1038,8 @@
           </a:prstGeom>
         </p:spPr>
         <p:txBody>
-          <a:bodyPr lIns="0" rIns="0" tIns="0" bIns="0"/>
+          <a:bodyPr lIns="0" tIns="0" rIns="0" bIns="0"/>
+          <a:lstStyle/>
           <a:p>
             <a:endParaRPr/>
           </a:p>
@@ -918,7 +1065,8 @@
           </a:prstGeom>
         </p:spPr>
         <p:txBody>
-          <a:bodyPr lIns="0" rIns="0" tIns="0" bIns="0"/>
+          <a:bodyPr lIns="0" tIns="0" rIns="0" bIns="0"/>
+          <a:lstStyle/>
           <a:p>
             <a:endParaRPr/>
           </a:p>
@@ -944,7 +1092,8 @@
           </a:prstGeom>
         </p:spPr>
         <p:txBody>
-          <a:bodyPr lIns="0" rIns="0" tIns="0" bIns="0"/>
+          <a:bodyPr lIns="0" tIns="0" rIns="0" bIns="0"/>
+          <a:lstStyle/>
           <a:p>
             <a:endParaRPr/>
           </a:p>
@@ -952,11 +1101,14 @@
       </p:sp>
     </p:spTree>
   </p:cSld>
+  <p:clrMapOvr>
+    <a:masterClrMapping/>
+  </p:clrMapOvr>
 </p:sldLayout>
 </file>
 
 <file path=ppt/slideLayouts/slideLayout2.xml><?xml version="1.0" encoding="utf-8"?>
-<p:sldLayout xmlns:a="http://schemas.openxmlformats.org/drawingml/2006/main" xmlns:p="http://schemas.openxmlformats.org/presentationml/2006/main" xmlns:r="http://schemas.openxmlformats.org/officeDocument/2006/relationships" type="tx" preserve="1">
+<p:sldLayout xmlns:a="http://schemas.openxmlformats.org/drawingml/2006/main" xmlns:r="http://schemas.openxmlformats.org/officeDocument/2006/relationships" xmlns:p="http://schemas.openxmlformats.org/presentationml/2006/main" type="tx" preserve="1">
   <p:cSld name="Title Slide">
     <p:spTree>
       <p:nvGrpSpPr>
@@ -992,7 +1144,8 @@
           </a:prstGeom>
         </p:spPr>
         <p:txBody>
-          <a:bodyPr lIns="0" rIns="0" tIns="0" bIns="0" anchor="ctr"/>
+          <a:bodyPr lIns="0" tIns="0" rIns="0" bIns="0" anchor="ctr"/>
+          <a:lstStyle/>
           <a:p>
             <a:pPr algn="ctr"/>
             <a:endParaRPr/>
@@ -1019,7 +1172,8 @@
           </a:prstGeom>
         </p:spPr>
         <p:txBody>
-          <a:bodyPr lIns="0" rIns="0" tIns="0" bIns="0" anchor="ctr"/>
+          <a:bodyPr lIns="0" tIns="0" rIns="0" bIns="0" anchor="ctr"/>
+          <a:lstStyle/>
           <a:p>
             <a:pPr algn="ctr"/>
             <a:endParaRPr/>
@@ -1028,11 +1182,14 @@
       </p:sp>
     </p:spTree>
   </p:cSld>
+  <p:clrMapOvr>
+    <a:masterClrMapping/>
+  </p:clrMapOvr>
 </p:sldLayout>
 </file>
 
 <file path=ppt/slideLayouts/slideLayout20.xml><?xml version="1.0" encoding="utf-8"?>
-<p:sldLayout xmlns:a="http://schemas.openxmlformats.org/drawingml/2006/main" xmlns:p="http://schemas.openxmlformats.org/presentationml/2006/main" xmlns:r="http://schemas.openxmlformats.org/officeDocument/2006/relationships" type="objAndTwoObj" preserve="1">
+<p:sldLayout xmlns:a="http://schemas.openxmlformats.org/drawingml/2006/main" xmlns:r="http://schemas.openxmlformats.org/officeDocument/2006/relationships" xmlns:p="http://schemas.openxmlformats.org/presentationml/2006/main" type="objAndTwoObj" preserve="1">
   <p:cSld name="Title Content and 2 Content">
     <p:spTree>
       <p:nvGrpSpPr>
@@ -1068,7 +1225,8 @@
           </a:prstGeom>
         </p:spPr>
         <p:txBody>
-          <a:bodyPr lIns="0" rIns="0" tIns="0" bIns="0" anchor="ctr"/>
+          <a:bodyPr lIns="0" tIns="0" rIns="0" bIns="0" anchor="ctr"/>
+          <a:lstStyle/>
           <a:p>
             <a:pPr algn="ctr"/>
             <a:endParaRPr/>
@@ -1095,7 +1253,8 @@
           </a:prstGeom>
         </p:spPr>
         <p:txBody>
-          <a:bodyPr lIns="0" rIns="0" tIns="0" bIns="0"/>
+          <a:bodyPr lIns="0" tIns="0" rIns="0" bIns="0"/>
+          <a:lstStyle/>
           <a:p>
             <a:endParaRPr/>
           </a:p>
@@ -1121,7 +1280,8 @@
           </a:prstGeom>
         </p:spPr>
         <p:txBody>
-          <a:bodyPr lIns="0" rIns="0" tIns="0" bIns="0"/>
+          <a:bodyPr lIns="0" tIns="0" rIns="0" bIns="0"/>
+          <a:lstStyle/>
           <a:p>
             <a:endParaRPr/>
           </a:p>
@@ -1147,7 +1307,8 @@
           </a:prstGeom>
         </p:spPr>
         <p:txBody>
-          <a:bodyPr lIns="0" rIns="0" tIns="0" bIns="0"/>
+          <a:bodyPr lIns="0" tIns="0" rIns="0" bIns="0"/>
+          <a:lstStyle/>
           <a:p>
             <a:endParaRPr/>
           </a:p>
@@ -1155,11 +1316,14 @@
       </p:sp>
     </p:spTree>
   </p:cSld>
+  <p:clrMapOvr>
+    <a:masterClrMapping/>
+  </p:clrMapOvr>
 </p:sldLayout>
 </file>
 
 <file path=ppt/slideLayouts/slideLayout21.xml><?xml version="1.0" encoding="utf-8"?>
-<p:sldLayout xmlns:a="http://schemas.openxmlformats.org/drawingml/2006/main" xmlns:p="http://schemas.openxmlformats.org/presentationml/2006/main" xmlns:r="http://schemas.openxmlformats.org/officeDocument/2006/relationships" type="twoObjOverTx" preserve="1">
+<p:sldLayout xmlns:a="http://schemas.openxmlformats.org/drawingml/2006/main" xmlns:r="http://schemas.openxmlformats.org/officeDocument/2006/relationships" xmlns:p="http://schemas.openxmlformats.org/presentationml/2006/main" type="twoObjOverTx" preserve="1">
   <p:cSld name="Title, 2 Content over Content">
     <p:spTree>
       <p:nvGrpSpPr>
@@ -1195,7 +1359,8 @@
           </a:prstGeom>
         </p:spPr>
         <p:txBody>
-          <a:bodyPr lIns="0" rIns="0" tIns="0" bIns="0" anchor="ctr"/>
+          <a:bodyPr lIns="0" tIns="0" rIns="0" bIns="0" anchor="ctr"/>
+          <a:lstStyle/>
           <a:p>
             <a:pPr algn="ctr"/>
             <a:endParaRPr/>
@@ -1222,7 +1387,8 @@
           </a:prstGeom>
         </p:spPr>
         <p:txBody>
-          <a:bodyPr lIns="0" rIns="0" tIns="0" bIns="0"/>
+          <a:bodyPr lIns="0" tIns="0" rIns="0" bIns="0"/>
+          <a:lstStyle/>
           <a:p>
             <a:endParaRPr/>
           </a:p>
@@ -1248,7 +1414,8 @@
           </a:prstGeom>
         </p:spPr>
         <p:txBody>
-          <a:bodyPr lIns="0" rIns="0" tIns="0" bIns="0"/>
+          <a:bodyPr lIns="0" tIns="0" rIns="0" bIns="0"/>
+          <a:lstStyle/>
           <a:p>
             <a:endParaRPr/>
           </a:p>
@@ -1274,7 +1441,8 @@
           </a:prstGeom>
         </p:spPr>
         <p:txBody>
-          <a:bodyPr lIns="0" rIns="0" tIns="0" bIns="0"/>
+          <a:bodyPr lIns="0" tIns="0" rIns="0" bIns="0"/>
+          <a:lstStyle/>
           <a:p>
             <a:endParaRPr/>
           </a:p>
@@ -1282,11 +1450,14 @@
       </p:sp>
     </p:spTree>
   </p:cSld>
+  <p:clrMapOvr>
+    <a:masterClrMapping/>
+  </p:clrMapOvr>
 </p:sldLayout>
 </file>
 
 <file path=ppt/slideLayouts/slideLayout22.xml><?xml version="1.0" encoding="utf-8"?>
-<p:sldLayout xmlns:a="http://schemas.openxmlformats.org/drawingml/2006/main" xmlns:p="http://schemas.openxmlformats.org/presentationml/2006/main" xmlns:r="http://schemas.openxmlformats.org/officeDocument/2006/relationships" type="objOverTx" preserve="1">
+<p:sldLayout xmlns:a="http://schemas.openxmlformats.org/drawingml/2006/main" xmlns:r="http://schemas.openxmlformats.org/officeDocument/2006/relationships" xmlns:p="http://schemas.openxmlformats.org/presentationml/2006/main" type="objOverTx" preserve="1">
   <p:cSld name="Title, Content over Content">
     <p:spTree>
       <p:nvGrpSpPr>
@@ -1322,7 +1493,8 @@
           </a:prstGeom>
         </p:spPr>
         <p:txBody>
-          <a:bodyPr lIns="0" rIns="0" tIns="0" bIns="0" anchor="ctr"/>
+          <a:bodyPr lIns="0" tIns="0" rIns="0" bIns="0" anchor="ctr"/>
+          <a:lstStyle/>
           <a:p>
             <a:pPr algn="ctr"/>
             <a:endParaRPr/>
@@ -1349,7 +1521,8 @@
           </a:prstGeom>
         </p:spPr>
         <p:txBody>
-          <a:bodyPr lIns="0" rIns="0" tIns="0" bIns="0"/>
+          <a:bodyPr lIns="0" tIns="0" rIns="0" bIns="0"/>
+          <a:lstStyle/>
           <a:p>
             <a:endParaRPr/>
           </a:p>
@@ -1375,7 +1548,8 @@
           </a:prstGeom>
         </p:spPr>
         <p:txBody>
-          <a:bodyPr lIns="0" rIns="0" tIns="0" bIns="0"/>
+          <a:bodyPr lIns="0" tIns="0" rIns="0" bIns="0"/>
+          <a:lstStyle/>
           <a:p>
             <a:endParaRPr/>
           </a:p>
@@ -1383,11 +1557,14 @@
       </p:sp>
     </p:spTree>
   </p:cSld>
+  <p:clrMapOvr>
+    <a:masterClrMapping/>
+  </p:clrMapOvr>
 </p:sldLayout>
 </file>
 
 <file path=ppt/slideLayouts/slideLayout23.xml><?xml version="1.0" encoding="utf-8"?>
-<p:sldLayout xmlns:a="http://schemas.openxmlformats.org/drawingml/2006/main" xmlns:p="http://schemas.openxmlformats.org/presentationml/2006/main" xmlns:r="http://schemas.openxmlformats.org/officeDocument/2006/relationships" type="fourObj" preserve="1">
+<p:sldLayout xmlns:a="http://schemas.openxmlformats.org/drawingml/2006/main" xmlns:r="http://schemas.openxmlformats.org/officeDocument/2006/relationships" xmlns:p="http://schemas.openxmlformats.org/presentationml/2006/main" type="fourObj" preserve="1">
   <p:cSld name="Title, 4 Content">
     <p:spTree>
       <p:nvGrpSpPr>
@@ -1423,7 +1600,8 @@
           </a:prstGeom>
         </p:spPr>
         <p:txBody>
-          <a:bodyPr lIns="0" rIns="0" tIns="0" bIns="0" anchor="ctr"/>
+          <a:bodyPr lIns="0" tIns="0" rIns="0" bIns="0" anchor="ctr"/>
+          <a:lstStyle/>
           <a:p>
             <a:pPr algn="ctr"/>
             <a:endParaRPr/>
@@ -1450,7 +1628,8 @@
           </a:prstGeom>
         </p:spPr>
         <p:txBody>
-          <a:bodyPr lIns="0" rIns="0" tIns="0" bIns="0"/>
+          <a:bodyPr lIns="0" tIns="0" rIns="0" bIns="0"/>
+          <a:lstStyle/>
           <a:p>
             <a:endParaRPr/>
           </a:p>
@@ -1476,7 +1655,8 @@
           </a:prstGeom>
         </p:spPr>
         <p:txBody>
-          <a:bodyPr lIns="0" rIns="0" tIns="0" bIns="0"/>
+          <a:bodyPr lIns="0" tIns="0" rIns="0" bIns="0"/>
+          <a:lstStyle/>
           <a:p>
             <a:endParaRPr/>
           </a:p>
@@ -1502,7 +1682,8 @@
           </a:prstGeom>
         </p:spPr>
         <p:txBody>
-          <a:bodyPr lIns="0" rIns="0" tIns="0" bIns="0"/>
+          <a:bodyPr lIns="0" tIns="0" rIns="0" bIns="0"/>
+          <a:lstStyle/>
           <a:p>
             <a:endParaRPr/>
           </a:p>
@@ -1528,7 +1709,8 @@
           </a:prstGeom>
         </p:spPr>
         <p:txBody>
-          <a:bodyPr lIns="0" rIns="0" tIns="0" bIns="0"/>
+          <a:bodyPr lIns="0" tIns="0" rIns="0" bIns="0"/>
+          <a:lstStyle/>
           <a:p>
             <a:endParaRPr/>
           </a:p>
@@ -1536,11 +1718,14 @@
       </p:sp>
     </p:spTree>
   </p:cSld>
+  <p:clrMapOvr>
+    <a:masterClrMapping/>
+  </p:clrMapOvr>
 </p:sldLayout>
 </file>
 
 <file path=ppt/slideLayouts/slideLayout24.xml><?xml version="1.0" encoding="utf-8"?>
-<p:sldLayout xmlns:a="http://schemas.openxmlformats.org/drawingml/2006/main" xmlns:p="http://schemas.openxmlformats.org/presentationml/2006/main" xmlns:r="http://schemas.openxmlformats.org/officeDocument/2006/relationships" type="blank" preserve="1">
+<p:sldLayout xmlns:a="http://schemas.openxmlformats.org/drawingml/2006/main" xmlns:r="http://schemas.openxmlformats.org/officeDocument/2006/relationships" xmlns:p="http://schemas.openxmlformats.org/presentationml/2006/main" type="blank" preserve="1">
   <p:cSld name="Title, 6 Content">
     <p:spTree>
       <p:nvGrpSpPr>
@@ -1576,7 +1761,8 @@
           </a:prstGeom>
         </p:spPr>
         <p:txBody>
-          <a:bodyPr lIns="0" rIns="0" tIns="0" bIns="0" anchor="ctr"/>
+          <a:bodyPr lIns="0" tIns="0" rIns="0" bIns="0" anchor="ctr"/>
+          <a:lstStyle/>
           <a:p>
             <a:pPr algn="ctr"/>
             <a:endParaRPr/>
@@ -1603,7 +1789,8 @@
           </a:prstGeom>
         </p:spPr>
         <p:txBody>
-          <a:bodyPr lIns="0" rIns="0" tIns="0" bIns="0"/>
+          <a:bodyPr lIns="0" tIns="0" rIns="0" bIns="0"/>
+          <a:lstStyle/>
           <a:p>
             <a:endParaRPr/>
           </a:p>
@@ -1629,7 +1816,8 @@
           </a:prstGeom>
         </p:spPr>
         <p:txBody>
-          <a:bodyPr lIns="0" rIns="0" tIns="0" bIns="0"/>
+          <a:bodyPr lIns="0" tIns="0" rIns="0" bIns="0"/>
+          <a:lstStyle/>
           <a:p>
             <a:endParaRPr/>
           </a:p>
@@ -1637,7 +1825,7 @@
       </p:sp>
       <p:pic>
         <p:nvPicPr>
-          <p:cNvPr id="77" name="" descr=""/>
+          <p:cNvPr id="77" name="Picture 76"/>
           <p:cNvPicPr/>
           <p:nvPr/>
         </p:nvPicPr>
@@ -1660,12 +1848,12 @@
       </p:pic>
       <p:pic>
         <p:nvPicPr>
-          <p:cNvPr id="78" name="" descr=""/>
+          <p:cNvPr id="78" name="Picture 77"/>
           <p:cNvPicPr/>
           <p:nvPr/>
         </p:nvPicPr>
         <p:blipFill>
-          <a:blip r:embed="rId3"/>
+          <a:blip r:embed="rId2"/>
           <a:stretch/>
         </p:blipFill>
         <p:spPr>
@@ -1683,11 +1871,14 @@
       </p:pic>
     </p:spTree>
   </p:cSld>
+  <p:clrMapOvr>
+    <a:masterClrMapping/>
+  </p:clrMapOvr>
 </p:sldLayout>
 </file>
 
 <file path=ppt/slideLayouts/slideLayout3.xml><?xml version="1.0" encoding="utf-8"?>
-<p:sldLayout xmlns:a="http://schemas.openxmlformats.org/drawingml/2006/main" xmlns:p="http://schemas.openxmlformats.org/presentationml/2006/main" xmlns:r="http://schemas.openxmlformats.org/officeDocument/2006/relationships" type="obj" preserve="1">
+<p:sldLayout xmlns:a="http://schemas.openxmlformats.org/drawingml/2006/main" xmlns:r="http://schemas.openxmlformats.org/officeDocument/2006/relationships" xmlns:p="http://schemas.openxmlformats.org/presentationml/2006/main" type="obj" preserve="1">
   <p:cSld name="Title, Content">
     <p:spTree>
       <p:nvGrpSpPr>
@@ -1723,7 +1914,8 @@
           </a:prstGeom>
         </p:spPr>
         <p:txBody>
-          <a:bodyPr lIns="0" rIns="0" tIns="0" bIns="0" anchor="ctr"/>
+          <a:bodyPr lIns="0" tIns="0" rIns="0" bIns="0" anchor="ctr"/>
+          <a:lstStyle/>
           <a:p>
             <a:pPr algn="ctr"/>
             <a:endParaRPr/>
@@ -1750,7 +1942,8 @@
           </a:prstGeom>
         </p:spPr>
         <p:txBody>
-          <a:bodyPr lIns="0" rIns="0" tIns="0" bIns="0"/>
+          <a:bodyPr lIns="0" tIns="0" rIns="0" bIns="0"/>
+          <a:lstStyle/>
           <a:p>
             <a:endParaRPr/>
           </a:p>
@@ -1758,11 +1951,14 @@
       </p:sp>
     </p:spTree>
   </p:cSld>
+  <p:clrMapOvr>
+    <a:masterClrMapping/>
+  </p:clrMapOvr>
 </p:sldLayout>
 </file>
 
 <file path=ppt/slideLayouts/slideLayout4.xml><?xml version="1.0" encoding="utf-8"?>
-<p:sldLayout xmlns:a="http://schemas.openxmlformats.org/drawingml/2006/main" xmlns:p="http://schemas.openxmlformats.org/presentationml/2006/main" xmlns:r="http://schemas.openxmlformats.org/officeDocument/2006/relationships" type="twoObj" preserve="1">
+<p:sldLayout xmlns:a="http://schemas.openxmlformats.org/drawingml/2006/main" xmlns:r="http://schemas.openxmlformats.org/officeDocument/2006/relationships" xmlns:p="http://schemas.openxmlformats.org/presentationml/2006/main" type="twoObj" preserve="1">
   <p:cSld name="Title, 2 Content">
     <p:spTree>
       <p:nvGrpSpPr>
@@ -1798,7 +1994,8 @@
           </a:prstGeom>
         </p:spPr>
         <p:txBody>
-          <a:bodyPr lIns="0" rIns="0" tIns="0" bIns="0" anchor="ctr"/>
+          <a:bodyPr lIns="0" tIns="0" rIns="0" bIns="0" anchor="ctr"/>
+          <a:lstStyle/>
           <a:p>
             <a:pPr algn="ctr"/>
             <a:endParaRPr/>
@@ -1825,7 +2022,8 @@
           </a:prstGeom>
         </p:spPr>
         <p:txBody>
-          <a:bodyPr lIns="0" rIns="0" tIns="0" bIns="0"/>
+          <a:bodyPr lIns="0" tIns="0" rIns="0" bIns="0"/>
+          <a:lstStyle/>
           <a:p>
             <a:endParaRPr/>
           </a:p>
@@ -1851,7 +2049,8 @@
           </a:prstGeom>
         </p:spPr>
         <p:txBody>
-          <a:bodyPr lIns="0" rIns="0" tIns="0" bIns="0"/>
+          <a:bodyPr lIns="0" tIns="0" rIns="0" bIns="0"/>
+          <a:lstStyle/>
           <a:p>
             <a:endParaRPr/>
           </a:p>
@@ -1859,11 +2058,14 @@
       </p:sp>
     </p:spTree>
   </p:cSld>
+  <p:clrMapOvr>
+    <a:masterClrMapping/>
+  </p:clrMapOvr>
 </p:sldLayout>
 </file>
 
 <file path=ppt/slideLayouts/slideLayout5.xml><?xml version="1.0" encoding="utf-8"?>
-<p:sldLayout xmlns:a="http://schemas.openxmlformats.org/drawingml/2006/main" xmlns:p="http://schemas.openxmlformats.org/presentationml/2006/main" xmlns:r="http://schemas.openxmlformats.org/officeDocument/2006/relationships" type="titleOnly" preserve="1">
+<p:sldLayout xmlns:a="http://schemas.openxmlformats.org/drawingml/2006/main" xmlns:r="http://schemas.openxmlformats.org/officeDocument/2006/relationships" xmlns:p="http://schemas.openxmlformats.org/presentationml/2006/main" type="titleOnly" preserve="1">
   <p:cSld name="Title Only">
     <p:spTree>
       <p:nvGrpSpPr>
@@ -1899,7 +2101,8 @@
           </a:prstGeom>
         </p:spPr>
         <p:txBody>
-          <a:bodyPr lIns="0" rIns="0" tIns="0" bIns="0" anchor="ctr"/>
+          <a:bodyPr lIns="0" tIns="0" rIns="0" bIns="0" anchor="ctr"/>
+          <a:lstStyle/>
           <a:p>
             <a:pPr algn="ctr"/>
             <a:endParaRPr/>
@@ -1908,11 +2111,14 @@
       </p:sp>
     </p:spTree>
   </p:cSld>
+  <p:clrMapOvr>
+    <a:masterClrMapping/>
+  </p:clrMapOvr>
 </p:sldLayout>
 </file>
 
 <file path=ppt/slideLayouts/slideLayout6.xml><?xml version="1.0" encoding="utf-8"?>
-<p:sldLayout xmlns:a="http://schemas.openxmlformats.org/drawingml/2006/main" xmlns:p="http://schemas.openxmlformats.org/presentationml/2006/main" xmlns:r="http://schemas.openxmlformats.org/officeDocument/2006/relationships" type="objOnly" preserve="1">
+<p:sldLayout xmlns:a="http://schemas.openxmlformats.org/drawingml/2006/main" xmlns:r="http://schemas.openxmlformats.org/officeDocument/2006/relationships" xmlns:p="http://schemas.openxmlformats.org/presentationml/2006/main" type="objOnly" preserve="1">
   <p:cSld name="Centered Text">
     <p:spTree>
       <p:nvGrpSpPr>
@@ -1948,7 +2154,8 @@
           </a:prstGeom>
         </p:spPr>
         <p:txBody>
-          <a:bodyPr lIns="0" rIns="0" tIns="0" bIns="0" anchor="ctr"/>
+          <a:bodyPr lIns="0" tIns="0" rIns="0" bIns="0" anchor="ctr"/>
+          <a:lstStyle/>
           <a:p>
             <a:pPr algn="ctr"/>
             <a:endParaRPr/>
@@ -1957,11 +2164,14 @@
       </p:sp>
     </p:spTree>
   </p:cSld>
+  <p:clrMapOvr>
+    <a:masterClrMapping/>
+  </p:clrMapOvr>
 </p:sldLayout>
 </file>
 
 <file path=ppt/slideLayouts/slideLayout7.xml><?xml version="1.0" encoding="utf-8"?>
-<p:sldLayout xmlns:a="http://schemas.openxmlformats.org/drawingml/2006/main" xmlns:p="http://schemas.openxmlformats.org/presentationml/2006/main" xmlns:r="http://schemas.openxmlformats.org/officeDocument/2006/relationships" type="twoObjAndObj" preserve="1">
+<p:sldLayout xmlns:a="http://schemas.openxmlformats.org/drawingml/2006/main" xmlns:r="http://schemas.openxmlformats.org/officeDocument/2006/relationships" xmlns:p="http://schemas.openxmlformats.org/presentationml/2006/main" type="twoObjAndObj" preserve="1">
   <p:cSld name="Title, 2 Content and Content">
     <p:spTree>
       <p:nvGrpSpPr>
@@ -1997,7 +2207,8 @@
           </a:prstGeom>
         </p:spPr>
         <p:txBody>
-          <a:bodyPr lIns="0" rIns="0" tIns="0" bIns="0" anchor="ctr"/>
+          <a:bodyPr lIns="0" tIns="0" rIns="0" bIns="0" anchor="ctr"/>
+          <a:lstStyle/>
           <a:p>
             <a:pPr algn="ctr"/>
             <a:endParaRPr/>
@@ -2024,7 +2235,8 @@
           </a:prstGeom>
         </p:spPr>
         <p:txBody>
-          <a:bodyPr lIns="0" rIns="0" tIns="0" bIns="0"/>
+          <a:bodyPr lIns="0" tIns="0" rIns="0" bIns="0"/>
+          <a:lstStyle/>
           <a:p>
             <a:endParaRPr/>
           </a:p>
@@ -2050,7 +2262,8 @@
           </a:prstGeom>
         </p:spPr>
         <p:txBody>
-          <a:bodyPr lIns="0" rIns="0" tIns="0" bIns="0"/>
+          <a:bodyPr lIns="0" tIns="0" rIns="0" bIns="0"/>
+          <a:lstStyle/>
           <a:p>
             <a:endParaRPr/>
           </a:p>
@@ -2076,7 +2289,8 @@
           </a:prstGeom>
         </p:spPr>
         <p:txBody>
-          <a:bodyPr lIns="0" rIns="0" tIns="0" bIns="0"/>
+          <a:bodyPr lIns="0" tIns="0" rIns="0" bIns="0"/>
+          <a:lstStyle/>
           <a:p>
             <a:endParaRPr/>
           </a:p>
@@ -2084,11 +2298,14 @@
       </p:sp>
     </p:spTree>
   </p:cSld>
+  <p:clrMapOvr>
+    <a:masterClrMapping/>
+  </p:clrMapOvr>
 </p:sldLayout>
 </file>
 
 <file path=ppt/slideLayouts/slideLayout8.xml><?xml version="1.0" encoding="utf-8"?>
-<p:sldLayout xmlns:a="http://schemas.openxmlformats.org/drawingml/2006/main" xmlns:p="http://schemas.openxmlformats.org/presentationml/2006/main" xmlns:r="http://schemas.openxmlformats.org/officeDocument/2006/relationships" type="objAndTwoObj" preserve="1">
+<p:sldLayout xmlns:a="http://schemas.openxmlformats.org/drawingml/2006/main" xmlns:r="http://schemas.openxmlformats.org/officeDocument/2006/relationships" xmlns:p="http://schemas.openxmlformats.org/presentationml/2006/main" type="objAndTwoObj" preserve="1">
   <p:cSld name="Title Content and 2 Content">
     <p:spTree>
       <p:nvGrpSpPr>
@@ -2124,7 +2341,8 @@
           </a:prstGeom>
         </p:spPr>
         <p:txBody>
-          <a:bodyPr lIns="0" rIns="0" tIns="0" bIns="0" anchor="ctr"/>
+          <a:bodyPr lIns="0" tIns="0" rIns="0" bIns="0" anchor="ctr"/>
+          <a:lstStyle/>
           <a:p>
             <a:pPr algn="ctr"/>
             <a:endParaRPr/>
@@ -2151,7 +2369,8 @@
           </a:prstGeom>
         </p:spPr>
         <p:txBody>
-          <a:bodyPr lIns="0" rIns="0" tIns="0" bIns="0"/>
+          <a:bodyPr lIns="0" tIns="0" rIns="0" bIns="0"/>
+          <a:lstStyle/>
           <a:p>
             <a:endParaRPr/>
           </a:p>
@@ -2177,7 +2396,8 @@
           </a:prstGeom>
         </p:spPr>
         <p:txBody>
-          <a:bodyPr lIns="0" rIns="0" tIns="0" bIns="0"/>
+          <a:bodyPr lIns="0" tIns="0" rIns="0" bIns="0"/>
+          <a:lstStyle/>
           <a:p>
             <a:endParaRPr/>
           </a:p>
@@ -2203,7 +2423,8 @@
           </a:prstGeom>
         </p:spPr>
         <p:txBody>
-          <a:bodyPr lIns="0" rIns="0" tIns="0" bIns="0"/>
+          <a:bodyPr lIns="0" tIns="0" rIns="0" bIns="0"/>
+          <a:lstStyle/>
           <a:p>
             <a:endParaRPr/>
           </a:p>
@@ -2211,11 +2432,14 @@
       </p:sp>
     </p:spTree>
   </p:cSld>
+  <p:clrMapOvr>
+    <a:masterClrMapping/>
+  </p:clrMapOvr>
 </p:sldLayout>
 </file>
 
 <file path=ppt/slideLayouts/slideLayout9.xml><?xml version="1.0" encoding="utf-8"?>
-<p:sldLayout xmlns:a="http://schemas.openxmlformats.org/drawingml/2006/main" xmlns:p="http://schemas.openxmlformats.org/presentationml/2006/main" xmlns:r="http://schemas.openxmlformats.org/officeDocument/2006/relationships" type="twoObjOverTx" preserve="1">
+<p:sldLayout xmlns:a="http://schemas.openxmlformats.org/drawingml/2006/main" xmlns:r="http://schemas.openxmlformats.org/officeDocument/2006/relationships" xmlns:p="http://schemas.openxmlformats.org/presentationml/2006/main" type="twoObjOverTx" preserve="1">
   <p:cSld name="Title, 2 Content over Content">
     <p:spTree>
       <p:nvGrpSpPr>
@@ -2251,7 +2475,8 @@
           </a:prstGeom>
         </p:spPr>
         <p:txBody>
-          <a:bodyPr lIns="0" rIns="0" tIns="0" bIns="0" anchor="ctr"/>
+          <a:bodyPr lIns="0" tIns="0" rIns="0" bIns="0" anchor="ctr"/>
+          <a:lstStyle/>
           <a:p>
             <a:pPr algn="ctr"/>
             <a:endParaRPr/>
@@ -2278,7 +2503,8 @@
           </a:prstGeom>
         </p:spPr>
         <p:txBody>
-          <a:bodyPr lIns="0" rIns="0" tIns="0" bIns="0"/>
+          <a:bodyPr lIns="0" tIns="0" rIns="0" bIns="0"/>
+          <a:lstStyle/>
           <a:p>
             <a:endParaRPr/>
           </a:p>
@@ -2304,7 +2530,8 @@
           </a:prstGeom>
         </p:spPr>
         <p:txBody>
-          <a:bodyPr lIns="0" rIns="0" tIns="0" bIns="0"/>
+          <a:bodyPr lIns="0" tIns="0" rIns="0" bIns="0"/>
+          <a:lstStyle/>
           <a:p>
             <a:endParaRPr/>
           </a:p>
@@ -2330,7 +2557,8 @@
           </a:prstGeom>
         </p:spPr>
         <p:txBody>
-          <a:bodyPr lIns="0" rIns="0" tIns="0" bIns="0"/>
+          <a:bodyPr lIns="0" tIns="0" rIns="0" bIns="0"/>
+          <a:lstStyle/>
           <a:p>
             <a:endParaRPr/>
           </a:p>
@@ -2338,12 +2566,20 @@
       </p:sp>
     </p:spTree>
   </p:cSld>
+  <p:clrMapOvr>
+    <a:masterClrMapping/>
+  </p:clrMapOvr>
 </p:sldLayout>
 </file>
 
 <file path=ppt/slideMasters/slideMaster1.xml><?xml version="1.0" encoding="utf-8"?>
-<p:sldMaster xmlns:a="http://schemas.openxmlformats.org/drawingml/2006/main" xmlns:p="http://schemas.openxmlformats.org/presentationml/2006/main" xmlns:r="http://schemas.openxmlformats.org/officeDocument/2006/relationships">
+<p:sldMaster xmlns:a="http://schemas.openxmlformats.org/drawingml/2006/main" xmlns:r="http://schemas.openxmlformats.org/officeDocument/2006/relationships" xmlns:p="http://schemas.openxmlformats.org/presentationml/2006/main">
   <p:cSld>
+    <p:bg>
+      <p:bgRef idx="1001">
+        <a:schemeClr val="bg1"/>
+      </p:bgRef>
+    </p:bg>
     <p:spTree>
       <p:nvGrpSpPr>
         <p:cNvPr id="1" name=""/>
@@ -2360,7 +2596,7 @@
       </p:grpSpPr>
       <p:sp>
         <p:nvSpPr>
-          <p:cNvPr id="0" name="PlaceHolder 1"/>
+          <p:cNvPr id="5" name="PlaceHolder 1"/>
           <p:cNvSpPr>
             <a:spLocks noGrp="1"/>
           </p:cNvSpPr>
@@ -2378,7 +2614,8 @@
           </a:prstGeom>
         </p:spPr>
         <p:txBody>
-          <a:bodyPr lIns="0" rIns="0" tIns="0" bIns="0" anchor="ctr"/>
+          <a:bodyPr lIns="0" tIns="0" rIns="0" bIns="0" anchor="ctr"/>
+          <a:lstStyle/>
           <a:p>
             <a:pPr algn="ctr"/>
             <a:r>
@@ -2393,7 +2630,7 @@
       </p:sp>
       <p:sp>
         <p:nvSpPr>
-          <p:cNvPr id="1" name="PlaceHolder 2"/>
+          <p:cNvPr id="6" name="PlaceHolder 2"/>
           <p:cNvSpPr>
             <a:spLocks noGrp="1"/>
           </p:cNvSpPr>
@@ -2411,11 +2648,12 @@
           </a:prstGeom>
         </p:spPr>
         <p:txBody>
-          <a:bodyPr lIns="0" rIns="0" tIns="0" bIns="0"/>
+          <a:bodyPr lIns="0" tIns="0" rIns="0" bIns="0"/>
+          <a:lstStyle/>
           <a:p>
             <a:pPr marL="432000" indent="-324000">
               <a:buClr>
-                <a:srgbClr val="ffffff"/>
+                <a:srgbClr val="FFFFFF"/>
               </a:buClr>
               <a:buSzPct val="45000"/>
               <a:buFont typeface="Wingdings" charset="2"/>
@@ -2430,9 +2668,9 @@
             <a:endParaRPr/>
           </a:p>
           <a:p>
-            <a:pPr lvl="1" marL="864000" indent="-324000">
+            <a:pPr marL="864000" lvl="1" indent="-324000">
               <a:buClr>
-                <a:srgbClr val="ffffff"/>
+                <a:srgbClr val="FFFFFF"/>
               </a:buClr>
               <a:buSzPct val="75000"/>
               <a:buFont typeface="Symbol" charset="2"/>
@@ -2447,9 +2685,9 @@
             <a:endParaRPr/>
           </a:p>
           <a:p>
-            <a:pPr lvl="2" marL="1296000" indent="-288000">
+            <a:pPr marL="1296000" lvl="2" indent="-288000">
               <a:buClr>
-                <a:srgbClr val="ffffff"/>
+                <a:srgbClr val="FFFFFF"/>
               </a:buClr>
               <a:buSzPct val="45000"/>
               <a:buFont typeface="Wingdings" charset="2"/>
@@ -2464,9 +2702,9 @@
             <a:endParaRPr/>
           </a:p>
           <a:p>
-            <a:pPr lvl="3" marL="1728000" indent="-216000">
+            <a:pPr marL="1728000" lvl="3" indent="-216000">
               <a:buClr>
-                <a:srgbClr val="ffffff"/>
+                <a:srgbClr val="FFFFFF"/>
               </a:buClr>
               <a:buSzPct val="75000"/>
               <a:buFont typeface="Symbol" charset="2"/>
@@ -2481,9 +2719,9 @@
             <a:endParaRPr/>
           </a:p>
           <a:p>
-            <a:pPr lvl="4" marL="2160000" indent="-216000">
+            <a:pPr marL="2160000" lvl="4" indent="-216000">
               <a:buClr>
-                <a:srgbClr val="ffffff"/>
+                <a:srgbClr val="FFFFFF"/>
               </a:buClr>
               <a:buSzPct val="45000"/>
               <a:buFont typeface="Wingdings" charset="2"/>
@@ -2498,9 +2736,9 @@
             <a:endParaRPr/>
           </a:p>
           <a:p>
-            <a:pPr lvl="5" marL="2592000" indent="-216000">
+            <a:pPr marL="2592000" lvl="5" indent="-216000">
               <a:buClr>
-                <a:srgbClr val="ffffff"/>
+                <a:srgbClr val="FFFFFF"/>
               </a:buClr>
               <a:buSzPct val="45000"/>
               <a:buFont typeface="Wingdings" charset="2"/>
@@ -2515,9 +2753,9 @@
             <a:endParaRPr/>
           </a:p>
           <a:p>
-            <a:pPr lvl="6" marL="3024000" indent="-216000">
+            <a:pPr marL="3024000" lvl="6" indent="-216000">
               <a:buClr>
-                <a:srgbClr val="ffffff"/>
+                <a:srgbClr val="FFFFFF"/>
               </a:buClr>
               <a:buSzPct val="45000"/>
               <a:buFont typeface="Wingdings" charset="2"/>
@@ -2553,7 +2791,8 @@
           </a:prstGeom>
         </p:spPr>
         <p:txBody>
-          <a:bodyPr lIns="0" rIns="0" tIns="0" bIns="0"/>
+          <a:bodyPr lIns="0" tIns="0" rIns="0" bIns="0"/>
+          <a:lstStyle/>
           <a:p>
             <a:r>
               <a:rPr lang="en-US" sz="1400" spc="-1">
@@ -2585,7 +2824,8 @@
           </a:prstGeom>
         </p:spPr>
         <p:txBody>
-          <a:bodyPr lIns="0" rIns="0" tIns="0" bIns="0"/>
+          <a:bodyPr lIns="0" tIns="0" rIns="0" bIns="0"/>
+          <a:lstStyle/>
           <a:p>
             <a:pPr algn="ctr"/>
             <a:r>
@@ -2618,14 +2858,15 @@
           </a:prstGeom>
         </p:spPr>
         <p:txBody>
-          <a:bodyPr lIns="0" rIns="0" tIns="0" bIns="0"/>
+          <a:bodyPr lIns="0" tIns="0" rIns="0" bIns="0"/>
+          <a:lstStyle/>
           <a:p>
             <a:pPr algn="r"/>
             <a:fld id="{83994613-154F-420B-9F5C-57747E22B868}" type="slidenum">
               <a:rPr lang="en-US" sz="1400" spc="-1">
                 <a:latin typeface="Times New Roman"/>
               </a:rPr>
-              <a:t>&lt;number&gt;</a:t>
+              <a:t>‹#›</a:t>
             </a:fld>
             <a:endParaRPr/>
           </a:p>
@@ -2633,27 +2874,312 @@
       </p:sp>
     </p:spTree>
   </p:cSld>
-  <p:clrMap bg1="lt1" bg2="lt2" tx1="dk1" tx2="dk2" accent1="accent1" accent2="accent2" accent3="accent3" accent4="accent4" accent5="accent5" accent6="accent6" hlink="hlink" folHlink="folHlink"/>
+  <p:clrMap bg1="lt1" tx1="dk1" bg2="lt2" tx2="dk2" accent1="accent1" accent2="accent2" accent3="accent3" accent4="accent4" accent5="accent5" accent6="accent6" hlink="hlink" folHlink="folHlink"/>
   <p:sldLayoutIdLst>
-    <p:sldLayoutId id="2147483649" r:id="rId2"/>
-    <p:sldLayoutId id="2147483650" r:id="rId3"/>
-    <p:sldLayoutId id="2147483651" r:id="rId4"/>
-    <p:sldLayoutId id="2147483652" r:id="rId5"/>
-    <p:sldLayoutId id="2147483653" r:id="rId6"/>
-    <p:sldLayoutId id="2147483654" r:id="rId7"/>
-    <p:sldLayoutId id="2147483655" r:id="rId8"/>
-    <p:sldLayoutId id="2147483656" r:id="rId9"/>
-    <p:sldLayoutId id="2147483657" r:id="rId10"/>
-    <p:sldLayoutId id="2147483658" r:id="rId11"/>
-    <p:sldLayoutId id="2147483659" r:id="rId12"/>
-    <p:sldLayoutId id="2147483660" r:id="rId13"/>
+    <p:sldLayoutId id="2147483649" r:id="rId1"/>
+    <p:sldLayoutId id="2147483650" r:id="rId2"/>
+    <p:sldLayoutId id="2147483651" r:id="rId3"/>
+    <p:sldLayoutId id="2147483652" r:id="rId4"/>
+    <p:sldLayoutId id="2147483653" r:id="rId5"/>
+    <p:sldLayoutId id="2147483654" r:id="rId6"/>
+    <p:sldLayoutId id="2147483655" r:id="rId7"/>
+    <p:sldLayoutId id="2147483656" r:id="rId8"/>
+    <p:sldLayoutId id="2147483657" r:id="rId9"/>
+    <p:sldLayoutId id="2147483658" r:id="rId10"/>
+    <p:sldLayoutId id="2147483659" r:id="rId11"/>
+    <p:sldLayoutId id="2147483660" r:id="rId12"/>
   </p:sldLayoutIdLst>
+  <p:txStyles>
+    <p:titleStyle>
+      <a:lvl1pPr algn="l" defTabSz="914400" rtl="0" eaLnBrk="1" latinLnBrk="0" hangingPunct="1">
+        <a:lnSpc>
+          <a:spcPct val="90000"/>
+        </a:lnSpc>
+        <a:spcBef>
+          <a:spcPct val="0"/>
+        </a:spcBef>
+        <a:buNone/>
+        <a:defRPr sz="4400" kern="1200">
+          <a:solidFill>
+            <a:schemeClr val="tx1"/>
+          </a:solidFill>
+          <a:latin typeface="+mj-lt"/>
+          <a:ea typeface="+mj-ea"/>
+          <a:cs typeface="+mj-cs"/>
+        </a:defRPr>
+      </a:lvl1pPr>
+    </p:titleStyle>
+    <p:bodyStyle>
+      <a:lvl1pPr marL="228600" indent="-228600" algn="l" defTabSz="914400" rtl="0" eaLnBrk="1" latinLnBrk="0" hangingPunct="1">
+        <a:lnSpc>
+          <a:spcPct val="90000"/>
+        </a:lnSpc>
+        <a:spcBef>
+          <a:spcPts val="1000"/>
+        </a:spcBef>
+        <a:buFont typeface="Arial" panose="020B0604020202020204" pitchFamily="34" charset="0"/>
+        <a:buChar char="•"/>
+        <a:defRPr sz="2800" kern="1200">
+          <a:solidFill>
+            <a:schemeClr val="tx1"/>
+          </a:solidFill>
+          <a:latin typeface="+mn-lt"/>
+          <a:ea typeface="+mn-ea"/>
+          <a:cs typeface="+mn-cs"/>
+        </a:defRPr>
+      </a:lvl1pPr>
+      <a:lvl2pPr marL="685800" indent="-228600" algn="l" defTabSz="914400" rtl="0" eaLnBrk="1" latinLnBrk="0" hangingPunct="1">
+        <a:lnSpc>
+          <a:spcPct val="90000"/>
+        </a:lnSpc>
+        <a:spcBef>
+          <a:spcPts val="500"/>
+        </a:spcBef>
+        <a:buFont typeface="Arial" panose="020B0604020202020204" pitchFamily="34" charset="0"/>
+        <a:buChar char="•"/>
+        <a:defRPr sz="2400" kern="1200">
+          <a:solidFill>
+            <a:schemeClr val="tx1"/>
+          </a:solidFill>
+          <a:latin typeface="+mn-lt"/>
+          <a:ea typeface="+mn-ea"/>
+          <a:cs typeface="+mn-cs"/>
+        </a:defRPr>
+      </a:lvl2pPr>
+      <a:lvl3pPr marL="1143000" indent="-228600" algn="l" defTabSz="914400" rtl="0" eaLnBrk="1" latinLnBrk="0" hangingPunct="1">
+        <a:lnSpc>
+          <a:spcPct val="90000"/>
+        </a:lnSpc>
+        <a:spcBef>
+          <a:spcPts val="500"/>
+        </a:spcBef>
+        <a:buFont typeface="Arial" panose="020B0604020202020204" pitchFamily="34" charset="0"/>
+        <a:buChar char="•"/>
+        <a:defRPr sz="2000" kern="1200">
+          <a:solidFill>
+            <a:schemeClr val="tx1"/>
+          </a:solidFill>
+          <a:latin typeface="+mn-lt"/>
+          <a:ea typeface="+mn-ea"/>
+          <a:cs typeface="+mn-cs"/>
+        </a:defRPr>
+      </a:lvl3pPr>
+      <a:lvl4pPr marL="1600200" indent="-228600" algn="l" defTabSz="914400" rtl="0" eaLnBrk="1" latinLnBrk="0" hangingPunct="1">
+        <a:lnSpc>
+          <a:spcPct val="90000"/>
+        </a:lnSpc>
+        <a:spcBef>
+          <a:spcPts val="500"/>
+        </a:spcBef>
+        <a:buFont typeface="Arial" panose="020B0604020202020204" pitchFamily="34" charset="0"/>
+        <a:buChar char="•"/>
+        <a:defRPr sz="1800" kern="1200">
+          <a:solidFill>
+            <a:schemeClr val="tx1"/>
+          </a:solidFill>
+          <a:latin typeface="+mn-lt"/>
+          <a:ea typeface="+mn-ea"/>
+          <a:cs typeface="+mn-cs"/>
+        </a:defRPr>
+      </a:lvl4pPr>
+      <a:lvl5pPr marL="2057400" indent="-228600" algn="l" defTabSz="914400" rtl="0" eaLnBrk="1" latinLnBrk="0" hangingPunct="1">
+        <a:lnSpc>
+          <a:spcPct val="90000"/>
+        </a:lnSpc>
+        <a:spcBef>
+          <a:spcPts val="500"/>
+        </a:spcBef>
+        <a:buFont typeface="Arial" panose="020B0604020202020204" pitchFamily="34" charset="0"/>
+        <a:buChar char="•"/>
+        <a:defRPr sz="1800" kern="1200">
+          <a:solidFill>
+            <a:schemeClr val="tx1"/>
+          </a:solidFill>
+          <a:latin typeface="+mn-lt"/>
+          <a:ea typeface="+mn-ea"/>
+          <a:cs typeface="+mn-cs"/>
+        </a:defRPr>
+      </a:lvl5pPr>
+      <a:lvl6pPr marL="2514600" indent="-228600" algn="l" defTabSz="914400" rtl="0" eaLnBrk="1" latinLnBrk="0" hangingPunct="1">
+        <a:lnSpc>
+          <a:spcPct val="90000"/>
+        </a:lnSpc>
+        <a:spcBef>
+          <a:spcPts val="500"/>
+        </a:spcBef>
+        <a:buFont typeface="Arial" panose="020B0604020202020204" pitchFamily="34" charset="0"/>
+        <a:buChar char="•"/>
+        <a:defRPr sz="1800" kern="1200">
+          <a:solidFill>
+            <a:schemeClr val="tx1"/>
+          </a:solidFill>
+          <a:latin typeface="+mn-lt"/>
+          <a:ea typeface="+mn-ea"/>
+          <a:cs typeface="+mn-cs"/>
+        </a:defRPr>
+      </a:lvl6pPr>
+      <a:lvl7pPr marL="2971800" indent="-228600" algn="l" defTabSz="914400" rtl="0" eaLnBrk="1" latinLnBrk="0" hangingPunct="1">
+        <a:lnSpc>
+          <a:spcPct val="90000"/>
+        </a:lnSpc>
+        <a:spcBef>
+          <a:spcPts val="500"/>
+        </a:spcBef>
+        <a:buFont typeface="Arial" panose="020B0604020202020204" pitchFamily="34" charset="0"/>
+        <a:buChar char="•"/>
+        <a:defRPr sz="1800" kern="1200">
+          <a:solidFill>
+            <a:schemeClr val="tx1"/>
+          </a:solidFill>
+          <a:latin typeface="+mn-lt"/>
+          <a:ea typeface="+mn-ea"/>
+          <a:cs typeface="+mn-cs"/>
+        </a:defRPr>
+      </a:lvl7pPr>
+      <a:lvl8pPr marL="3429000" indent="-228600" algn="l" defTabSz="914400" rtl="0" eaLnBrk="1" latinLnBrk="0" hangingPunct="1">
+        <a:lnSpc>
+          <a:spcPct val="90000"/>
+        </a:lnSpc>
+        <a:spcBef>
+          <a:spcPts val="500"/>
+        </a:spcBef>
+        <a:buFont typeface="Arial" panose="020B0604020202020204" pitchFamily="34" charset="0"/>
+        <a:buChar char="•"/>
+        <a:defRPr sz="1800" kern="1200">
+          <a:solidFill>
+            <a:schemeClr val="tx1"/>
+          </a:solidFill>
+          <a:latin typeface="+mn-lt"/>
+          <a:ea typeface="+mn-ea"/>
+          <a:cs typeface="+mn-cs"/>
+        </a:defRPr>
+      </a:lvl8pPr>
+      <a:lvl9pPr marL="3886200" indent="-228600" algn="l" defTabSz="914400" rtl="0" eaLnBrk="1" latinLnBrk="0" hangingPunct="1">
+        <a:lnSpc>
+          <a:spcPct val="90000"/>
+        </a:lnSpc>
+        <a:spcBef>
+          <a:spcPts val="500"/>
+        </a:spcBef>
+        <a:buFont typeface="Arial" panose="020B0604020202020204" pitchFamily="34" charset="0"/>
+        <a:buChar char="•"/>
+        <a:defRPr sz="1800" kern="1200">
+          <a:solidFill>
+            <a:schemeClr val="tx1"/>
+          </a:solidFill>
+          <a:latin typeface="+mn-lt"/>
+          <a:ea typeface="+mn-ea"/>
+          <a:cs typeface="+mn-cs"/>
+        </a:defRPr>
+      </a:lvl9pPr>
+    </p:bodyStyle>
+    <p:otherStyle>
+      <a:defPPr>
+        <a:defRPr lang="en-US"/>
+      </a:defPPr>
+      <a:lvl1pPr marL="0" algn="l" defTabSz="914400" rtl="0" eaLnBrk="1" latinLnBrk="0" hangingPunct="1">
+        <a:defRPr sz="1800" kern="1200">
+          <a:solidFill>
+            <a:schemeClr val="tx1"/>
+          </a:solidFill>
+          <a:latin typeface="+mn-lt"/>
+          <a:ea typeface="+mn-ea"/>
+          <a:cs typeface="+mn-cs"/>
+        </a:defRPr>
+      </a:lvl1pPr>
+      <a:lvl2pPr marL="457200" algn="l" defTabSz="914400" rtl="0" eaLnBrk="1" latinLnBrk="0" hangingPunct="1">
+        <a:defRPr sz="1800" kern="1200">
+          <a:solidFill>
+            <a:schemeClr val="tx1"/>
+          </a:solidFill>
+          <a:latin typeface="+mn-lt"/>
+          <a:ea typeface="+mn-ea"/>
+          <a:cs typeface="+mn-cs"/>
+        </a:defRPr>
+      </a:lvl2pPr>
+      <a:lvl3pPr marL="914400" algn="l" defTabSz="914400" rtl="0" eaLnBrk="1" latinLnBrk="0" hangingPunct="1">
+        <a:defRPr sz="1800" kern="1200">
+          <a:solidFill>
+            <a:schemeClr val="tx1"/>
+          </a:solidFill>
+          <a:latin typeface="+mn-lt"/>
+          <a:ea typeface="+mn-ea"/>
+          <a:cs typeface="+mn-cs"/>
+        </a:defRPr>
+      </a:lvl3pPr>
+      <a:lvl4pPr marL="1371600" algn="l" defTabSz="914400" rtl="0" eaLnBrk="1" latinLnBrk="0" hangingPunct="1">
+        <a:defRPr sz="1800" kern="1200">
+          <a:solidFill>
+            <a:schemeClr val="tx1"/>
+          </a:solidFill>
+          <a:latin typeface="+mn-lt"/>
+          <a:ea typeface="+mn-ea"/>
+          <a:cs typeface="+mn-cs"/>
+        </a:defRPr>
+      </a:lvl4pPr>
+      <a:lvl5pPr marL="1828800" algn="l" defTabSz="914400" rtl="0" eaLnBrk="1" latinLnBrk="0" hangingPunct="1">
+        <a:defRPr sz="1800" kern="1200">
+          <a:solidFill>
+            <a:schemeClr val="tx1"/>
+          </a:solidFill>
+          <a:latin typeface="+mn-lt"/>
+          <a:ea typeface="+mn-ea"/>
+          <a:cs typeface="+mn-cs"/>
+        </a:defRPr>
+      </a:lvl5pPr>
+      <a:lvl6pPr marL="2286000" algn="l" defTabSz="914400" rtl="0" eaLnBrk="1" latinLnBrk="0" hangingPunct="1">
+        <a:defRPr sz="1800" kern="1200">
+          <a:solidFill>
+            <a:schemeClr val="tx1"/>
+          </a:solidFill>
+          <a:latin typeface="+mn-lt"/>
+          <a:ea typeface="+mn-ea"/>
+          <a:cs typeface="+mn-cs"/>
+        </a:defRPr>
+      </a:lvl6pPr>
+      <a:lvl7pPr marL="2743200" algn="l" defTabSz="914400" rtl="0" eaLnBrk="1" latinLnBrk="0" hangingPunct="1">
+        <a:defRPr sz="1800" kern="1200">
+          <a:solidFill>
+            <a:schemeClr val="tx1"/>
+          </a:solidFill>
+          <a:latin typeface="+mn-lt"/>
+          <a:ea typeface="+mn-ea"/>
+          <a:cs typeface="+mn-cs"/>
+        </a:defRPr>
+      </a:lvl7pPr>
+      <a:lvl8pPr marL="3200400" algn="l" defTabSz="914400" rtl="0" eaLnBrk="1" latinLnBrk="0" hangingPunct="1">
+        <a:defRPr sz="1800" kern="1200">
+          <a:solidFill>
+            <a:schemeClr val="tx1"/>
+          </a:solidFill>
+          <a:latin typeface="+mn-lt"/>
+          <a:ea typeface="+mn-ea"/>
+          <a:cs typeface="+mn-cs"/>
+        </a:defRPr>
+      </a:lvl8pPr>
+      <a:lvl9pPr marL="3657600" algn="l" defTabSz="914400" rtl="0" eaLnBrk="1" latinLnBrk="0" hangingPunct="1">
+        <a:defRPr sz="1800" kern="1200">
+          <a:solidFill>
+            <a:schemeClr val="tx1"/>
+          </a:solidFill>
+          <a:latin typeface="+mn-lt"/>
+          <a:ea typeface="+mn-ea"/>
+          <a:cs typeface="+mn-cs"/>
+        </a:defRPr>
+      </a:lvl9pPr>
+    </p:otherStyle>
+  </p:txStyles>
 </p:sldMaster>
 </file>
 
 <file path=ppt/slideMasters/slideMaster2.xml><?xml version="1.0" encoding="utf-8"?>
-<p:sldMaster xmlns:a="http://schemas.openxmlformats.org/drawingml/2006/main" xmlns:p="http://schemas.openxmlformats.org/presentationml/2006/main" xmlns:r="http://schemas.openxmlformats.org/officeDocument/2006/relationships">
+<p:sldMaster xmlns:a="http://schemas.openxmlformats.org/drawingml/2006/main" xmlns:r="http://schemas.openxmlformats.org/officeDocument/2006/relationships" xmlns:p="http://schemas.openxmlformats.org/presentationml/2006/main">
   <p:cSld>
+    <p:bg>
+      <p:bgRef idx="1001">
+        <a:schemeClr val="bg1"/>
+      </p:bgRef>
+    </p:bg>
     <p:spTree>
       <p:nvGrpSpPr>
         <p:cNvPr id="1" name=""/>
@@ -2670,12 +3196,12 @@
       </p:grpSpPr>
       <p:pic>
         <p:nvPicPr>
-          <p:cNvPr id="39" name="" descr=""/>
+          <p:cNvPr id="39" name="Picture 38"/>
           <p:cNvPicPr/>
           <p:nvPr/>
         </p:nvPicPr>
         <p:blipFill>
-          <a:blip r:embed="rId2"/>
+          <a:blip r:embed="rId14"/>
           <a:stretch/>
         </p:blipFill>
         <p:spPr>
@@ -2711,7 +3237,8 @@
           </a:prstGeom>
         </p:spPr>
         <p:txBody>
-          <a:bodyPr lIns="0" rIns="0" tIns="0" bIns="0" anchor="ctr"/>
+          <a:bodyPr lIns="0" tIns="0" rIns="0" bIns="0" anchor="ctr"/>
+          <a:lstStyle/>
           <a:p>
             <a:pPr algn="ctr"/>
             <a:r>
@@ -2744,11 +3271,12 @@
           </a:prstGeom>
         </p:spPr>
         <p:txBody>
-          <a:bodyPr lIns="0" rIns="0" tIns="0" bIns="0"/>
+          <a:bodyPr lIns="0" tIns="0" rIns="0" bIns="0"/>
+          <a:lstStyle/>
           <a:p>
             <a:pPr marL="432000" indent="-324000">
               <a:buClr>
-                <a:srgbClr val="ffffff"/>
+                <a:srgbClr val="FFFFFF"/>
               </a:buClr>
               <a:buSzPct val="45000"/>
               <a:buFont typeface="Wingdings" charset="2"/>
@@ -2763,9 +3291,9 @@
             <a:endParaRPr/>
           </a:p>
           <a:p>
-            <a:pPr lvl="1" marL="864000" indent="-324000">
+            <a:pPr marL="864000" lvl="1" indent="-324000">
               <a:buClr>
-                <a:srgbClr val="ffffff"/>
+                <a:srgbClr val="FFFFFF"/>
               </a:buClr>
               <a:buSzPct val="75000"/>
               <a:buFont typeface="Symbol" charset="2"/>
@@ -2780,9 +3308,9 @@
             <a:endParaRPr/>
           </a:p>
           <a:p>
-            <a:pPr lvl="2" marL="1296000" indent="-288000">
+            <a:pPr marL="1296000" lvl="2" indent="-288000">
               <a:buClr>
-                <a:srgbClr val="ffffff"/>
+                <a:srgbClr val="FFFFFF"/>
               </a:buClr>
               <a:buSzPct val="45000"/>
               <a:buFont typeface="Wingdings" charset="2"/>
@@ -2797,9 +3325,9 @@
             <a:endParaRPr/>
           </a:p>
           <a:p>
-            <a:pPr lvl="3" marL="1728000" indent="-216000">
+            <a:pPr marL="1728000" lvl="3" indent="-216000">
               <a:buClr>
-                <a:srgbClr val="ffffff"/>
+                <a:srgbClr val="FFFFFF"/>
               </a:buClr>
               <a:buSzPct val="75000"/>
               <a:buFont typeface="Symbol" charset="2"/>
@@ -2814,9 +3342,9 @@
             <a:endParaRPr/>
           </a:p>
           <a:p>
-            <a:pPr lvl="4" marL="2160000" indent="-216000">
+            <a:pPr marL="2160000" lvl="4" indent="-216000">
               <a:buClr>
-                <a:srgbClr val="ffffff"/>
+                <a:srgbClr val="FFFFFF"/>
               </a:buClr>
               <a:buSzPct val="45000"/>
               <a:buFont typeface="Wingdings" charset="2"/>
@@ -2831,9 +3359,9 @@
             <a:endParaRPr/>
           </a:p>
           <a:p>
-            <a:pPr lvl="5" marL="2592000" indent="-216000">
+            <a:pPr marL="2592000" lvl="5" indent="-216000">
               <a:buClr>
-                <a:srgbClr val="ffffff"/>
+                <a:srgbClr val="FFFFFF"/>
               </a:buClr>
               <a:buSzPct val="45000"/>
               <a:buFont typeface="Wingdings" charset="2"/>
@@ -2848,9 +3376,9 @@
             <a:endParaRPr/>
           </a:p>
           <a:p>
-            <a:pPr lvl="6" marL="3024000" indent="-216000">
+            <a:pPr marL="3024000" lvl="6" indent="-216000">
               <a:buClr>
-                <a:srgbClr val="ffffff"/>
+                <a:srgbClr val="FFFFFF"/>
               </a:buClr>
               <a:buSzPct val="45000"/>
               <a:buFont typeface="Wingdings" charset="2"/>
@@ -2886,7 +3414,8 @@
           </a:prstGeom>
         </p:spPr>
         <p:txBody>
-          <a:bodyPr lIns="0" rIns="0" tIns="0" bIns="0"/>
+          <a:bodyPr lIns="0" tIns="0" rIns="0" bIns="0"/>
+          <a:lstStyle/>
           <a:p>
             <a:r>
               <a:rPr lang="en-US" sz="1400" spc="-1">
@@ -2918,7 +3447,8 @@
           </a:prstGeom>
         </p:spPr>
         <p:txBody>
-          <a:bodyPr lIns="0" rIns="0" tIns="0" bIns="0"/>
+          <a:bodyPr lIns="0" tIns="0" rIns="0" bIns="0"/>
+          <a:lstStyle/>
           <a:p>
             <a:pPr algn="ctr"/>
             <a:r>
@@ -2951,14 +3481,15 @@
           </a:prstGeom>
         </p:spPr>
         <p:txBody>
-          <a:bodyPr lIns="0" rIns="0" tIns="0" bIns="0"/>
+          <a:bodyPr lIns="0" tIns="0" rIns="0" bIns="0"/>
+          <a:lstStyle/>
           <a:p>
             <a:pPr algn="r"/>
             <a:fld id="{C40B8B73-FE7F-4E9A-B92A-D0D5BCE8D2B0}" type="slidenum">
               <a:rPr lang="en-US" sz="1400" spc="-1">
                 <a:latin typeface="Times New Roman"/>
               </a:rPr>
-              <a:t>&lt;number&gt;</a:t>
+              <a:t>‹#›</a:t>
             </a:fld>
             <a:endParaRPr/>
           </a:p>
@@ -2966,26 +3497,306 @@
       </p:sp>
     </p:spTree>
   </p:cSld>
-  <p:clrMap bg1="lt1" bg2="lt2" tx1="dk1" tx2="dk2" accent1="accent1" accent2="accent2" accent3="accent3" accent4="accent4" accent5="accent5" accent6="accent6" hlink="hlink" folHlink="folHlink"/>
+  <p:clrMap bg1="lt1" tx1="dk1" bg2="lt2" tx2="dk2" accent1="accent1" accent2="accent2" accent3="accent3" accent4="accent4" accent5="accent5" accent6="accent6" hlink="hlink" folHlink="folHlink"/>
   <p:sldLayoutIdLst>
-    <p:sldLayoutId id="2147483662" r:id="rId3"/>
-    <p:sldLayoutId id="2147483663" r:id="rId4"/>
-    <p:sldLayoutId id="2147483664" r:id="rId5"/>
-    <p:sldLayoutId id="2147483665" r:id="rId6"/>
-    <p:sldLayoutId id="2147483666" r:id="rId7"/>
-    <p:sldLayoutId id="2147483667" r:id="rId8"/>
-    <p:sldLayoutId id="2147483668" r:id="rId9"/>
-    <p:sldLayoutId id="2147483669" r:id="rId10"/>
-    <p:sldLayoutId id="2147483670" r:id="rId11"/>
-    <p:sldLayoutId id="2147483671" r:id="rId12"/>
-    <p:sldLayoutId id="2147483672" r:id="rId13"/>
-    <p:sldLayoutId id="2147483673" r:id="rId14"/>
+    <p:sldLayoutId id="2147483662" r:id="rId1"/>
+    <p:sldLayoutId id="2147483663" r:id="rId2"/>
+    <p:sldLayoutId id="2147483664" r:id="rId3"/>
+    <p:sldLayoutId id="2147483665" r:id="rId4"/>
+    <p:sldLayoutId id="2147483666" r:id="rId5"/>
+    <p:sldLayoutId id="2147483667" r:id="rId6"/>
+    <p:sldLayoutId id="2147483668" r:id="rId7"/>
+    <p:sldLayoutId id="2147483669" r:id="rId8"/>
+    <p:sldLayoutId id="2147483670" r:id="rId9"/>
+    <p:sldLayoutId id="2147483671" r:id="rId10"/>
+    <p:sldLayoutId id="2147483672" r:id="rId11"/>
+    <p:sldLayoutId id="2147483673" r:id="rId12"/>
   </p:sldLayoutIdLst>
+  <p:txStyles>
+    <p:titleStyle>
+      <a:lvl1pPr algn="l" defTabSz="914400" rtl="0" eaLnBrk="1" latinLnBrk="0" hangingPunct="1">
+        <a:lnSpc>
+          <a:spcPct val="90000"/>
+        </a:lnSpc>
+        <a:spcBef>
+          <a:spcPct val="0"/>
+        </a:spcBef>
+        <a:buNone/>
+        <a:defRPr sz="4400" kern="1200">
+          <a:solidFill>
+            <a:schemeClr val="tx1"/>
+          </a:solidFill>
+          <a:latin typeface="+mj-lt"/>
+          <a:ea typeface="+mj-ea"/>
+          <a:cs typeface="+mj-cs"/>
+        </a:defRPr>
+      </a:lvl1pPr>
+    </p:titleStyle>
+    <p:bodyStyle>
+      <a:lvl1pPr marL="228600" indent="-228600" algn="l" defTabSz="914400" rtl="0" eaLnBrk="1" latinLnBrk="0" hangingPunct="1">
+        <a:lnSpc>
+          <a:spcPct val="90000"/>
+        </a:lnSpc>
+        <a:spcBef>
+          <a:spcPts val="1000"/>
+        </a:spcBef>
+        <a:buFont typeface="Arial" panose="020B0604020202020204" pitchFamily="34" charset="0"/>
+        <a:buChar char="•"/>
+        <a:defRPr sz="2800" kern="1200">
+          <a:solidFill>
+            <a:schemeClr val="tx1"/>
+          </a:solidFill>
+          <a:latin typeface="+mn-lt"/>
+          <a:ea typeface="+mn-ea"/>
+          <a:cs typeface="+mn-cs"/>
+        </a:defRPr>
+      </a:lvl1pPr>
+      <a:lvl2pPr marL="685800" indent="-228600" algn="l" defTabSz="914400" rtl="0" eaLnBrk="1" latinLnBrk="0" hangingPunct="1">
+        <a:lnSpc>
+          <a:spcPct val="90000"/>
+        </a:lnSpc>
+        <a:spcBef>
+          <a:spcPts val="500"/>
+        </a:spcBef>
+        <a:buFont typeface="Arial" panose="020B0604020202020204" pitchFamily="34" charset="0"/>
+        <a:buChar char="•"/>
+        <a:defRPr sz="2400" kern="1200">
+          <a:solidFill>
+            <a:schemeClr val="tx1"/>
+          </a:solidFill>
+          <a:latin typeface="+mn-lt"/>
+          <a:ea typeface="+mn-ea"/>
+          <a:cs typeface="+mn-cs"/>
+        </a:defRPr>
+      </a:lvl2pPr>
+      <a:lvl3pPr marL="1143000" indent="-228600" algn="l" defTabSz="914400" rtl="0" eaLnBrk="1" latinLnBrk="0" hangingPunct="1">
+        <a:lnSpc>
+          <a:spcPct val="90000"/>
+        </a:lnSpc>
+        <a:spcBef>
+          <a:spcPts val="500"/>
+        </a:spcBef>
+        <a:buFont typeface="Arial" panose="020B0604020202020204" pitchFamily="34" charset="0"/>
+        <a:buChar char="•"/>
+        <a:defRPr sz="2000" kern="1200">
+          <a:solidFill>
+            <a:schemeClr val="tx1"/>
+          </a:solidFill>
+          <a:latin typeface="+mn-lt"/>
+          <a:ea typeface="+mn-ea"/>
+          <a:cs typeface="+mn-cs"/>
+        </a:defRPr>
+      </a:lvl3pPr>
+      <a:lvl4pPr marL="1600200" indent="-228600" algn="l" defTabSz="914400" rtl="0" eaLnBrk="1" latinLnBrk="0" hangingPunct="1">
+        <a:lnSpc>
+          <a:spcPct val="90000"/>
+        </a:lnSpc>
+        <a:spcBef>
+          <a:spcPts val="500"/>
+        </a:spcBef>
+        <a:buFont typeface="Arial" panose="020B0604020202020204" pitchFamily="34" charset="0"/>
+        <a:buChar char="•"/>
+        <a:defRPr sz="1800" kern="1200">
+          <a:solidFill>
+            <a:schemeClr val="tx1"/>
+          </a:solidFill>
+          <a:latin typeface="+mn-lt"/>
+          <a:ea typeface="+mn-ea"/>
+          <a:cs typeface="+mn-cs"/>
+        </a:defRPr>
+      </a:lvl4pPr>
+      <a:lvl5pPr marL="2057400" indent="-228600" algn="l" defTabSz="914400" rtl="0" eaLnBrk="1" latinLnBrk="0" hangingPunct="1">
+        <a:lnSpc>
+          <a:spcPct val="90000"/>
+        </a:lnSpc>
+        <a:spcBef>
+          <a:spcPts val="500"/>
+        </a:spcBef>
+        <a:buFont typeface="Arial" panose="020B0604020202020204" pitchFamily="34" charset="0"/>
+        <a:buChar char="•"/>
+        <a:defRPr sz="1800" kern="1200">
+          <a:solidFill>
+            <a:schemeClr val="tx1"/>
+          </a:solidFill>
+          <a:latin typeface="+mn-lt"/>
+          <a:ea typeface="+mn-ea"/>
+          <a:cs typeface="+mn-cs"/>
+        </a:defRPr>
+      </a:lvl5pPr>
+      <a:lvl6pPr marL="2514600" indent="-228600" algn="l" defTabSz="914400" rtl="0" eaLnBrk="1" latinLnBrk="0" hangingPunct="1">
+        <a:lnSpc>
+          <a:spcPct val="90000"/>
+        </a:lnSpc>
+        <a:spcBef>
+          <a:spcPts val="500"/>
+        </a:spcBef>
+        <a:buFont typeface="Arial" panose="020B0604020202020204" pitchFamily="34" charset="0"/>
+        <a:buChar char="•"/>
+        <a:defRPr sz="1800" kern="1200">
+          <a:solidFill>
+            <a:schemeClr val="tx1"/>
+          </a:solidFill>
+          <a:latin typeface="+mn-lt"/>
+          <a:ea typeface="+mn-ea"/>
+          <a:cs typeface="+mn-cs"/>
+        </a:defRPr>
+      </a:lvl6pPr>
+      <a:lvl7pPr marL="2971800" indent="-228600" algn="l" defTabSz="914400" rtl="0" eaLnBrk="1" latinLnBrk="0" hangingPunct="1">
+        <a:lnSpc>
+          <a:spcPct val="90000"/>
+        </a:lnSpc>
+        <a:spcBef>
+          <a:spcPts val="500"/>
+        </a:spcBef>
+        <a:buFont typeface="Arial" panose="020B0604020202020204" pitchFamily="34" charset="0"/>
+        <a:buChar char="•"/>
+        <a:defRPr sz="1800" kern="1200">
+          <a:solidFill>
+            <a:schemeClr val="tx1"/>
+          </a:solidFill>
+          <a:latin typeface="+mn-lt"/>
+          <a:ea typeface="+mn-ea"/>
+          <a:cs typeface="+mn-cs"/>
+        </a:defRPr>
+      </a:lvl7pPr>
+      <a:lvl8pPr marL="3429000" indent="-228600" algn="l" defTabSz="914400" rtl="0" eaLnBrk="1" latinLnBrk="0" hangingPunct="1">
+        <a:lnSpc>
+          <a:spcPct val="90000"/>
+        </a:lnSpc>
+        <a:spcBef>
+          <a:spcPts val="500"/>
+        </a:spcBef>
+        <a:buFont typeface="Arial" panose="020B0604020202020204" pitchFamily="34" charset="0"/>
+        <a:buChar char="•"/>
+        <a:defRPr sz="1800" kern="1200">
+          <a:solidFill>
+            <a:schemeClr val="tx1"/>
+          </a:solidFill>
+          <a:latin typeface="+mn-lt"/>
+          <a:ea typeface="+mn-ea"/>
+          <a:cs typeface="+mn-cs"/>
+        </a:defRPr>
+      </a:lvl8pPr>
+      <a:lvl9pPr marL="3886200" indent="-228600" algn="l" defTabSz="914400" rtl="0" eaLnBrk="1" latinLnBrk="0" hangingPunct="1">
+        <a:lnSpc>
+          <a:spcPct val="90000"/>
+        </a:lnSpc>
+        <a:spcBef>
+          <a:spcPts val="500"/>
+        </a:spcBef>
+        <a:buFont typeface="Arial" panose="020B0604020202020204" pitchFamily="34" charset="0"/>
+        <a:buChar char="•"/>
+        <a:defRPr sz="1800" kern="1200">
+          <a:solidFill>
+            <a:schemeClr val="tx1"/>
+          </a:solidFill>
+          <a:latin typeface="+mn-lt"/>
+          <a:ea typeface="+mn-ea"/>
+          <a:cs typeface="+mn-cs"/>
+        </a:defRPr>
+      </a:lvl9pPr>
+    </p:bodyStyle>
+    <p:otherStyle>
+      <a:defPPr>
+        <a:defRPr lang="en-US"/>
+      </a:defPPr>
+      <a:lvl1pPr marL="0" algn="l" defTabSz="914400" rtl="0" eaLnBrk="1" latinLnBrk="0" hangingPunct="1">
+        <a:defRPr sz="1800" kern="1200">
+          <a:solidFill>
+            <a:schemeClr val="tx1"/>
+          </a:solidFill>
+          <a:latin typeface="+mn-lt"/>
+          <a:ea typeface="+mn-ea"/>
+          <a:cs typeface="+mn-cs"/>
+        </a:defRPr>
+      </a:lvl1pPr>
+      <a:lvl2pPr marL="457200" algn="l" defTabSz="914400" rtl="0" eaLnBrk="1" latinLnBrk="0" hangingPunct="1">
+        <a:defRPr sz="1800" kern="1200">
+          <a:solidFill>
+            <a:schemeClr val="tx1"/>
+          </a:solidFill>
+          <a:latin typeface="+mn-lt"/>
+          <a:ea typeface="+mn-ea"/>
+          <a:cs typeface="+mn-cs"/>
+        </a:defRPr>
+      </a:lvl2pPr>
+      <a:lvl3pPr marL="914400" algn="l" defTabSz="914400" rtl="0" eaLnBrk="1" latinLnBrk="0" hangingPunct="1">
+        <a:defRPr sz="1800" kern="1200">
+          <a:solidFill>
+            <a:schemeClr val="tx1"/>
+          </a:solidFill>
+          <a:latin typeface="+mn-lt"/>
+          <a:ea typeface="+mn-ea"/>
+          <a:cs typeface="+mn-cs"/>
+        </a:defRPr>
+      </a:lvl3pPr>
+      <a:lvl4pPr marL="1371600" algn="l" defTabSz="914400" rtl="0" eaLnBrk="1" latinLnBrk="0" hangingPunct="1">
+        <a:defRPr sz="1800" kern="1200">
+          <a:solidFill>
+            <a:schemeClr val="tx1"/>
+          </a:solidFill>
+          <a:latin typeface="+mn-lt"/>
+          <a:ea typeface="+mn-ea"/>
+          <a:cs typeface="+mn-cs"/>
+        </a:defRPr>
+      </a:lvl4pPr>
+      <a:lvl5pPr marL="1828800" algn="l" defTabSz="914400" rtl="0" eaLnBrk="1" latinLnBrk="0" hangingPunct="1">
+        <a:defRPr sz="1800" kern="1200">
+          <a:solidFill>
+            <a:schemeClr val="tx1"/>
+          </a:solidFill>
+          <a:latin typeface="+mn-lt"/>
+          <a:ea typeface="+mn-ea"/>
+          <a:cs typeface="+mn-cs"/>
+        </a:defRPr>
+      </a:lvl5pPr>
+      <a:lvl6pPr marL="2286000" algn="l" defTabSz="914400" rtl="0" eaLnBrk="1" latinLnBrk="0" hangingPunct="1">
+        <a:defRPr sz="1800" kern="1200">
+          <a:solidFill>
+            <a:schemeClr val="tx1"/>
+          </a:solidFill>
+          <a:latin typeface="+mn-lt"/>
+          <a:ea typeface="+mn-ea"/>
+          <a:cs typeface="+mn-cs"/>
+        </a:defRPr>
+      </a:lvl6pPr>
+      <a:lvl7pPr marL="2743200" algn="l" defTabSz="914400" rtl="0" eaLnBrk="1" latinLnBrk="0" hangingPunct="1">
+        <a:defRPr sz="1800" kern="1200">
+          <a:solidFill>
+            <a:schemeClr val="tx1"/>
+          </a:solidFill>
+          <a:latin typeface="+mn-lt"/>
+          <a:ea typeface="+mn-ea"/>
+          <a:cs typeface="+mn-cs"/>
+        </a:defRPr>
+      </a:lvl7pPr>
+      <a:lvl8pPr marL="3200400" algn="l" defTabSz="914400" rtl="0" eaLnBrk="1" latinLnBrk="0" hangingPunct="1">
+        <a:defRPr sz="1800" kern="1200">
+          <a:solidFill>
+            <a:schemeClr val="tx1"/>
+          </a:solidFill>
+          <a:latin typeface="+mn-lt"/>
+          <a:ea typeface="+mn-ea"/>
+          <a:cs typeface="+mn-cs"/>
+        </a:defRPr>
+      </a:lvl8pPr>
+      <a:lvl9pPr marL="3657600" algn="l" defTabSz="914400" rtl="0" eaLnBrk="1" latinLnBrk="0" hangingPunct="1">
+        <a:defRPr sz="1800" kern="1200">
+          <a:solidFill>
+            <a:schemeClr val="tx1"/>
+          </a:solidFill>
+          <a:latin typeface="+mn-lt"/>
+          <a:ea typeface="+mn-ea"/>
+          <a:cs typeface="+mn-cs"/>
+        </a:defRPr>
+      </a:lvl9pPr>
+    </p:otherStyle>
+  </p:txStyles>
 </p:sldMaster>
 </file>
 
 <file path=ppt/slides/slide1.xml><?xml version="1.0" encoding="utf-8"?>
-<p:sld xmlns:a="http://schemas.openxmlformats.org/drawingml/2006/main" xmlns:p="http://schemas.openxmlformats.org/presentationml/2006/main" xmlns:r="http://schemas.openxmlformats.org/officeDocument/2006/relationships">
+<p:sld xmlns:a="http://schemas.openxmlformats.org/drawingml/2006/main" xmlns:r="http://schemas.openxmlformats.org/officeDocument/2006/relationships" xmlns:p="http://schemas.openxmlformats.org/presentationml/2006/main">
   <p:cSld>
     <p:spTree>
       <p:nvGrpSpPr>
@@ -3021,7 +3832,8 @@
           </a:ln>
         </p:spPr>
         <p:txBody>
-          <a:bodyPr lIns="0" rIns="0" tIns="0" bIns="0" anchor="ctr"/>
+          <a:bodyPr lIns="0" tIns="0" rIns="0" bIns="0" anchor="ctr"/>
+          <a:lstStyle/>
           <a:p>
             <a:pPr algn="ctr"/>
             <a:r>
@@ -3054,20 +3866,15 @@
           </a:ln>
         </p:spPr>
         <p:txBody>
-          <a:bodyPr lIns="0" rIns="0" tIns="0" bIns="0"/>
+          <a:bodyPr lIns="0" tIns="0" rIns="0" bIns="0"/>
+          <a:lstStyle/>
           <a:p>
             <a:pPr algn="ctr" rtl="1"/>
             <a:r>
               <a:rPr lang="en-US" sz="7200" spc="-1">
                 <a:latin typeface="Vazir"/>
               </a:rPr>
-              <a:t>مدل </a:t>
-            </a:r>
-            <a:r>
-              <a:rPr lang="en-US" sz="7200" spc="-1">
-                <a:latin typeface="Vazir"/>
-              </a:rPr>
-              <a:t>OSI</a:t>
+              <a:t>مدل OSI</a:t>
             </a:r>
             <a:endParaRPr/>
           </a:p>
@@ -3075,11 +3882,21 @@
       </p:sp>
     </p:spTree>
   </p:cSld>
+  <p:clrMapOvr>
+    <a:masterClrMapping/>
+  </p:clrMapOvr>
+  <p:timing>
+    <p:tnLst>
+      <p:par>
+        <p:cTn id="1" dur="indefinite" restart="never" nodeType="tmRoot"/>
+      </p:par>
+    </p:tnLst>
+  </p:timing>
 </p:sld>
 </file>
 
 <file path=ppt/slides/slide10.xml><?xml version="1.0" encoding="utf-8"?>
-<p:sld xmlns:a="http://schemas.openxmlformats.org/drawingml/2006/main" xmlns:p="http://schemas.openxmlformats.org/presentationml/2006/main" xmlns:r="http://schemas.openxmlformats.org/officeDocument/2006/relationships">
+<p:sld xmlns:a="http://schemas.openxmlformats.org/drawingml/2006/main" xmlns:r="http://schemas.openxmlformats.org/officeDocument/2006/relationships" xmlns:p="http://schemas.openxmlformats.org/presentationml/2006/main">
   <p:cSld>
     <p:spTree>
       <p:nvGrpSpPr>
@@ -3115,20 +3932,15 @@
           </a:ln>
         </p:spPr>
         <p:txBody>
-          <a:bodyPr lIns="0" rIns="0" tIns="0" bIns="0" anchor="ctr"/>
+          <a:bodyPr lIns="0" tIns="0" rIns="0" bIns="0" anchor="ctr"/>
+          <a:lstStyle/>
           <a:p>
             <a:pPr algn="ctr" rtl="1"/>
             <a:r>
               <a:rPr lang="en-US" sz="3600" spc="-1">
                 <a:latin typeface="Vazir"/>
               </a:rPr>
-              <a:t>۲</a:t>
-            </a:r>
-            <a:r>
-              <a:rPr lang="en-US" sz="3600" spc="-1">
-                <a:latin typeface="Vazir"/>
-              </a:rPr>
-              <a:t>- پیوند داده: کنترل جریان</a:t>
+              <a:t>۲- پیوند داده: کنترل جریان</a:t>
             </a:r>
             <a:endParaRPr/>
           </a:p>
@@ -3136,12 +3948,12 @@
       </p:sp>
       <p:pic>
         <p:nvPicPr>
-          <p:cNvPr id="103" name="" descr=""/>
+          <p:cNvPr id="103" name="Picture 102"/>
           <p:cNvPicPr/>
           <p:nvPr/>
         </p:nvPicPr>
         <p:blipFill>
-          <a:blip r:embed="rId1"/>
+          <a:blip r:embed="rId2"/>
           <a:stretch/>
         </p:blipFill>
         <p:spPr>
@@ -3177,11 +3989,12 @@
           </a:ln>
         </p:spPr>
         <p:txBody>
-          <a:bodyPr lIns="90000" rIns="90000" tIns="45000" bIns="45000"/>
+          <a:bodyPr lIns="90000" tIns="45000" rIns="90000" bIns="45000"/>
+          <a:lstStyle/>
           <a:p>
             <a:pPr marL="216000" indent="-216000" algn="r" rtl="1">
               <a:buClr>
-                <a:srgbClr val="ffffff"/>
+                <a:srgbClr val="FFFFFF"/>
               </a:buClr>
               <a:buSzPct val="45000"/>
               <a:buFont typeface="Wingdings" charset="2"/>
@@ -3198,7 +4011,7 @@
           <a:p>
             <a:pPr marL="216000" indent="-216000" algn="r" rtl="1">
               <a:buClr>
-                <a:srgbClr val="ffffff"/>
+                <a:srgbClr val="FFFFFF"/>
               </a:buClr>
               <a:buSzPct val="45000"/>
               <a:buFont typeface="Wingdings" charset="2"/>
@@ -3216,11 +4029,21 @@
       </p:sp>
     </p:spTree>
   </p:cSld>
+  <p:clrMapOvr>
+    <a:masterClrMapping/>
+  </p:clrMapOvr>
+  <p:timing>
+    <p:tnLst>
+      <p:par>
+        <p:cTn id="1" dur="indefinite" restart="never" nodeType="tmRoot"/>
+      </p:par>
+    </p:tnLst>
+  </p:timing>
 </p:sld>
 </file>
 
 <file path=ppt/slides/slide11.xml><?xml version="1.0" encoding="utf-8"?>
-<p:sld xmlns:a="http://schemas.openxmlformats.org/drawingml/2006/main" xmlns:p="http://schemas.openxmlformats.org/presentationml/2006/main" xmlns:r="http://schemas.openxmlformats.org/officeDocument/2006/relationships">
+<p:sld xmlns:a="http://schemas.openxmlformats.org/drawingml/2006/main" xmlns:r="http://schemas.openxmlformats.org/officeDocument/2006/relationships" xmlns:p="http://schemas.openxmlformats.org/presentationml/2006/main">
   <p:cSld>
     <p:spTree>
       <p:nvGrpSpPr>
@@ -3256,20 +4079,15 @@
           </a:ln>
         </p:spPr>
         <p:txBody>
-          <a:bodyPr lIns="0" rIns="0" tIns="0" bIns="0" anchor="ctr"/>
+          <a:bodyPr lIns="0" tIns="0" rIns="0" bIns="0" anchor="ctr"/>
+          <a:lstStyle/>
           <a:p>
             <a:pPr algn="ctr" rtl="1"/>
             <a:r>
               <a:rPr lang="en-US" sz="3600" spc="-1">
                 <a:latin typeface="Vazir"/>
               </a:rPr>
-              <a:t>۱</a:t>
-            </a:r>
-            <a:r>
-              <a:rPr lang="en-US" sz="3600" spc="-1">
-                <a:latin typeface="Vazir"/>
-              </a:rPr>
-              <a:t>- فیزیکی: ارسال از طریق رسانه‌های انتقال</a:t>
+              <a:t>۱- فیزیکی: ارسال از طریق رسانه‌های انتقال</a:t>
             </a:r>
             <a:endParaRPr/>
           </a:p>
@@ -3277,12 +4095,12 @@
       </p:sp>
       <p:pic>
         <p:nvPicPr>
-          <p:cNvPr id="106" name="" descr=""/>
+          <p:cNvPr id="106" name="Picture 105"/>
           <p:cNvPicPr/>
           <p:nvPr/>
         </p:nvPicPr>
         <p:blipFill>
-          <a:blip r:embed="rId1"/>
+          <a:blip r:embed="rId2"/>
           <a:stretch/>
         </p:blipFill>
         <p:spPr>
@@ -3318,11 +4136,12 @@
           </a:ln>
         </p:spPr>
         <p:txBody>
-          <a:bodyPr lIns="90000" rIns="90000" tIns="45000" bIns="45000"/>
+          <a:bodyPr lIns="90000" tIns="45000" rIns="90000" bIns="45000"/>
+          <a:lstStyle/>
           <a:p>
             <a:pPr marL="216000" indent="-216000" algn="r" rtl="1">
               <a:buClr>
-                <a:srgbClr val="ffffff"/>
+                <a:srgbClr val="FFFFFF"/>
               </a:buClr>
               <a:buSzPct val="45000"/>
               <a:buFont typeface="Wingdings" charset="2"/>
@@ -3340,11 +4159,21 @@
       </p:sp>
     </p:spTree>
   </p:cSld>
+  <p:clrMapOvr>
+    <a:masterClrMapping/>
+  </p:clrMapOvr>
+  <p:timing>
+    <p:tnLst>
+      <p:par>
+        <p:cTn id="1" dur="indefinite" restart="never" nodeType="tmRoot"/>
+      </p:par>
+    </p:tnLst>
+  </p:timing>
 </p:sld>
 </file>
 
 <file path=ppt/slides/slide12.xml><?xml version="1.0" encoding="utf-8"?>
-<p:sld xmlns:a="http://schemas.openxmlformats.org/drawingml/2006/main" xmlns:p="http://schemas.openxmlformats.org/presentationml/2006/main" xmlns:r="http://schemas.openxmlformats.org/officeDocument/2006/relationships">
+<p:sld xmlns:a="http://schemas.openxmlformats.org/drawingml/2006/main" xmlns:r="http://schemas.openxmlformats.org/officeDocument/2006/relationships" xmlns:p="http://schemas.openxmlformats.org/presentationml/2006/main">
   <p:cSld>
     <p:spTree>
       <p:nvGrpSpPr>
@@ -3380,20 +4209,15 @@
           </a:ln>
         </p:spPr>
         <p:txBody>
-          <a:bodyPr lIns="0" rIns="0" tIns="0" bIns="0" anchor="ctr"/>
+          <a:bodyPr lIns="0" tIns="0" rIns="0" bIns="0" anchor="ctr"/>
+          <a:lstStyle/>
           <a:p>
             <a:pPr algn="ctr" rtl="1"/>
             <a:r>
               <a:rPr lang="en-US" sz="3600" spc="-1">
                 <a:latin typeface="Vazir"/>
               </a:rPr>
-              <a:t>۱</a:t>
-            </a:r>
-            <a:r>
-              <a:rPr lang="en-US" sz="3600" spc="-1">
-                <a:latin typeface="Vazir"/>
-              </a:rPr>
-              <a:t>- فیزیکی: دریافت</a:t>
+              <a:t>۱- فیزیکی: دریافت</a:t>
             </a:r>
             <a:endParaRPr/>
           </a:p>
@@ -3401,12 +4225,12 @@
       </p:sp>
       <p:pic>
         <p:nvPicPr>
-          <p:cNvPr id="109" name="" descr=""/>
+          <p:cNvPr id="109" name="Picture 108"/>
           <p:cNvPicPr/>
           <p:nvPr/>
         </p:nvPicPr>
         <p:blipFill>
-          <a:blip r:embed="rId1"/>
+          <a:blip r:embed="rId2"/>
           <a:stretch/>
         </p:blipFill>
         <p:spPr>
@@ -3442,11 +4266,12 @@
           </a:ln>
         </p:spPr>
         <p:txBody>
-          <a:bodyPr lIns="90000" rIns="90000" tIns="45000" bIns="45000"/>
+          <a:bodyPr lIns="90000" tIns="45000" rIns="90000" bIns="45000"/>
+          <a:lstStyle/>
           <a:p>
             <a:pPr marL="216000" indent="-216000" algn="r" rtl="1">
               <a:buClr>
-                <a:srgbClr val="ffffff"/>
+                <a:srgbClr val="FFFFFF"/>
               </a:buClr>
               <a:buSzPct val="45000"/>
               <a:buFont typeface="Wingdings" charset="2"/>
@@ -3464,11 +4289,21 @@
       </p:sp>
     </p:spTree>
   </p:cSld>
+  <p:clrMapOvr>
+    <a:masterClrMapping/>
+  </p:clrMapOvr>
+  <p:timing>
+    <p:tnLst>
+      <p:par>
+        <p:cTn id="1" dur="indefinite" restart="never" nodeType="tmRoot"/>
+      </p:par>
+    </p:tnLst>
+  </p:timing>
 </p:sld>
 </file>
 
 <file path=ppt/slides/slide13.xml><?xml version="1.0" encoding="utf-8"?>
-<p:sld xmlns:a="http://schemas.openxmlformats.org/drawingml/2006/main" xmlns:p="http://schemas.openxmlformats.org/presentationml/2006/main" xmlns:r="http://schemas.openxmlformats.org/officeDocument/2006/relationships">
+<p:sld xmlns:a="http://schemas.openxmlformats.org/drawingml/2006/main" xmlns:r="http://schemas.openxmlformats.org/officeDocument/2006/relationships" xmlns:p="http://schemas.openxmlformats.org/presentationml/2006/main">
   <p:cSld>
     <p:spTree>
       <p:nvGrpSpPr>
@@ -3504,20 +4339,15 @@
           </a:ln>
         </p:spPr>
         <p:txBody>
-          <a:bodyPr lIns="0" rIns="0" tIns="0" bIns="0" anchor="ctr"/>
+          <a:bodyPr lIns="0" tIns="0" rIns="0" bIns="0" anchor="ctr"/>
+          <a:lstStyle/>
           <a:p>
             <a:pPr algn="ctr" rtl="1"/>
             <a:r>
               <a:rPr lang="en-US" sz="3600" spc="-1">
                 <a:latin typeface="Vazir"/>
               </a:rPr>
-              <a:t>۲</a:t>
-            </a:r>
-            <a:r>
-              <a:rPr lang="en-US" sz="3600" spc="-1">
-                <a:latin typeface="Vazir"/>
-              </a:rPr>
-              <a:t>- پیوند داده: دریافت در یک فرم منسجم </a:t>
+              <a:t>۲- پیوند داده: دریافت در یک فرم منسجم </a:t>
             </a:r>
             <a:endParaRPr/>
           </a:p>
@@ -3525,12 +4355,12 @@
       </p:sp>
       <p:pic>
         <p:nvPicPr>
-          <p:cNvPr id="112" name="" descr=""/>
+          <p:cNvPr id="112" name="Picture 111"/>
           <p:cNvPicPr/>
           <p:nvPr/>
         </p:nvPicPr>
         <p:blipFill>
-          <a:blip r:embed="rId1"/>
+          <a:blip r:embed="rId2"/>
           <a:stretch/>
         </p:blipFill>
         <p:spPr>
@@ -3566,11 +4396,12 @@
           </a:ln>
         </p:spPr>
         <p:txBody>
-          <a:bodyPr lIns="90000" rIns="90000" tIns="45000" bIns="45000"/>
+          <a:bodyPr lIns="90000" tIns="45000" rIns="90000" bIns="45000"/>
+          <a:lstStyle/>
           <a:p>
             <a:pPr marL="216000" indent="-216000" algn="r" rtl="1">
               <a:buClr>
-                <a:srgbClr val="ffffff"/>
+                <a:srgbClr val="FFFFFF"/>
               </a:buClr>
               <a:buSzPct val="45000"/>
               <a:buFont typeface="Wingdings" charset="2"/>
@@ -3587,7 +4418,7 @@
           <a:p>
             <a:pPr marL="216000" indent="-216000" algn="r" rtl="1">
               <a:buClr>
-                <a:srgbClr val="ffffff"/>
+                <a:srgbClr val="FFFFFF"/>
               </a:buClr>
               <a:buSzPct val="45000"/>
               <a:buFont typeface="Wingdings" charset="2"/>
@@ -3605,11 +4436,21 @@
       </p:sp>
     </p:spTree>
   </p:cSld>
+  <p:clrMapOvr>
+    <a:masterClrMapping/>
+  </p:clrMapOvr>
+  <p:timing>
+    <p:tnLst>
+      <p:par>
+        <p:cTn id="1" dur="indefinite" restart="never" nodeType="tmRoot"/>
+      </p:par>
+    </p:tnLst>
+  </p:timing>
 </p:sld>
 </file>
 
 <file path=ppt/slides/slide14.xml><?xml version="1.0" encoding="utf-8"?>
-<p:sld xmlns:a="http://schemas.openxmlformats.org/drawingml/2006/main" xmlns:p="http://schemas.openxmlformats.org/presentationml/2006/main" xmlns:r="http://schemas.openxmlformats.org/officeDocument/2006/relationships">
+<p:sld xmlns:a="http://schemas.openxmlformats.org/drawingml/2006/main" xmlns:r="http://schemas.openxmlformats.org/officeDocument/2006/relationships" xmlns:p="http://schemas.openxmlformats.org/presentationml/2006/main">
   <p:cSld>
     <p:spTree>
       <p:nvGrpSpPr>
@@ -3645,20 +4486,15 @@
           </a:ln>
         </p:spPr>
         <p:txBody>
-          <a:bodyPr lIns="0" rIns="0" tIns="0" bIns="0" anchor="ctr"/>
+          <a:bodyPr lIns="0" tIns="0" rIns="0" bIns="0" anchor="ctr"/>
+          <a:lstStyle/>
           <a:p>
             <a:pPr algn="ctr" rtl="1"/>
             <a:r>
               <a:rPr lang="en-US" sz="3600" spc="-1">
                 <a:latin typeface="Vazir"/>
               </a:rPr>
-              <a:t>۳</a:t>
-            </a:r>
-            <a:r>
-              <a:rPr lang="en-US" sz="3600" spc="-1">
-                <a:latin typeface="Vazir"/>
-              </a:rPr>
-              <a:t>- شبکه: هدایت بسته</a:t>
+              <a:t>۳- شبکه: هدایت بسته</a:t>
             </a:r>
             <a:endParaRPr/>
           </a:p>
@@ -3666,12 +4502,12 @@
       </p:sp>
       <p:pic>
         <p:nvPicPr>
-          <p:cNvPr id="115" name="" descr=""/>
+          <p:cNvPr id="115" name="Picture 114"/>
           <p:cNvPicPr/>
           <p:nvPr/>
         </p:nvPicPr>
         <p:blipFill>
-          <a:blip r:embed="rId1"/>
+          <a:blip r:embed="rId2"/>
           <a:stretch/>
         </p:blipFill>
         <p:spPr>
@@ -3707,11 +4543,12 @@
           </a:ln>
         </p:spPr>
         <p:txBody>
-          <a:bodyPr lIns="90000" rIns="90000" tIns="45000" bIns="45000"/>
+          <a:bodyPr lIns="90000" tIns="45000" rIns="90000" bIns="45000"/>
+          <a:lstStyle/>
           <a:p>
             <a:pPr marL="216000" indent="-216000" algn="r" rtl="1">
               <a:buClr>
-                <a:srgbClr val="ffffff"/>
+                <a:srgbClr val="FFFFFF"/>
               </a:buClr>
               <a:buSzPct val="45000"/>
               <a:buFont typeface="Wingdings" charset="2"/>
@@ -3728,7 +4565,7 @@
           <a:p>
             <a:pPr marL="216000" indent="-216000" algn="r" rtl="1">
               <a:buClr>
-                <a:srgbClr val="ffffff"/>
+                <a:srgbClr val="FFFFFF"/>
               </a:buClr>
               <a:buSzPct val="45000"/>
               <a:buFont typeface="Wingdings" charset="2"/>
@@ -3746,11 +4583,21 @@
       </p:sp>
     </p:spTree>
   </p:cSld>
+  <p:clrMapOvr>
+    <a:masterClrMapping/>
+  </p:clrMapOvr>
+  <p:timing>
+    <p:tnLst>
+      <p:par>
+        <p:cTn id="1" dur="indefinite" restart="never" nodeType="tmRoot"/>
+      </p:par>
+    </p:tnLst>
+  </p:timing>
 </p:sld>
 </file>
 
 <file path=ppt/slides/slide15.xml><?xml version="1.0" encoding="utf-8"?>
-<p:sld xmlns:a="http://schemas.openxmlformats.org/drawingml/2006/main" xmlns:p="http://schemas.openxmlformats.org/presentationml/2006/main" xmlns:r="http://schemas.openxmlformats.org/officeDocument/2006/relationships">
+<p:sld xmlns:a="http://schemas.openxmlformats.org/drawingml/2006/main" xmlns:r="http://schemas.openxmlformats.org/officeDocument/2006/relationships" xmlns:p="http://schemas.openxmlformats.org/presentationml/2006/main">
   <p:cSld>
     <p:spTree>
       <p:nvGrpSpPr>
@@ -3786,20 +4633,15 @@
           </a:ln>
         </p:spPr>
         <p:txBody>
-          <a:bodyPr lIns="0" rIns="0" tIns="0" bIns="0" anchor="ctr"/>
+          <a:bodyPr lIns="0" tIns="0" rIns="0" bIns="0" anchor="ctr"/>
+          <a:lstStyle/>
           <a:p>
             <a:pPr algn="ctr" rtl="1"/>
             <a:r>
               <a:rPr lang="en-US" sz="3600" spc="-1">
                 <a:latin typeface="Vazir"/>
               </a:rPr>
-              <a:t>۴</a:t>
-            </a:r>
-            <a:r>
-              <a:rPr lang="en-US" sz="3600" spc="-1">
-                <a:latin typeface="Vazir"/>
-              </a:rPr>
-              <a:t>-ارسال: دریافت داده</a:t>
+              <a:t>۴-ارسال: دریافت داده</a:t>
             </a:r>
             <a:endParaRPr/>
           </a:p>
@@ -3807,12 +4649,12 @@
       </p:sp>
       <p:pic>
         <p:nvPicPr>
-          <p:cNvPr id="118" name="" descr=""/>
+          <p:cNvPr id="118" name="Picture 117"/>
           <p:cNvPicPr/>
           <p:nvPr/>
         </p:nvPicPr>
         <p:blipFill>
-          <a:blip r:embed="rId1"/>
+          <a:blip r:embed="rId2"/>
           <a:stretch/>
         </p:blipFill>
         <p:spPr>
@@ -3848,11 +4690,12 @@
           </a:ln>
         </p:spPr>
         <p:txBody>
-          <a:bodyPr lIns="90000" rIns="90000" tIns="45000" bIns="45000"/>
+          <a:bodyPr lIns="90000" tIns="45000" rIns="90000" bIns="45000"/>
+          <a:lstStyle/>
           <a:p>
             <a:pPr marL="216000" indent="-216000" algn="r" rtl="1">
               <a:buClr>
-                <a:srgbClr val="ffffff"/>
+                <a:srgbClr val="FFFFFF"/>
               </a:buClr>
               <a:buSzPct val="45000"/>
               <a:buFont typeface="Wingdings" charset="2"/>
@@ -3869,7 +4712,7 @@
           <a:p>
             <a:pPr marL="216000" indent="-216000" algn="r" rtl="1">
               <a:buClr>
-                <a:srgbClr val="ffffff"/>
+                <a:srgbClr val="FFFFFF"/>
               </a:buClr>
               <a:buSzPct val="45000"/>
               <a:buFont typeface="Wingdings" charset="2"/>
@@ -3886,7 +4729,7 @@
           <a:p>
             <a:pPr marL="216000" indent="-216000" algn="r" rtl="1">
               <a:buClr>
-                <a:srgbClr val="ffffff"/>
+                <a:srgbClr val="FFFFFF"/>
               </a:buClr>
               <a:buSzPct val="45000"/>
               <a:buFont typeface="Wingdings" charset="2"/>
@@ -3904,11 +4747,21 @@
       </p:sp>
     </p:spTree>
   </p:cSld>
+  <p:clrMapOvr>
+    <a:masterClrMapping/>
+  </p:clrMapOvr>
+  <p:timing>
+    <p:tnLst>
+      <p:par>
+        <p:cTn id="1" dur="indefinite" restart="never" nodeType="tmRoot"/>
+      </p:par>
+    </p:tnLst>
+  </p:timing>
 </p:sld>
 </file>
 
 <file path=ppt/slides/slide16.xml><?xml version="1.0" encoding="utf-8"?>
-<p:sld xmlns:a="http://schemas.openxmlformats.org/drawingml/2006/main" xmlns:p="http://schemas.openxmlformats.org/presentationml/2006/main" xmlns:r="http://schemas.openxmlformats.org/officeDocument/2006/relationships">
+<p:sld xmlns:a="http://schemas.openxmlformats.org/drawingml/2006/main" xmlns:r="http://schemas.openxmlformats.org/officeDocument/2006/relationships" xmlns:p="http://schemas.openxmlformats.org/presentationml/2006/main">
   <p:cSld>
     <p:spTree>
       <p:nvGrpSpPr>
@@ -3944,20 +4797,15 @@
           </a:ln>
         </p:spPr>
         <p:txBody>
-          <a:bodyPr lIns="0" rIns="0" tIns="0" bIns="0" anchor="ctr"/>
+          <a:bodyPr lIns="0" tIns="0" rIns="0" bIns="0" anchor="ctr"/>
+          <a:lstStyle/>
           <a:p>
             <a:pPr algn="ctr" rtl="1"/>
             <a:r>
               <a:rPr lang="en-US" sz="3600" spc="-1">
                 <a:latin typeface="Vazir"/>
               </a:rPr>
-              <a:t>۵</a:t>
-            </a:r>
-            <a:r>
-              <a:rPr lang="en-US" sz="3600" spc="-1">
-                <a:latin typeface="Vazir"/>
-              </a:rPr>
-              <a:t>- نشست: اداره ی جلسه</a:t>
+              <a:t>۵- نشست: اداره ی جلسه</a:t>
             </a:r>
             <a:endParaRPr/>
           </a:p>
@@ -3965,12 +4813,12 @@
       </p:sp>
       <p:pic>
         <p:nvPicPr>
-          <p:cNvPr id="121" name="" descr=""/>
+          <p:cNvPr id="121" name="Picture 120"/>
           <p:cNvPicPr/>
           <p:nvPr/>
         </p:nvPicPr>
         <p:blipFill>
-          <a:blip r:embed="rId1"/>
+          <a:blip r:embed="rId2"/>
           <a:stretch/>
         </p:blipFill>
         <p:spPr>
@@ -4006,11 +4854,12 @@
           </a:ln>
         </p:spPr>
         <p:txBody>
-          <a:bodyPr lIns="90000" rIns="90000" tIns="45000" bIns="45000"/>
+          <a:bodyPr lIns="90000" tIns="45000" rIns="90000" bIns="45000"/>
+          <a:lstStyle/>
           <a:p>
             <a:pPr marL="216000" indent="-216000" algn="r" rtl="1">
               <a:buClr>
-                <a:srgbClr val="ffffff"/>
+                <a:srgbClr val="FFFFFF"/>
               </a:buClr>
               <a:buSzPct val="45000"/>
               <a:buFont typeface="Wingdings" charset="2"/>
@@ -4027,7 +4876,7 @@
           <a:p>
             <a:pPr marL="216000" indent="-216000" algn="r" rtl="1">
               <a:buClr>
-                <a:srgbClr val="ffffff"/>
+                <a:srgbClr val="FFFFFF"/>
               </a:buClr>
               <a:buSzPct val="45000"/>
               <a:buFont typeface="Wingdings" charset="2"/>
@@ -4044,7 +4893,7 @@
           <a:p>
             <a:pPr marL="216000" indent="-216000" algn="r" rtl="1">
               <a:buClr>
-                <a:srgbClr val="ffffff"/>
+                <a:srgbClr val="FFFFFF"/>
               </a:buClr>
               <a:buSzPct val="45000"/>
               <a:buFont typeface="Wingdings" charset="2"/>
@@ -4062,11 +4911,21 @@
       </p:sp>
     </p:spTree>
   </p:cSld>
+  <p:clrMapOvr>
+    <a:masterClrMapping/>
+  </p:clrMapOvr>
+  <p:timing>
+    <p:tnLst>
+      <p:par>
+        <p:cTn id="1" dur="indefinite" restart="never" nodeType="tmRoot"/>
+      </p:par>
+    </p:tnLst>
+  </p:timing>
 </p:sld>
 </file>
 
 <file path=ppt/slides/slide17.xml><?xml version="1.0" encoding="utf-8"?>
-<p:sld xmlns:a="http://schemas.openxmlformats.org/drawingml/2006/main" xmlns:p="http://schemas.openxmlformats.org/presentationml/2006/main" xmlns:r="http://schemas.openxmlformats.org/officeDocument/2006/relationships">
+<p:sld xmlns:a="http://schemas.openxmlformats.org/drawingml/2006/main" xmlns:r="http://schemas.openxmlformats.org/officeDocument/2006/relationships" xmlns:p="http://schemas.openxmlformats.org/presentationml/2006/main">
   <p:cSld>
     <p:spTree>
       <p:nvGrpSpPr>
@@ -4102,20 +4961,15 @@
           </a:ln>
         </p:spPr>
         <p:txBody>
-          <a:bodyPr lIns="0" rIns="0" tIns="0" bIns="0" anchor="ctr"/>
+          <a:bodyPr lIns="0" tIns="0" rIns="0" bIns="0" anchor="ctr"/>
+          <a:lstStyle/>
           <a:p>
             <a:pPr algn="ctr" rtl="1"/>
             <a:r>
               <a:rPr lang="en-US" sz="3600" spc="-1">
                 <a:latin typeface="Vazir"/>
               </a:rPr>
-              <a:t>۶</a:t>
-            </a:r>
-            <a:r>
-              <a:rPr lang="en-US" sz="3600" spc="-1">
-                <a:latin typeface="Vazir"/>
-              </a:rPr>
-              <a:t>- نمایش: رمزگشایی و فرمت دهی</a:t>
+              <a:t>۶- نمایش: رمزگشایی و فرمت دهی</a:t>
             </a:r>
             <a:endParaRPr/>
           </a:p>
@@ -4123,12 +4977,12 @@
       </p:sp>
       <p:pic>
         <p:nvPicPr>
-          <p:cNvPr id="124" name="" descr=""/>
+          <p:cNvPr id="124" name="Picture 123"/>
           <p:cNvPicPr/>
           <p:nvPr/>
         </p:nvPicPr>
         <p:blipFill>
-          <a:blip r:embed="rId1"/>
+          <a:blip r:embed="rId2"/>
           <a:stretch/>
         </p:blipFill>
         <p:spPr>
@@ -4164,11 +5018,12 @@
           </a:ln>
         </p:spPr>
         <p:txBody>
-          <a:bodyPr lIns="90000" rIns="90000" tIns="45000" bIns="45000"/>
+          <a:bodyPr lIns="90000" tIns="45000" rIns="90000" bIns="45000"/>
+          <a:lstStyle/>
           <a:p>
             <a:pPr marL="216000" indent="-216000" algn="r" rtl="1">
               <a:buClr>
-                <a:srgbClr val="ffffff"/>
+                <a:srgbClr val="FFFFFF"/>
               </a:buClr>
               <a:buSzPct val="45000"/>
               <a:buFont typeface="Wingdings" charset="2"/>
@@ -4185,7 +5040,7 @@
           <a:p>
             <a:pPr marL="216000" indent="-216000" algn="r" rtl="1">
               <a:buClr>
-                <a:srgbClr val="ffffff"/>
+                <a:srgbClr val="FFFFFF"/>
               </a:buClr>
               <a:buSzPct val="45000"/>
               <a:buFont typeface="Wingdings" charset="2"/>
@@ -4203,11 +5058,21 @@
       </p:sp>
     </p:spTree>
   </p:cSld>
+  <p:clrMapOvr>
+    <a:masterClrMapping/>
+  </p:clrMapOvr>
+  <p:timing>
+    <p:tnLst>
+      <p:par>
+        <p:cTn id="1" dur="indefinite" restart="never" nodeType="tmRoot"/>
+      </p:par>
+    </p:tnLst>
+  </p:timing>
 </p:sld>
 </file>
 
 <file path=ppt/slides/slide18.xml><?xml version="1.0" encoding="utf-8"?>
-<p:sld xmlns:a="http://schemas.openxmlformats.org/drawingml/2006/main" xmlns:p="http://schemas.openxmlformats.org/presentationml/2006/main" xmlns:r="http://schemas.openxmlformats.org/officeDocument/2006/relationships">
+<p:sld xmlns:a="http://schemas.openxmlformats.org/drawingml/2006/main" xmlns:r="http://schemas.openxmlformats.org/officeDocument/2006/relationships" xmlns:p="http://schemas.openxmlformats.org/presentationml/2006/main">
   <p:cSld>
     <p:spTree>
       <p:nvGrpSpPr>
@@ -4243,20 +5108,15 @@
           </a:ln>
         </p:spPr>
         <p:txBody>
-          <a:bodyPr lIns="0" rIns="0" tIns="0" bIns="0" anchor="ctr"/>
+          <a:bodyPr lIns="0" tIns="0" rIns="0" bIns="0" anchor="ctr"/>
+          <a:lstStyle/>
           <a:p>
             <a:pPr algn="ctr" rtl="1"/>
             <a:r>
               <a:rPr lang="en-US" sz="3600" spc="-1">
                 <a:latin typeface="Vazir"/>
               </a:rPr>
-              <a:t>۷</a:t>
-            </a:r>
-            <a:r>
-              <a:rPr lang="en-US" sz="3600" spc="-1">
-                <a:latin typeface="Vazir"/>
-              </a:rPr>
-              <a:t>- خروجی داده</a:t>
+              <a:t>۷- خروجی داده</a:t>
             </a:r>
             <a:endParaRPr/>
           </a:p>
@@ -4264,12 +5124,12 @@
       </p:sp>
       <p:pic>
         <p:nvPicPr>
-          <p:cNvPr id="127" name="" descr=""/>
+          <p:cNvPr id="127" name="Picture 126"/>
           <p:cNvPicPr/>
           <p:nvPr/>
         </p:nvPicPr>
         <p:blipFill>
-          <a:blip r:embed="rId1"/>
+          <a:blip r:embed="rId2"/>
           <a:stretch/>
         </p:blipFill>
         <p:spPr>
@@ -4305,11 +5165,12 @@
           </a:ln>
         </p:spPr>
         <p:txBody>
-          <a:bodyPr lIns="90000" rIns="90000" tIns="45000" bIns="45000"/>
+          <a:bodyPr lIns="90000" tIns="45000" rIns="90000" bIns="45000"/>
+          <a:lstStyle/>
           <a:p>
             <a:pPr marL="216000" indent="-216000" algn="r" rtl="1">
               <a:buClr>
-                <a:srgbClr val="ffffff"/>
+                <a:srgbClr val="FFFFFF"/>
               </a:buClr>
               <a:buSzPct val="45000"/>
               <a:buFont typeface="Wingdings" charset="2"/>
@@ -4327,11 +5188,21 @@
       </p:sp>
     </p:spTree>
   </p:cSld>
+  <p:clrMapOvr>
+    <a:masterClrMapping/>
+  </p:clrMapOvr>
+  <p:timing>
+    <p:tnLst>
+      <p:par>
+        <p:cTn id="1" dur="indefinite" restart="never" nodeType="tmRoot"/>
+      </p:par>
+    </p:tnLst>
+  </p:timing>
 </p:sld>
 </file>
 
 <file path=ppt/slides/slide19.xml><?xml version="1.0" encoding="utf-8"?>
-<p:sld xmlns:a="http://schemas.openxmlformats.org/drawingml/2006/main" xmlns:p="http://schemas.openxmlformats.org/presentationml/2006/main" xmlns:r="http://schemas.openxmlformats.org/officeDocument/2006/relationships">
+<p:sld xmlns:a="http://schemas.openxmlformats.org/drawingml/2006/main" xmlns:r="http://schemas.openxmlformats.org/officeDocument/2006/relationships" xmlns:p="http://schemas.openxmlformats.org/presentationml/2006/main">
   <p:cSld>
     <p:spTree>
       <p:nvGrpSpPr>
@@ -4367,7 +5238,8 @@
           </a:ln>
         </p:spPr>
         <p:txBody>
-          <a:bodyPr lIns="0" rIns="0" tIns="0" bIns="0" anchor="ctr"/>
+          <a:bodyPr lIns="0" tIns="0" rIns="0" bIns="0" anchor="ctr"/>
+          <a:lstStyle/>
           <a:p>
             <a:pPr algn="ctr"/>
             <a:r>
@@ -4382,12 +5254,12 @@
       </p:sp>
       <p:pic>
         <p:nvPicPr>
-          <p:cNvPr id="130" name="" descr=""/>
+          <p:cNvPr id="130" name="Picture 129"/>
           <p:cNvPicPr/>
           <p:nvPr/>
         </p:nvPicPr>
         <p:blipFill>
-          <a:blip r:embed="rId1"/>
+          <a:blip r:embed="rId2"/>
           <a:stretch/>
         </p:blipFill>
         <p:spPr>
@@ -4405,11 +5277,21 @@
       </p:pic>
     </p:spTree>
   </p:cSld>
+  <p:clrMapOvr>
+    <a:masterClrMapping/>
+  </p:clrMapOvr>
+  <p:timing>
+    <p:tnLst>
+      <p:par>
+        <p:cTn id="1" dur="indefinite" restart="never" nodeType="tmRoot"/>
+      </p:par>
+    </p:tnLst>
+  </p:timing>
 </p:sld>
 </file>
 
 <file path=ppt/slides/slide2.xml><?xml version="1.0" encoding="utf-8"?>
-<p:sld xmlns:a="http://schemas.openxmlformats.org/drawingml/2006/main" xmlns:p="http://schemas.openxmlformats.org/presentationml/2006/main" xmlns:r="http://schemas.openxmlformats.org/officeDocument/2006/relationships">
+<p:sld xmlns:a="http://schemas.openxmlformats.org/drawingml/2006/main" xmlns:r="http://schemas.openxmlformats.org/officeDocument/2006/relationships" xmlns:p="http://schemas.openxmlformats.org/presentationml/2006/main">
   <p:cSld>
     <p:spTree>
       <p:nvGrpSpPr>
@@ -4445,26 +5327,15 @@
           </a:ln>
         </p:spPr>
         <p:txBody>
-          <a:bodyPr lIns="0" rIns="0" tIns="0" bIns="0" anchor="ctr"/>
+          <a:bodyPr lIns="0" tIns="0" rIns="0" bIns="0" anchor="ctr"/>
+          <a:lstStyle/>
           <a:p>
             <a:pPr algn="ctr" rtl="1"/>
             <a:r>
               <a:rPr lang="en-US" sz="3600" spc="-1">
                 <a:latin typeface="Vazir"/>
               </a:rPr>
-              <a:t>مدل </a:t>
-            </a:r>
-            <a:r>
-              <a:rPr lang="en-US" sz="3600" spc="-1">
-                <a:latin typeface="Vazir"/>
-              </a:rPr>
-              <a:t>OSI</a:t>
-            </a:r>
-            <a:r>
-              <a:rPr lang="en-US" sz="3600" spc="-1">
-                <a:latin typeface="Vazir"/>
-              </a:rPr>
-              <a:t> چیست؟</a:t>
+              <a:t>مدل OSI چیست؟</a:t>
             </a:r>
             <a:endParaRPr/>
           </a:p>
@@ -4490,11 +5361,12 @@
           </a:ln>
         </p:spPr>
         <p:txBody>
-          <a:bodyPr lIns="0" rIns="0" tIns="0" bIns="0"/>
+          <a:bodyPr lIns="0" tIns="0" rIns="0" bIns="0"/>
+          <a:lstStyle/>
           <a:p>
             <a:pPr marL="432000" indent="-324000" algn="r" rtl="1">
               <a:buClr>
-                <a:srgbClr val="ffffff"/>
+                <a:srgbClr val="FFFFFF"/>
               </a:buClr>
               <a:buSzPct val="45000"/>
               <a:buFont typeface="Symbol" charset="2"/>
@@ -4504,36 +5376,30 @@
               <a:rPr lang="en-US" sz="1800" spc="-1">
                 <a:latin typeface="Vazir"/>
               </a:rPr>
-              <a:t>OSI</a:t>
+              <a:t>OSI مخفف </a:t>
+            </a:r>
+            <a:r>
+              <a:rPr lang="en-US" sz="1800" i="1" spc="-1">
+                <a:latin typeface="Vazir"/>
+              </a:rPr>
+              <a:t>Open Systems Interconnection</a:t>
             </a:r>
             <a:r>
               <a:rPr lang="en-US" sz="1800" spc="-1">
                 <a:latin typeface="Vazir"/>
               </a:rPr>
-              <a:t> مخفف </a:t>
-            </a:r>
-            <a:r>
-              <a:rPr i="1" lang="en-US" sz="1800" spc="-1">
+              <a:t> به معنای </a:t>
+            </a:r>
+            <a:r>
+              <a:rPr lang="en-US" sz="1800" i="1" spc="-1">
                 <a:latin typeface="Vazir"/>
               </a:rPr>
-              <a:t>Open Systems Interconnection</a:t>
+              <a:t>اتصال متقابل سامانه‌های باز</a:t>
             </a:r>
             <a:r>
               <a:rPr lang="en-US" sz="1800" spc="-1">
                 <a:latin typeface="Vazir"/>
               </a:rPr>
-              <a:t> به معنای </a:t>
-            </a:r>
-            <a:r>
-              <a:rPr i="1" lang="en-US" sz="1800" spc="-1">
-                <a:latin typeface="Vazir"/>
-              </a:rPr>
-              <a:t>اتصال متقابل سامانه‌های باز</a:t>
-            </a:r>
-            <a:r>
-              <a:rPr lang="en-US" sz="1800" spc="-1">
-                <a:latin typeface="Vazir"/>
-              </a:rPr>
               <a:t> می‌باشد </a:t>
             </a:r>
             <a:endParaRPr/>
@@ -4541,7 +5407,7 @@
           <a:p>
             <a:pPr marL="432000" indent="-324000" algn="r" rtl="1">
               <a:buClr>
-                <a:srgbClr val="ffffff"/>
+                <a:srgbClr val="FFFFFF"/>
               </a:buClr>
               <a:buSzPct val="45000"/>
               <a:buFont typeface="Symbol" charset="2"/>
@@ -4551,26 +5417,14 @@
               <a:rPr lang="en-US" sz="1800" spc="-1">
                 <a:latin typeface="Vazir"/>
               </a:rPr>
-              <a:t>مدل </a:t>
-            </a:r>
-            <a:r>
-              <a:rPr lang="en-US" sz="1800" spc="-1">
-                <a:latin typeface="Vazir"/>
-              </a:rPr>
-              <a:t>OSI</a:t>
-            </a:r>
-            <a:r>
-              <a:rPr lang="en-US" sz="1800" spc="-1">
-                <a:latin typeface="Vazir"/>
-              </a:rPr>
-              <a:t> سعی بر توضیح چگونگی ارتباط دو سیستم انتقال اطلاعات بر پایه انواع رسانه ها در یک شبکه کامپیوتری را دارد.</a:t>
+              <a:t>مدل OSI سعی بر توضیح چگونگی ارتباط دو سیستم انتقال اطلاعات بر پایه انواع رسانه ها در یک شبکه کامپیوتری را دارد.</a:t>
             </a:r>
             <a:endParaRPr/>
           </a:p>
           <a:p>
             <a:pPr marL="432000" indent="-324000" algn="r" rtl="1">
               <a:buClr>
-                <a:srgbClr val="ffffff"/>
+                <a:srgbClr val="FFFFFF"/>
               </a:buClr>
               <a:buSzPct val="45000"/>
               <a:buFont typeface="Symbol" charset="2"/>
@@ -4580,26 +5434,14 @@
               <a:rPr lang="en-US" sz="1800" spc="-1">
                 <a:latin typeface="Vazir"/>
               </a:rPr>
-              <a:t>مدل </a:t>
-            </a:r>
-            <a:r>
-              <a:rPr lang="en-US" sz="1800" spc="-1">
-                <a:latin typeface="Vazir"/>
-              </a:rPr>
-              <a:t>OSI</a:t>
-            </a:r>
-            <a:r>
-              <a:rPr lang="en-US" sz="1800" spc="-1">
-                <a:latin typeface="Vazir"/>
-              </a:rPr>
-              <a:t> یک معماری شبکه نیست، چون هیچ سرویس یا پروتکلی در آن تعریف نمی‌شود. بلکه یکی از مدل‌های استاندارد و پذیرفته شده است که برای طراحی یا توصیف شبکه‌های مخابراتی به کار می‌رود.</a:t>
+              <a:t>مدل OSI یک معماری شبکه نیست، چون هیچ سرویس یا پروتکلی در آن تعریف نمی‌شود. بلکه یکی از مدل‌های استاندارد و پذیرفته شده است که برای طراحی یا توصیف شبکه‌های مخابراتی به کار می‌رود.</a:t>
             </a:r>
             <a:endParaRPr/>
           </a:p>
           <a:p>
             <a:pPr marL="432000" indent="-324000" algn="r" rtl="1">
               <a:buClr>
-                <a:srgbClr val="ffffff"/>
+                <a:srgbClr val="FFFFFF"/>
               </a:buClr>
               <a:buSzPct val="45000"/>
               <a:buFont typeface="Symbol" charset="2"/>
@@ -4616,7 +5458,7 @@
           <a:p>
             <a:pPr marL="432000" indent="-324000" algn="r" rtl="1">
               <a:buClr>
-                <a:srgbClr val="ffffff"/>
+                <a:srgbClr val="FFFFFF"/>
               </a:buClr>
               <a:buSzPct val="45000"/>
               <a:buFont typeface="Symbol" charset="2"/>
@@ -4634,11 +5476,21 @@
       </p:sp>
     </p:spTree>
   </p:cSld>
+  <p:clrMapOvr>
+    <a:masterClrMapping/>
+  </p:clrMapOvr>
+  <p:timing>
+    <p:tnLst>
+      <p:par>
+        <p:cTn id="1" dur="indefinite" restart="never" nodeType="tmRoot"/>
+      </p:par>
+    </p:tnLst>
+  </p:timing>
 </p:sld>
 </file>
 
 <file path=ppt/slides/slide20.xml><?xml version="1.0" encoding="utf-8"?>
-<p:sld xmlns:a="http://schemas.openxmlformats.org/drawingml/2006/main" xmlns:p="http://schemas.openxmlformats.org/presentationml/2006/main" xmlns:r="http://schemas.openxmlformats.org/officeDocument/2006/relationships">
+<p:sld xmlns:a="http://schemas.openxmlformats.org/drawingml/2006/main" xmlns:r="http://schemas.openxmlformats.org/officeDocument/2006/relationships" xmlns:p="http://schemas.openxmlformats.org/presentationml/2006/main">
   <p:cSld>
     <p:spTree>
       <p:nvGrpSpPr>
@@ -4674,7 +5526,8 @@
           </a:ln>
         </p:spPr>
         <p:txBody>
-          <a:bodyPr lIns="0" rIns="0" tIns="0" bIns="0" anchor="ctr"/>
+          <a:bodyPr lIns="0" tIns="0" rIns="0" bIns="0" anchor="ctr"/>
+          <a:lstStyle/>
           <a:p>
             <a:pPr algn="ctr"/>
             <a:r>
@@ -4707,7 +5560,8 @@
           </a:ln>
         </p:spPr>
         <p:txBody>
-          <a:bodyPr lIns="0" rIns="0" tIns="0" bIns="0"/>
+          <a:bodyPr lIns="0" tIns="0" rIns="0" bIns="0"/>
+          <a:lstStyle/>
           <a:p>
             <a:pPr algn="ctr" rtl="1"/>
             <a:r>
@@ -4722,11 +5576,21 @@
       </p:sp>
     </p:spTree>
   </p:cSld>
+  <p:clrMapOvr>
+    <a:masterClrMapping/>
+  </p:clrMapOvr>
+  <p:timing>
+    <p:tnLst>
+      <p:par>
+        <p:cTn id="1" dur="indefinite" restart="never" nodeType="tmRoot"/>
+      </p:par>
+    </p:tnLst>
+  </p:timing>
 </p:sld>
 </file>
 
 <file path=ppt/slides/slide21.xml><?xml version="1.0" encoding="utf-8"?>
-<p:sld xmlns:a="http://schemas.openxmlformats.org/drawingml/2006/main" xmlns:p="http://schemas.openxmlformats.org/presentationml/2006/main" xmlns:r="http://schemas.openxmlformats.org/officeDocument/2006/relationships">
+<p:sld xmlns:a="http://schemas.openxmlformats.org/drawingml/2006/main" xmlns:r="http://schemas.openxmlformats.org/officeDocument/2006/relationships" xmlns:p="http://schemas.openxmlformats.org/presentationml/2006/main">
   <p:cSld>
     <p:spTree>
       <p:nvGrpSpPr>
@@ -4762,7 +5626,8 @@
           </a:ln>
         </p:spPr>
         <p:txBody>
-          <a:bodyPr lIns="0" rIns="0" tIns="0" bIns="0" anchor="ctr"/>
+          <a:bodyPr lIns="0" tIns="0" rIns="0" bIns="0" anchor="ctr"/>
+          <a:lstStyle/>
           <a:p>
             <a:pPr algn="ctr"/>
             <a:r>
@@ -4795,42 +5660,113 @@
           </a:ln>
         </p:spPr>
         <p:txBody>
-          <a:bodyPr lIns="0" rIns="0" tIns="0" bIns="0"/>
+          <a:bodyPr lIns="0" tIns="0" rIns="0" bIns="0"/>
+          <a:lstStyle/>
           <a:p>
             <a:pPr algn="ctr" rtl="1"/>
             <a:r>
-              <a:rPr lang="en-US" sz="3200" spc="-1">
+              <a:rPr lang="en-US" sz="3200" spc="-1" dirty="0" err="1">
                 <a:latin typeface="Vazir"/>
               </a:rPr>
-              <a:t>نویسنده: سالار مقدم</a:t>
-            </a:r>
-            <a:endParaRPr/>
+              <a:t>نویسنده</a:t>
+            </a:r>
+            <a:r>
+              <a:rPr lang="en-US" sz="3200" spc="-1" dirty="0">
+                <a:latin typeface="Vazir"/>
+              </a:rPr>
+              <a:t>: </a:t>
+            </a:r>
+            <a:r>
+              <a:rPr lang="en-US" sz="3200" spc="-1" dirty="0" err="1">
+                <a:latin typeface="Vazir"/>
+              </a:rPr>
+              <a:t>سالار</a:t>
+            </a:r>
+            <a:r>
+              <a:rPr lang="en-US" sz="3200" spc="-1" dirty="0">
+                <a:latin typeface="Vazir"/>
+              </a:rPr>
+              <a:t> </a:t>
+            </a:r>
+            <a:r>
+              <a:rPr lang="en-US" sz="3200" spc="-1" dirty="0" err="1" smtClean="0">
+                <a:latin typeface="Vazir"/>
+              </a:rPr>
+              <a:t>مقدم</a:t>
+            </a:r>
+            <a:r>
+              <a:rPr lang="fa-IR" sz="3200" spc="-1" dirty="0">
+                <a:latin typeface="Vazir"/>
+              </a:rPr>
+              <a:t> </a:t>
+            </a:r>
+            <a:r>
+              <a:rPr lang="fa-IR" sz="3200" spc="-1" dirty="0" smtClean="0">
+                <a:latin typeface="Vazir"/>
+              </a:rPr>
+              <a:t>و محمد شهریاری</a:t>
+            </a:r>
+            <a:endParaRPr dirty="0"/>
           </a:p>
           <a:p>
             <a:pPr algn="ctr" rtl="1"/>
             <a:r>
-              <a:rPr lang="en-US" sz="3200" spc="-1">
+              <a:rPr lang="en-US" sz="3200" spc="-1" dirty="0" err="1">
                 <a:latin typeface="Vazir"/>
               </a:rPr>
-              <a:t>گیت هاب: </a:t>
-            </a:r>
-            <a:r>
-              <a:rPr lang="en-US" sz="3200" spc="-1">
+              <a:t>گیت</a:t>
+            </a:r>
+            <a:r>
+              <a:rPr lang="en-US" sz="3200" spc="-1" dirty="0">
                 <a:latin typeface="Vazir"/>
               </a:rPr>
+              <a:t> </a:t>
+            </a:r>
+            <a:r>
+              <a:rPr lang="en-US" sz="3200" spc="-1" dirty="0" err="1" smtClean="0">
+                <a:latin typeface="Vazir"/>
+              </a:rPr>
+              <a:t>هاب</a:t>
+            </a:r>
+            <a:r>
+              <a:rPr lang="fa-IR" sz="3200" spc="-1" dirty="0">
+                <a:latin typeface="Vazir"/>
+              </a:rPr>
+              <a:t>:</a:t>
+            </a:r>
+            <a:r>
+              <a:rPr lang="en-US" sz="3200" spc="-1" dirty="0" smtClean="0">
+                <a:latin typeface="Vazir"/>
+              </a:rPr>
+              <a:t> </a:t>
+            </a:r>
+            <a:r>
+              <a:rPr lang="en-US" sz="3200" spc="-1" dirty="0">
+                <a:latin typeface="Vazir"/>
+              </a:rPr>
               <a:t>http://github.com/salarmgh</a:t>
             </a:r>
-            <a:endParaRPr/>
+            <a:endParaRPr dirty="0"/>
           </a:p>
         </p:txBody>
       </p:sp>
     </p:spTree>
   </p:cSld>
+  <p:clrMapOvr>
+    <a:masterClrMapping/>
+  </p:clrMapOvr>
+  <p:timing>
+    <p:tnLst>
+      <p:par>
+        <p:cTn id="1" dur="indefinite" restart="never" nodeType="tmRoot"/>
+      </p:par>
+    </p:tnLst>
+  </p:timing>
 </p:sld>
 </file>
 
 <file path=ppt/slides/slide3.xml><?xml version="1.0" encoding="utf-8"?>
-<p:sld xmlns:a="http://schemas.openxmlformats.org/drawingml/2006/main" xmlns:p="http://schemas.openxmlformats.org/presentationml/2006/main" xmlns:r="http://schemas.openxmlformats.org/officeDocument/2006/relationships">
+<p:sld xmlns:a="http://schemas.openxmlformats.org/drawingml/2006/main" xmlns:r="http://schemas.openxmlformats.org/officeDocument/2006/relationships" xmlns:p="http://schemas.openxmlformats.org/presentationml/2006/main">
   <p:cSld>
     <p:spTree>
       <p:nvGrpSpPr>
@@ -4866,26 +5802,15 @@
           </a:ln>
         </p:spPr>
         <p:txBody>
-          <a:bodyPr lIns="0" rIns="0" tIns="0" bIns="0" anchor="ctr"/>
+          <a:bodyPr lIns="0" tIns="0" rIns="0" bIns="0" anchor="ctr"/>
+          <a:lstStyle/>
           <a:p>
             <a:pPr algn="ctr" rtl="1"/>
             <a:r>
               <a:rPr lang="en-US" sz="3600" spc="-1">
                 <a:latin typeface="Vazir"/>
               </a:rPr>
-              <a:t>چرا مدل </a:t>
-            </a:r>
-            <a:r>
-              <a:rPr lang="en-US" sz="3600" spc="-1">
-                <a:latin typeface="Vazir"/>
-              </a:rPr>
-              <a:t>OSI</a:t>
-            </a:r>
-            <a:r>
-              <a:rPr lang="en-US" sz="3600" spc="-1">
-                <a:latin typeface="Vazir"/>
-              </a:rPr>
-              <a:t> را باید بلد باشیم؟</a:t>
+              <a:t>چرا مدل OSI را باید بلد باشیم؟</a:t>
             </a:r>
             <a:endParaRPr/>
           </a:p>
@@ -4911,11 +5836,12 @@
           </a:ln>
         </p:spPr>
         <p:txBody>
-          <a:bodyPr lIns="0" rIns="0" tIns="0" bIns="0"/>
+          <a:bodyPr lIns="0" tIns="0" rIns="0" bIns="0"/>
+          <a:lstStyle/>
           <a:p>
             <a:pPr marL="432000" indent="-324000" algn="r" rtl="1">
               <a:buClr>
-                <a:srgbClr val="ffffff"/>
+                <a:srgbClr val="FFFFFF"/>
               </a:buClr>
               <a:buSzPct val="45000"/>
               <a:buFont typeface="Wingdings" charset="2"/>
@@ -4932,7 +5858,7 @@
           <a:p>
             <a:pPr marL="432000" indent="-324000" algn="r" rtl="1">
               <a:buClr>
-                <a:srgbClr val="ffffff"/>
+                <a:srgbClr val="FFFFFF"/>
               </a:buClr>
               <a:buSzPct val="45000"/>
               <a:buFont typeface="Wingdings" charset="2"/>
@@ -4950,11 +5876,21 @@
       </p:sp>
     </p:spTree>
   </p:cSld>
+  <p:clrMapOvr>
+    <a:masterClrMapping/>
+  </p:clrMapOvr>
+  <p:timing>
+    <p:tnLst>
+      <p:par>
+        <p:cTn id="1" dur="indefinite" restart="never" nodeType="tmRoot"/>
+      </p:par>
+    </p:tnLst>
+  </p:timing>
 </p:sld>
 </file>
 
 <file path=ppt/slides/slide4.xml><?xml version="1.0" encoding="utf-8"?>
-<p:sld xmlns:a="http://schemas.openxmlformats.org/drawingml/2006/main" xmlns:p="http://schemas.openxmlformats.org/presentationml/2006/main" xmlns:r="http://schemas.openxmlformats.org/officeDocument/2006/relationships">
+<p:sld xmlns:a="http://schemas.openxmlformats.org/drawingml/2006/main" xmlns:r="http://schemas.openxmlformats.org/officeDocument/2006/relationships" xmlns:p="http://schemas.openxmlformats.org/presentationml/2006/main">
   <p:cSld>
     <p:spTree>
       <p:nvGrpSpPr>
@@ -4990,7 +5926,8 @@
           </a:ln>
         </p:spPr>
         <p:txBody>
-          <a:bodyPr lIns="0" rIns="0" tIns="0" bIns="0" anchor="ctr"/>
+          <a:bodyPr lIns="0" tIns="0" rIns="0" bIns="0" anchor="ctr"/>
+          <a:lstStyle/>
           <a:p>
             <a:pPr algn="ctr"/>
             <a:r>
@@ -5005,12 +5942,12 @@
       </p:sp>
       <p:pic>
         <p:nvPicPr>
-          <p:cNvPr id="86" name="" descr=""/>
+          <p:cNvPr id="86" name="Picture 85"/>
           <p:cNvPicPr/>
           <p:nvPr/>
         </p:nvPicPr>
         <p:blipFill>
-          <a:blip r:embed="rId1"/>
+          <a:blip r:embed="rId2"/>
           <a:stretch/>
         </p:blipFill>
         <p:spPr>
@@ -5028,11 +5965,21 @@
       </p:pic>
     </p:spTree>
   </p:cSld>
+  <p:clrMapOvr>
+    <a:masterClrMapping/>
+  </p:clrMapOvr>
+  <p:timing>
+    <p:tnLst>
+      <p:par>
+        <p:cTn id="1" dur="indefinite" restart="never" nodeType="tmRoot"/>
+      </p:par>
+    </p:tnLst>
+  </p:timing>
 </p:sld>
 </file>
 
 <file path=ppt/slides/slide5.xml><?xml version="1.0" encoding="utf-8"?>
-<p:sld xmlns:a="http://schemas.openxmlformats.org/drawingml/2006/main" xmlns:p="http://schemas.openxmlformats.org/presentationml/2006/main" xmlns:r="http://schemas.openxmlformats.org/officeDocument/2006/relationships">
+<p:sld xmlns:a="http://schemas.openxmlformats.org/drawingml/2006/main" xmlns:r="http://schemas.openxmlformats.org/officeDocument/2006/relationships" xmlns:p="http://schemas.openxmlformats.org/presentationml/2006/main">
   <p:cSld>
     <p:spTree>
       <p:nvGrpSpPr>
@@ -5068,20 +6015,15 @@
           </a:ln>
         </p:spPr>
         <p:txBody>
-          <a:bodyPr lIns="0" rIns="0" tIns="0" bIns="0" anchor="ctr"/>
+          <a:bodyPr lIns="0" tIns="0" rIns="0" bIns="0" anchor="ctr"/>
+          <a:lstStyle/>
           <a:p>
             <a:pPr algn="ctr" rtl="1"/>
             <a:r>
               <a:rPr lang="en-US" sz="3600" spc="-1">
                 <a:latin typeface="Vazir"/>
               </a:rPr>
-              <a:t>۷</a:t>
-            </a:r>
-            <a:r>
-              <a:rPr lang="en-US" sz="3600" spc="-1">
-                <a:latin typeface="Vazir"/>
-              </a:rPr>
-              <a:t>- کاربرد: رابط بین کاربر و سیستم عامل</a:t>
+              <a:t>۷- کاربرد: رابط بین کاربر و سیستم عامل</a:t>
             </a:r>
             <a:endParaRPr/>
           </a:p>
@@ -5089,12 +6031,12 @@
       </p:sp>
       <p:pic>
         <p:nvPicPr>
-          <p:cNvPr id="88" name="" descr=""/>
+          <p:cNvPr id="88" name="Picture 87"/>
           <p:cNvPicPr/>
           <p:nvPr/>
         </p:nvPicPr>
         <p:blipFill>
-          <a:blip r:embed="rId1"/>
+          <a:blip r:embed="rId2"/>
           <a:stretch/>
         </p:blipFill>
         <p:spPr>
@@ -5130,11 +6072,12 @@
           </a:ln>
         </p:spPr>
         <p:txBody>
-          <a:bodyPr lIns="90000" rIns="90000" tIns="45000" bIns="45000"/>
+          <a:bodyPr lIns="90000" tIns="45000" rIns="90000" bIns="45000"/>
+          <a:lstStyle/>
           <a:p>
             <a:pPr marL="216000" indent="-216000" algn="r" rtl="1">
               <a:buClr>
-                <a:srgbClr val="ffffff"/>
+                <a:srgbClr val="FFFFFF"/>
               </a:buClr>
               <a:buSzPct val="45000"/>
               <a:buFont typeface="Wingdings" charset="2"/>
@@ -5152,11 +6095,21 @@
       </p:sp>
     </p:spTree>
   </p:cSld>
+  <p:clrMapOvr>
+    <a:masterClrMapping/>
+  </p:clrMapOvr>
+  <p:timing>
+    <p:tnLst>
+      <p:par>
+        <p:cTn id="1" dur="indefinite" restart="never" nodeType="tmRoot"/>
+      </p:par>
+    </p:tnLst>
+  </p:timing>
 </p:sld>
 </file>
 
 <file path=ppt/slides/slide6.xml><?xml version="1.0" encoding="utf-8"?>
-<p:sld xmlns:a="http://schemas.openxmlformats.org/drawingml/2006/main" xmlns:p="http://schemas.openxmlformats.org/presentationml/2006/main" xmlns:r="http://schemas.openxmlformats.org/officeDocument/2006/relationships">
+<p:sld xmlns:a="http://schemas.openxmlformats.org/drawingml/2006/main" xmlns:r="http://schemas.openxmlformats.org/officeDocument/2006/relationships" xmlns:p="http://schemas.openxmlformats.org/presentationml/2006/main">
   <p:cSld>
     <p:spTree>
       <p:nvGrpSpPr>
@@ -5192,20 +6145,15 @@
           </a:ln>
         </p:spPr>
         <p:txBody>
-          <a:bodyPr lIns="0" rIns="0" tIns="0" bIns="0" anchor="ctr"/>
+          <a:bodyPr lIns="0" tIns="0" rIns="0" bIns="0" anchor="ctr"/>
+          <a:lstStyle/>
           <a:p>
             <a:pPr algn="ctr" rtl="1"/>
             <a:r>
               <a:rPr lang="en-US" sz="3600" spc="-1">
                 <a:latin typeface="Vazir"/>
               </a:rPr>
-              <a:t>۶</a:t>
-            </a:r>
-            <a:r>
-              <a:rPr lang="en-US" sz="3600" spc="-1">
-                <a:latin typeface="Vazir"/>
-              </a:rPr>
-              <a:t>- نمایش: نحوه ی نمایش اطلاعات</a:t>
+              <a:t>۶- نمایش: نحوه ی نمایش اطلاعات</a:t>
             </a:r>
             <a:endParaRPr/>
           </a:p>
@@ -5213,12 +6161,12 @@
       </p:sp>
       <p:pic>
         <p:nvPicPr>
-          <p:cNvPr id="91" name="" descr=""/>
+          <p:cNvPr id="91" name="Picture 90"/>
           <p:cNvPicPr/>
           <p:nvPr/>
         </p:nvPicPr>
         <p:blipFill>
-          <a:blip r:embed="rId1"/>
+          <a:blip r:embed="rId2"/>
           <a:stretch/>
         </p:blipFill>
         <p:spPr>
@@ -5254,11 +6202,12 @@
           </a:ln>
         </p:spPr>
         <p:txBody>
-          <a:bodyPr lIns="90000" rIns="90000" tIns="45000" bIns="45000"/>
+          <a:bodyPr lIns="90000" tIns="45000" rIns="90000" bIns="45000"/>
+          <a:lstStyle/>
           <a:p>
             <a:pPr marL="216000" indent="-216000" algn="r" rtl="1">
               <a:buClr>
-                <a:srgbClr val="ffffff"/>
+                <a:srgbClr val="FFFFFF"/>
               </a:buClr>
               <a:buSzPct val="45000"/>
               <a:buFont typeface="Wingdings" charset="2"/>
@@ -5275,7 +6224,7 @@
           <a:p>
             <a:pPr marL="216000" indent="-216000" algn="r" rtl="1">
               <a:buClr>
-                <a:srgbClr val="ffffff"/>
+                <a:srgbClr val="FFFFFF"/>
               </a:buClr>
               <a:buSzPct val="45000"/>
               <a:buFont typeface="Wingdings" charset="2"/>
@@ -5293,11 +6242,21 @@
       </p:sp>
     </p:spTree>
   </p:cSld>
+  <p:clrMapOvr>
+    <a:masterClrMapping/>
+  </p:clrMapOvr>
+  <p:timing>
+    <p:tnLst>
+      <p:par>
+        <p:cTn id="1" dur="indefinite" restart="never" nodeType="tmRoot"/>
+      </p:par>
+    </p:tnLst>
+  </p:timing>
 </p:sld>
 </file>
 
 <file path=ppt/slides/slide7.xml><?xml version="1.0" encoding="utf-8"?>
-<p:sld xmlns:a="http://schemas.openxmlformats.org/drawingml/2006/main" xmlns:p="http://schemas.openxmlformats.org/presentationml/2006/main" xmlns:r="http://schemas.openxmlformats.org/officeDocument/2006/relationships">
+<p:sld xmlns:a="http://schemas.openxmlformats.org/drawingml/2006/main" xmlns:r="http://schemas.openxmlformats.org/officeDocument/2006/relationships" xmlns:p="http://schemas.openxmlformats.org/presentationml/2006/main">
   <p:cSld>
     <p:spTree>
       <p:nvGrpSpPr>
@@ -5333,20 +6292,15 @@
           </a:ln>
         </p:spPr>
         <p:txBody>
-          <a:bodyPr lIns="0" rIns="0" tIns="0" bIns="0" anchor="ctr"/>
+          <a:bodyPr lIns="0" tIns="0" rIns="0" bIns="0" anchor="ctr"/>
+          <a:lstStyle/>
           <a:p>
             <a:pPr algn="ctr" rtl="1"/>
             <a:r>
               <a:rPr lang="en-US" sz="3600" spc="-1">
                 <a:latin typeface="Vazir"/>
               </a:rPr>
-              <a:t>۵</a:t>
-            </a:r>
-            <a:r>
-              <a:rPr lang="en-US" sz="3600" spc="-1">
-                <a:latin typeface="Vazir"/>
-              </a:rPr>
-              <a:t>- نشست: جزییاتی درباره ی اتصال</a:t>
+              <a:t>۵- نشست: جزییاتی درباره ی اتصال</a:t>
             </a:r>
             <a:endParaRPr/>
           </a:p>
@@ -5354,12 +6308,12 @@
       </p:sp>
       <p:pic>
         <p:nvPicPr>
-          <p:cNvPr id="94" name="" descr=""/>
+          <p:cNvPr id="94" name="Picture 93"/>
           <p:cNvPicPr/>
           <p:nvPr/>
         </p:nvPicPr>
         <p:blipFill>
-          <a:blip r:embed="rId1"/>
+          <a:blip r:embed="rId2"/>
           <a:stretch/>
         </p:blipFill>
         <p:spPr>
@@ -5395,11 +6349,12 @@
           </a:ln>
         </p:spPr>
         <p:txBody>
-          <a:bodyPr lIns="90000" rIns="90000" tIns="45000" bIns="45000"/>
+          <a:bodyPr lIns="90000" tIns="45000" rIns="90000" bIns="45000"/>
+          <a:lstStyle/>
           <a:p>
             <a:pPr marL="216000" indent="-216000" algn="r" rtl="1">
               <a:buClr>
-                <a:srgbClr val="ffffff"/>
+                <a:srgbClr val="FFFFFF"/>
               </a:buClr>
               <a:buSzPct val="45000"/>
               <a:buFont typeface="Wingdings" charset="2"/>
@@ -5416,7 +6371,7 @@
           <a:p>
             <a:pPr marL="216000" indent="-216000" algn="r" rtl="1">
               <a:buClr>
-                <a:srgbClr val="ffffff"/>
+                <a:srgbClr val="FFFFFF"/>
               </a:buClr>
               <a:buSzPct val="45000"/>
               <a:buFont typeface="Wingdings" charset="2"/>
@@ -5433,7 +6388,7 @@
           <a:p>
             <a:pPr marL="216000" indent="-216000" algn="r" rtl="1">
               <a:buClr>
-                <a:srgbClr val="ffffff"/>
+                <a:srgbClr val="FFFFFF"/>
               </a:buClr>
               <a:buSzPct val="45000"/>
               <a:buFont typeface="Wingdings" charset="2"/>
@@ -5451,11 +6406,21 @@
       </p:sp>
     </p:spTree>
   </p:cSld>
+  <p:clrMapOvr>
+    <a:masterClrMapping/>
+  </p:clrMapOvr>
+  <p:timing>
+    <p:tnLst>
+      <p:par>
+        <p:cTn id="1" dur="indefinite" restart="never" nodeType="tmRoot"/>
+      </p:par>
+    </p:tnLst>
+  </p:timing>
 </p:sld>
 </file>
 
 <file path=ppt/slides/slide8.xml><?xml version="1.0" encoding="utf-8"?>
-<p:sld xmlns:a="http://schemas.openxmlformats.org/drawingml/2006/main" xmlns:p="http://schemas.openxmlformats.org/presentationml/2006/main" xmlns:r="http://schemas.openxmlformats.org/officeDocument/2006/relationships">
+<p:sld xmlns:a="http://schemas.openxmlformats.org/drawingml/2006/main" xmlns:r="http://schemas.openxmlformats.org/officeDocument/2006/relationships" xmlns:p="http://schemas.openxmlformats.org/presentationml/2006/main">
   <p:cSld>
     <p:spTree>
       <p:nvGrpSpPr>
@@ -5491,20 +6456,15 @@
           </a:ln>
         </p:spPr>
         <p:txBody>
-          <a:bodyPr lIns="0" rIns="0" tIns="0" bIns="0" anchor="ctr"/>
+          <a:bodyPr lIns="0" tIns="0" rIns="0" bIns="0" anchor="ctr"/>
+          <a:lstStyle/>
           <a:p>
             <a:pPr algn="ctr" rtl="1"/>
             <a:r>
               <a:rPr lang="en-US" sz="3600" spc="-1">
                 <a:latin typeface="Vazir"/>
               </a:rPr>
-              <a:t>۴</a:t>
-            </a:r>
-            <a:r>
-              <a:rPr lang="en-US" sz="3600" spc="-1">
-                <a:latin typeface="Vazir"/>
-              </a:rPr>
-              <a:t>- ارسال: ایجاد اتصال منطقی</a:t>
+              <a:t>۴- ارسال: ایجاد اتصال منطقی</a:t>
             </a:r>
             <a:endParaRPr/>
           </a:p>
@@ -5512,12 +6472,12 @@
       </p:sp>
       <p:pic>
         <p:nvPicPr>
-          <p:cNvPr id="97" name="" descr=""/>
+          <p:cNvPr id="97" name="Picture 96"/>
           <p:cNvPicPr/>
           <p:nvPr/>
         </p:nvPicPr>
         <p:blipFill>
-          <a:blip r:embed="rId1"/>
+          <a:blip r:embed="rId2"/>
           <a:stretch/>
         </p:blipFill>
         <p:spPr>
@@ -5553,11 +6513,12 @@
           </a:ln>
         </p:spPr>
         <p:txBody>
-          <a:bodyPr lIns="90000" rIns="90000" tIns="45000" bIns="45000"/>
+          <a:bodyPr lIns="90000" tIns="45000" rIns="90000" bIns="45000"/>
+          <a:lstStyle/>
           <a:p>
             <a:pPr marL="216000" indent="-216000" algn="r" rtl="1">
               <a:buClr>
-                <a:srgbClr val="ffffff"/>
+                <a:srgbClr val="FFFFFF"/>
               </a:buClr>
               <a:buSzPct val="45000"/>
               <a:buFont typeface="Wingdings" charset="2"/>
@@ -5574,7 +6535,7 @@
           <a:p>
             <a:pPr marL="216000" indent="-216000" algn="r" rtl="1">
               <a:buClr>
-                <a:srgbClr val="ffffff"/>
+                <a:srgbClr val="FFFFFF"/>
               </a:buClr>
               <a:buSzPct val="45000"/>
               <a:buFont typeface="Wingdings" charset="2"/>
@@ -5591,7 +6552,7 @@
           <a:p>
             <a:pPr marL="216000" indent="-216000" algn="r" rtl="1">
               <a:buClr>
-                <a:srgbClr val="ffffff"/>
+                <a:srgbClr val="FFFFFF"/>
               </a:buClr>
               <a:buSzPct val="45000"/>
               <a:buFont typeface="Wingdings" charset="2"/>
@@ -5609,11 +6570,21 @@
       </p:sp>
     </p:spTree>
   </p:cSld>
+  <p:clrMapOvr>
+    <a:masterClrMapping/>
+  </p:clrMapOvr>
+  <p:timing>
+    <p:tnLst>
+      <p:par>
+        <p:cTn id="1" dur="indefinite" restart="never" nodeType="tmRoot"/>
+      </p:par>
+    </p:tnLst>
+  </p:timing>
 </p:sld>
 </file>
 
 <file path=ppt/slides/slide9.xml><?xml version="1.0" encoding="utf-8"?>
-<p:sld xmlns:a="http://schemas.openxmlformats.org/drawingml/2006/main" xmlns:p="http://schemas.openxmlformats.org/presentationml/2006/main" xmlns:r="http://schemas.openxmlformats.org/officeDocument/2006/relationships">
+<p:sld xmlns:a="http://schemas.openxmlformats.org/drawingml/2006/main" xmlns:r="http://schemas.openxmlformats.org/officeDocument/2006/relationships" xmlns:p="http://schemas.openxmlformats.org/presentationml/2006/main">
   <p:cSld>
     <p:spTree>
       <p:nvGrpSpPr>
@@ -5649,20 +6620,15 @@
           </a:ln>
         </p:spPr>
         <p:txBody>
-          <a:bodyPr lIns="0" rIns="0" tIns="0" bIns="0" anchor="ctr"/>
+          <a:bodyPr lIns="0" tIns="0" rIns="0" bIns="0" anchor="ctr"/>
+          <a:lstStyle/>
           <a:p>
             <a:pPr algn="ctr" rtl="1"/>
             <a:r>
               <a:rPr lang="en-US" sz="3600" spc="-1">
                 <a:latin typeface="Vazir"/>
               </a:rPr>
-              <a:t>۳</a:t>
-            </a:r>
-            <a:r>
-              <a:rPr lang="en-US" sz="3600" spc="-1">
-                <a:latin typeface="Vazir"/>
-              </a:rPr>
-              <a:t>- شبکه: مسیریابی</a:t>
+              <a:t>۳- شبکه: مسیریابی</a:t>
             </a:r>
             <a:endParaRPr/>
           </a:p>
@@ -5670,12 +6636,12 @@
       </p:sp>
       <p:pic>
         <p:nvPicPr>
-          <p:cNvPr id="100" name="" descr=""/>
+          <p:cNvPr id="100" name="Picture 99"/>
           <p:cNvPicPr/>
           <p:nvPr/>
         </p:nvPicPr>
         <p:blipFill>
-          <a:blip r:embed="rId1"/>
+          <a:blip r:embed="rId2"/>
           <a:stretch/>
         </p:blipFill>
         <p:spPr>
@@ -5711,11 +6677,12 @@
           </a:ln>
         </p:spPr>
         <p:txBody>
-          <a:bodyPr lIns="90000" rIns="90000" tIns="45000" bIns="45000"/>
+          <a:bodyPr lIns="90000" tIns="45000" rIns="90000" bIns="45000"/>
+          <a:lstStyle/>
           <a:p>
             <a:pPr marL="216000" indent="-216000" algn="r" rtl="1">
               <a:buClr>
-                <a:srgbClr val="ffffff"/>
+                <a:srgbClr val="FFFFFF"/>
               </a:buClr>
               <a:buSzPct val="45000"/>
               <a:buFont typeface="Wingdings" charset="2"/>
@@ -5732,7 +6699,7 @@
           <a:p>
             <a:pPr marL="216000" indent="-216000" algn="r" rtl="1">
               <a:buClr>
-                <a:srgbClr val="ffffff"/>
+                <a:srgbClr val="FFFFFF"/>
               </a:buClr>
               <a:buSzPct val="45000"/>
               <a:buFont typeface="Wingdings" charset="2"/>
@@ -5750,6 +6717,16 @@
       </p:sp>
     </p:spTree>
   </p:cSld>
+  <p:clrMapOvr>
+    <a:masterClrMapping/>
+  </p:clrMapOvr>
+  <p:timing>
+    <p:tnLst>
+      <p:par>
+        <p:cTn id="1" dur="indefinite" restart="never" nodeType="tmRoot"/>
+      </p:par>
+    </p:tnLst>
+  </p:timing>
 </p:sld>
 </file>
 
@@ -5973,6 +6950,8 @@
       </a:bgFillStyleLst>
     </a:fmtScheme>
   </a:themeElements>
+  <a:objectDefaults/>
+  <a:extraClrSchemeLst/>
 </a:theme>
 </file>
 
@@ -6196,5 +7175,7 @@
       </a:bgFillStyleLst>
     </a:fmtScheme>
   </a:themeElements>
+  <a:objectDefaults/>
+  <a:extraClrSchemeLst/>
 </a:theme>
 </file>
</xml_diff>

<commit_message>
fix ppt and pptx problem
</commit_message>
<xml_diff>
--- a/osi-presentation.pptx
+++ b/osi-presentation.pptx
@@ -2382,7 +2382,7 @@
           <a:p>
             <a:pPr algn="ctr"/>
             <a:r>
-              <a:rPr lang="en-US" sz="4400">
+              <a:rPr lang="en-US" sz="4400" spc="-1">
                 <a:latin typeface="Arial"/>
               </a:rPr>
               <a:t>Click to edit the title text format</a:t>
@@ -2413,13 +2413,16 @@
         <p:txBody>
           <a:bodyPr lIns="0" rIns="0" tIns="0" bIns="0"/>
           <a:p>
-            <a:pPr>
+            <a:pPr marL="432000" indent="-324000">
+              <a:buClr>
+                <a:srgbClr val="ffffff"/>
+              </a:buClr>
               <a:buSzPct val="45000"/>
-              <a:buFont typeface="StarSymbol"/>
+              <a:buFont typeface="Wingdings" charset="2"/>
               <a:buChar char=""/>
             </a:pPr>
             <a:r>
-              <a:rPr lang="en-US" sz="3200">
+              <a:rPr lang="en-US" sz="3200" spc="-1">
                 <a:latin typeface="Arial"/>
               </a:rPr>
               <a:t>Click to edit the outline text format</a:t>
@@ -2427,13 +2430,16 @@
             <a:endParaRPr/>
           </a:p>
           <a:p>
-            <a:pPr lvl="1">
+            <a:pPr lvl="1" marL="864000" indent="-324000">
+              <a:buClr>
+                <a:srgbClr val="ffffff"/>
+              </a:buClr>
               <a:buSzPct val="75000"/>
-              <a:buFont typeface="StarSymbol"/>
+              <a:buFont typeface="Symbol" charset="2"/>
               <a:buChar char=""/>
             </a:pPr>
             <a:r>
-              <a:rPr lang="en-US" sz="2800">
+              <a:rPr lang="en-US" sz="2800" spc="-1">
                 <a:latin typeface="Arial"/>
               </a:rPr>
               <a:t>Second Outline Level</a:t>
@@ -2441,13 +2447,16 @@
             <a:endParaRPr/>
           </a:p>
           <a:p>
-            <a:pPr lvl="2">
+            <a:pPr lvl="2" marL="1296000" indent="-288000">
+              <a:buClr>
+                <a:srgbClr val="ffffff"/>
+              </a:buClr>
               <a:buSzPct val="45000"/>
-              <a:buFont typeface="StarSymbol"/>
+              <a:buFont typeface="Wingdings" charset="2"/>
               <a:buChar char=""/>
             </a:pPr>
             <a:r>
-              <a:rPr lang="en-US" sz="2400">
+              <a:rPr lang="en-US" sz="2400" spc="-1">
                 <a:latin typeface="Arial"/>
               </a:rPr>
               <a:t>Third Outline Level</a:t>
@@ -2455,13 +2464,16 @@
             <a:endParaRPr/>
           </a:p>
           <a:p>
-            <a:pPr lvl="3">
+            <a:pPr lvl="3" marL="1728000" indent="-216000">
+              <a:buClr>
+                <a:srgbClr val="ffffff"/>
+              </a:buClr>
               <a:buSzPct val="75000"/>
-              <a:buFont typeface="StarSymbol"/>
+              <a:buFont typeface="Symbol" charset="2"/>
               <a:buChar char=""/>
             </a:pPr>
             <a:r>
-              <a:rPr lang="en-US" sz="2000">
+              <a:rPr lang="en-US" sz="2000" spc="-1">
                 <a:latin typeface="Arial"/>
               </a:rPr>
               <a:t>Fourth Outline Level</a:t>
@@ -2469,13 +2481,16 @@
             <a:endParaRPr/>
           </a:p>
           <a:p>
-            <a:pPr lvl="4">
+            <a:pPr lvl="4" marL="2160000" indent="-216000">
+              <a:buClr>
+                <a:srgbClr val="ffffff"/>
+              </a:buClr>
               <a:buSzPct val="45000"/>
-              <a:buFont typeface="StarSymbol"/>
+              <a:buFont typeface="Wingdings" charset="2"/>
               <a:buChar char=""/>
             </a:pPr>
             <a:r>
-              <a:rPr lang="en-US" sz="2000">
+              <a:rPr lang="en-US" sz="2000" spc="-1">
                 <a:latin typeface="Arial"/>
               </a:rPr>
               <a:t>Fifth Outline Level</a:t>
@@ -2483,13 +2498,16 @@
             <a:endParaRPr/>
           </a:p>
           <a:p>
-            <a:pPr lvl="5">
+            <a:pPr lvl="5" marL="2592000" indent="-216000">
+              <a:buClr>
+                <a:srgbClr val="ffffff"/>
+              </a:buClr>
               <a:buSzPct val="45000"/>
-              <a:buFont typeface="StarSymbol"/>
+              <a:buFont typeface="Wingdings" charset="2"/>
               <a:buChar char=""/>
             </a:pPr>
             <a:r>
-              <a:rPr lang="en-US" sz="2000">
+              <a:rPr lang="en-US" sz="2000" spc="-1">
                 <a:latin typeface="Arial"/>
               </a:rPr>
               <a:t>Sixth Outline Level</a:t>
@@ -2497,13 +2515,16 @@
             <a:endParaRPr/>
           </a:p>
           <a:p>
-            <a:pPr lvl="6">
+            <a:pPr lvl="6" marL="3024000" indent="-216000">
+              <a:buClr>
+                <a:srgbClr val="ffffff"/>
+              </a:buClr>
               <a:buSzPct val="45000"/>
-              <a:buFont typeface="StarSymbol"/>
+              <a:buFont typeface="Wingdings" charset="2"/>
               <a:buChar char=""/>
             </a:pPr>
             <a:r>
-              <a:rPr lang="en-US" sz="2000">
+              <a:rPr lang="en-US" sz="2000" spc="-1">
                 <a:latin typeface="Arial"/>
               </a:rPr>
               <a:t>Seventh Outline Level</a:t>
@@ -2535,7 +2556,7 @@
           <a:bodyPr lIns="0" rIns="0" tIns="0" bIns="0"/>
           <a:p>
             <a:r>
-              <a:rPr lang="en-US" sz="1400">
+              <a:rPr lang="en-US" sz="1400" spc="-1">
                 <a:latin typeface="Times New Roman"/>
               </a:rPr>
               <a:t>&lt;date/time&gt;</a:t>
@@ -2568,7 +2589,7 @@
           <a:p>
             <a:pPr algn="ctr"/>
             <a:r>
-              <a:rPr lang="en-US" sz="1400">
+              <a:rPr lang="en-US" sz="1400" spc="-1">
                 <a:latin typeface="Times New Roman"/>
               </a:rPr>
               <a:t>&lt;footer&gt;</a:t>
@@ -2600,8 +2621,8 @@
           <a:bodyPr lIns="0" rIns="0" tIns="0" bIns="0"/>
           <a:p>
             <a:pPr algn="r"/>
-            <a:fld id="{C371289C-70A8-48EE-8AD8-224960F74557}" type="slidenum">
-              <a:rPr lang="en-US" sz="1400">
+            <a:fld id="{83994613-154F-420B-9F5C-57747E22B868}" type="slidenum">
+              <a:rPr lang="en-US" sz="1400" spc="-1">
                 <a:latin typeface="Times New Roman"/>
               </a:rPr>
               <a:t>&lt;number&gt;</a:t>
@@ -2694,7 +2715,7 @@
           <a:p>
             <a:pPr algn="ctr"/>
             <a:r>
-              <a:rPr lang="en-US" sz="4140">
+              <a:rPr lang="en-US" sz="4140" spc="-1">
                 <a:latin typeface="Times New Roman"/>
               </a:rPr>
               <a:t>Click to edit the title text format</a:t>
@@ -2725,13 +2746,16 @@
         <p:txBody>
           <a:bodyPr lIns="0" rIns="0" tIns="0" bIns="0"/>
           <a:p>
-            <a:pPr>
+            <a:pPr marL="432000" indent="-324000">
+              <a:buClr>
+                <a:srgbClr val="ffffff"/>
+              </a:buClr>
               <a:buSzPct val="45000"/>
-              <a:buFont typeface="StarSymbol"/>
+              <a:buFont typeface="Wingdings" charset="2"/>
               <a:buChar char=""/>
             </a:pPr>
             <a:r>
-              <a:rPr lang="en-US" sz="3200">
+              <a:rPr lang="en-US" sz="3200" spc="-1">
                 <a:latin typeface="Times New Roman"/>
               </a:rPr>
               <a:t>Click to edit the outline text format</a:t>
@@ -2739,13 +2763,16 @@
             <a:endParaRPr/>
           </a:p>
           <a:p>
-            <a:pPr lvl="1">
+            <a:pPr lvl="1" marL="864000" indent="-324000">
+              <a:buClr>
+                <a:srgbClr val="ffffff"/>
+              </a:buClr>
               <a:buSzPct val="75000"/>
-              <a:buFont typeface="StarSymbol"/>
+              <a:buFont typeface="Symbol" charset="2"/>
               <a:buChar char=""/>
             </a:pPr>
             <a:r>
-              <a:rPr lang="en-US" sz="2800">
+              <a:rPr lang="en-US" sz="2800" spc="-1">
                 <a:latin typeface="Times New Roman"/>
               </a:rPr>
               <a:t>Second Outline Level</a:t>
@@ -2753,13 +2780,16 @@
             <a:endParaRPr/>
           </a:p>
           <a:p>
-            <a:pPr lvl="2">
+            <a:pPr lvl="2" marL="1296000" indent="-288000">
+              <a:buClr>
+                <a:srgbClr val="ffffff"/>
+              </a:buClr>
               <a:buSzPct val="45000"/>
-              <a:buFont typeface="StarSymbol"/>
+              <a:buFont typeface="Wingdings" charset="2"/>
               <a:buChar char=""/>
             </a:pPr>
             <a:r>
-              <a:rPr lang="en-US" sz="2400">
+              <a:rPr lang="en-US" sz="2400" spc="-1">
                 <a:latin typeface="Times New Roman"/>
               </a:rPr>
               <a:t>Third Outline Level</a:t>
@@ -2767,13 +2797,16 @@
             <a:endParaRPr/>
           </a:p>
           <a:p>
-            <a:pPr lvl="3">
+            <a:pPr lvl="3" marL="1728000" indent="-216000">
+              <a:buClr>
+                <a:srgbClr val="ffffff"/>
+              </a:buClr>
               <a:buSzPct val="75000"/>
-              <a:buFont typeface="StarSymbol"/>
+              <a:buFont typeface="Symbol" charset="2"/>
               <a:buChar char=""/>
             </a:pPr>
             <a:r>
-              <a:rPr lang="en-US" sz="2000">
+              <a:rPr lang="en-US" sz="2000" spc="-1">
                 <a:latin typeface="Times New Roman"/>
               </a:rPr>
               <a:t>Fourth Outline Level</a:t>
@@ -2781,13 +2814,16 @@
             <a:endParaRPr/>
           </a:p>
           <a:p>
-            <a:pPr lvl="4">
+            <a:pPr lvl="4" marL="2160000" indent="-216000">
+              <a:buClr>
+                <a:srgbClr val="ffffff"/>
+              </a:buClr>
               <a:buSzPct val="45000"/>
-              <a:buFont typeface="StarSymbol"/>
+              <a:buFont typeface="Wingdings" charset="2"/>
               <a:buChar char=""/>
             </a:pPr>
             <a:r>
-              <a:rPr lang="en-US" sz="2000">
+              <a:rPr lang="en-US" sz="2000" spc="-1">
                 <a:latin typeface="Times New Roman"/>
               </a:rPr>
               <a:t>Fifth Outline Level</a:t>
@@ -2795,13 +2831,16 @@
             <a:endParaRPr/>
           </a:p>
           <a:p>
-            <a:pPr lvl="5">
+            <a:pPr lvl="5" marL="2592000" indent="-216000">
+              <a:buClr>
+                <a:srgbClr val="ffffff"/>
+              </a:buClr>
               <a:buSzPct val="45000"/>
-              <a:buFont typeface="StarSymbol"/>
+              <a:buFont typeface="Wingdings" charset="2"/>
               <a:buChar char=""/>
             </a:pPr>
             <a:r>
-              <a:rPr lang="en-US" sz="2000">
+              <a:rPr lang="en-US" sz="2000" spc="-1">
                 <a:latin typeface="Times New Roman"/>
               </a:rPr>
               <a:t>Sixth Outline Level</a:t>
@@ -2809,13 +2848,16 @@
             <a:endParaRPr/>
           </a:p>
           <a:p>
-            <a:pPr lvl="6">
+            <a:pPr lvl="6" marL="3024000" indent="-216000">
+              <a:buClr>
+                <a:srgbClr val="ffffff"/>
+              </a:buClr>
               <a:buSzPct val="45000"/>
-              <a:buFont typeface="StarSymbol"/>
+              <a:buFont typeface="Wingdings" charset="2"/>
               <a:buChar char=""/>
             </a:pPr>
             <a:r>
-              <a:rPr lang="en-US" sz="2000">
+              <a:rPr lang="en-US" sz="2000" spc="-1">
                 <a:latin typeface="Times New Roman"/>
               </a:rPr>
               <a:t>Seventh Outline Level</a:t>
@@ -2847,7 +2889,7 @@
           <a:bodyPr lIns="0" rIns="0" tIns="0" bIns="0"/>
           <a:p>
             <a:r>
-              <a:rPr lang="en-US" sz="1400">
+              <a:rPr lang="en-US" sz="1400" spc="-1">
                 <a:latin typeface="Times New Roman"/>
               </a:rPr>
               <a:t>&lt;date/time&gt;</a:t>
@@ -2880,7 +2922,7 @@
           <a:p>
             <a:pPr algn="ctr"/>
             <a:r>
-              <a:rPr lang="en-US" sz="1400">
+              <a:rPr lang="en-US" sz="1400" spc="-1">
                 <a:latin typeface="Times New Roman"/>
               </a:rPr>
               <a:t>&lt;footer&gt;</a:t>
@@ -2912,8 +2954,8 @@
           <a:bodyPr lIns="0" rIns="0" tIns="0" bIns="0"/>
           <a:p>
             <a:pPr algn="r"/>
-            <a:fld id="{CB395BDB-EB32-4624-A5E0-1B922D0E7FAD}" type="slidenum">
-              <a:rPr lang="en-US" sz="1400">
+            <a:fld id="{C40B8B73-FE7F-4E9A-B92A-D0D5BCE8D2B0}" type="slidenum">
+              <a:rPr lang="en-US" sz="1400" spc="-1">
                 <a:latin typeface="Times New Roman"/>
               </a:rPr>
               <a:t>&lt;number&gt;</a:t>
@@ -2983,7 +3025,7 @@
           <a:p>
             <a:pPr algn="ctr"/>
             <a:r>
-              <a:rPr lang="en-US" sz="4140">
+              <a:rPr lang="en-US" sz="4140" spc="-1">
                 <a:latin typeface="Vazir"/>
               </a:rPr>
               <a:t>به نام خدا</a:t>
@@ -3014,15 +3056,15 @@
         <p:txBody>
           <a:bodyPr lIns="0" rIns="0" tIns="0" bIns="0"/>
           <a:p>
-            <a:pPr algn="ctr"/>
-            <a:r>
-              <a:rPr lang="en-US" sz="7200">
+            <a:pPr algn="ctr" rtl="1"/>
+            <a:r>
+              <a:rPr lang="en-US" sz="7200" spc="-1">
                 <a:latin typeface="Vazir"/>
               </a:rPr>
               <a:t>مدل </a:t>
             </a:r>
             <a:r>
-              <a:rPr lang="en-US" sz="7200">
+              <a:rPr lang="en-US" sz="7200" spc="-1">
                 <a:latin typeface="Vazir"/>
               </a:rPr>
               <a:t>OSI</a:t>
@@ -3033,33 +3075,6 @@
       </p:sp>
     </p:spTree>
   </p:cSld>
-  <p:timing>
-    <p:tnLst>
-      <p:par>
-        <p:cTn id="1" dur="indefinite" restart="never" nodeType="tmRoot">
-          <p:childTnLst>
-            <p:seq>
-              <p:cTn id="2" nodeType="mainSeq"/>
-              <p:prevCondLst>
-                <p:cond delay="0" evt="onPrev">
-                  <p:tgtEl>
-                    <p:sldTgt/>
-                  </p:tgtEl>
-                </p:cond>
-              </p:prevCondLst>
-              <p:nextCondLst>
-                <p:cond delay="0" evt="onNext">
-                  <p:tgtEl>
-                    <p:sldTgt/>
-                  </p:tgtEl>
-                </p:cond>
-              </p:nextCondLst>
-            </p:seq>
-          </p:childTnLst>
-        </p:cTn>
-      </p:par>
-    </p:tnLst>
-  </p:timing>
 </p:sld>
 </file>
 
@@ -3102,15 +3117,15 @@
         <p:txBody>
           <a:bodyPr lIns="0" rIns="0" tIns="0" bIns="0" anchor="ctr"/>
           <a:p>
-            <a:pPr algn="ctr"/>
-            <a:r>
-              <a:rPr lang="en-US" sz="3600">
+            <a:pPr algn="ctr" rtl="1"/>
+            <a:r>
+              <a:rPr lang="en-US" sz="3600" spc="-1">
                 <a:latin typeface="Vazir"/>
               </a:rPr>
               <a:t>۲</a:t>
             </a:r>
             <a:r>
-              <a:rPr lang="en-US" sz="3600">
+              <a:rPr lang="en-US" sz="3600" spc="-1">
                 <a:latin typeface="Vazir"/>
               </a:rPr>
               <a:t>- پیوند داده: کنترل جریان</a:t>
@@ -3164,13 +3179,16 @@
         <p:txBody>
           <a:bodyPr lIns="90000" rIns="90000" tIns="45000" bIns="45000"/>
           <a:p>
-            <a:pPr algn="r">
+            <a:pPr marL="216000" indent="-216000" algn="r" rtl="1">
+              <a:buClr>
+                <a:srgbClr val="ffffff"/>
+              </a:buClr>
               <a:buSzPct val="45000"/>
-              <a:buFont typeface="StarSymbol"/>
+              <a:buFont typeface="Wingdings" charset="2"/>
               <a:buChar char=""/>
             </a:pPr>
             <a:r>
-              <a:rPr lang="en-US">
+              <a:rPr lang="en-US" sz="1800" spc="-1">
                 <a:latin typeface="Vazir"/>
               </a:rPr>
               <a:t>انتقال داده در یک فرم منسجم و قابل رمز گشایی روی رسانه</a:t>
@@ -3178,13 +3196,16 @@
             <a:endParaRPr/>
           </a:p>
           <a:p>
-            <a:pPr algn="r">
+            <a:pPr marL="216000" indent="-216000" algn="r" rtl="1">
+              <a:buClr>
+                <a:srgbClr val="ffffff"/>
+              </a:buClr>
               <a:buSzPct val="45000"/>
-              <a:buFont typeface="StarSymbol"/>
+              <a:buFont typeface="Wingdings" charset="2"/>
               <a:buChar char=""/>
             </a:pPr>
             <a:r>
-              <a:rPr lang="en-US">
+              <a:rPr lang="en-US" sz="1800" spc="-1">
                 <a:latin typeface="Vazir"/>
               </a:rPr>
               <a:t>کشف خطا</a:t>
@@ -3195,33 +3216,6 @@
       </p:sp>
     </p:spTree>
   </p:cSld>
-  <p:timing>
-    <p:tnLst>
-      <p:par>
-        <p:cTn id="19" dur="indefinite" restart="never" nodeType="tmRoot">
-          <p:childTnLst>
-            <p:seq>
-              <p:cTn id="20" nodeType="mainSeq"/>
-              <p:prevCondLst>
-                <p:cond delay="0" evt="onPrev">
-                  <p:tgtEl>
-                    <p:sldTgt/>
-                  </p:tgtEl>
-                </p:cond>
-              </p:prevCondLst>
-              <p:nextCondLst>
-                <p:cond delay="0" evt="onNext">
-                  <p:tgtEl>
-                    <p:sldTgt/>
-                  </p:tgtEl>
-                </p:cond>
-              </p:nextCondLst>
-            </p:seq>
-          </p:childTnLst>
-        </p:cTn>
-      </p:par>
-    </p:tnLst>
-  </p:timing>
 </p:sld>
 </file>
 
@@ -3264,15 +3258,15 @@
         <p:txBody>
           <a:bodyPr lIns="0" rIns="0" tIns="0" bIns="0" anchor="ctr"/>
           <a:p>
-            <a:pPr algn="ctr"/>
-            <a:r>
-              <a:rPr lang="en-US" sz="3600">
+            <a:pPr algn="ctr" rtl="1"/>
+            <a:r>
+              <a:rPr lang="en-US" sz="3600" spc="-1">
                 <a:latin typeface="Vazir"/>
               </a:rPr>
               <a:t>۱</a:t>
             </a:r>
             <a:r>
-              <a:rPr lang="en-US" sz="3600">
+              <a:rPr lang="en-US" sz="3600" spc="-1">
                 <a:latin typeface="Vazir"/>
               </a:rPr>
               <a:t>- فیزیکی: ارسال از طریق رسانه‌های انتقال</a:t>
@@ -3326,13 +3320,16 @@
         <p:txBody>
           <a:bodyPr lIns="90000" rIns="90000" tIns="45000" bIns="45000"/>
           <a:p>
-            <a:pPr algn="r">
+            <a:pPr marL="216000" indent="-216000" algn="r" rtl="1">
+              <a:buClr>
+                <a:srgbClr val="ffffff"/>
+              </a:buClr>
               <a:buSzPct val="45000"/>
-              <a:buFont typeface="StarSymbol"/>
+              <a:buFont typeface="Wingdings" charset="2"/>
               <a:buChar char=""/>
             </a:pPr>
             <a:r>
-              <a:rPr lang="en-US">
+              <a:rPr lang="en-US" sz="1800" spc="-1">
                 <a:latin typeface="Vazir"/>
               </a:rPr>
               <a:t>انتقال از اجزای سخت افزاری</a:t>
@@ -3343,33 +3340,6 @@
       </p:sp>
     </p:spTree>
   </p:cSld>
-  <p:timing>
-    <p:tnLst>
-      <p:par>
-        <p:cTn id="21" dur="indefinite" restart="never" nodeType="tmRoot">
-          <p:childTnLst>
-            <p:seq>
-              <p:cTn id="22" nodeType="mainSeq"/>
-              <p:prevCondLst>
-                <p:cond delay="0" evt="onPrev">
-                  <p:tgtEl>
-                    <p:sldTgt/>
-                  </p:tgtEl>
-                </p:cond>
-              </p:prevCondLst>
-              <p:nextCondLst>
-                <p:cond delay="0" evt="onNext">
-                  <p:tgtEl>
-                    <p:sldTgt/>
-                  </p:tgtEl>
-                </p:cond>
-              </p:nextCondLst>
-            </p:seq>
-          </p:childTnLst>
-        </p:cTn>
-      </p:par>
-    </p:tnLst>
-  </p:timing>
 </p:sld>
 </file>
 
@@ -3412,15 +3382,15 @@
         <p:txBody>
           <a:bodyPr lIns="0" rIns="0" tIns="0" bIns="0" anchor="ctr"/>
           <a:p>
-            <a:pPr algn="ctr"/>
-            <a:r>
-              <a:rPr lang="en-US" sz="3600">
+            <a:pPr algn="ctr" rtl="1"/>
+            <a:r>
+              <a:rPr lang="en-US" sz="3600" spc="-1">
                 <a:latin typeface="Vazir"/>
               </a:rPr>
               <a:t>۱</a:t>
             </a:r>
             <a:r>
-              <a:rPr lang="en-US" sz="3600">
+              <a:rPr lang="en-US" sz="3600" spc="-1">
                 <a:latin typeface="Vazir"/>
               </a:rPr>
               <a:t>- فیزیکی: دریافت</a:t>
@@ -3474,13 +3444,16 @@
         <p:txBody>
           <a:bodyPr lIns="90000" rIns="90000" tIns="45000" bIns="45000"/>
           <a:p>
-            <a:pPr algn="r">
+            <a:pPr marL="216000" indent="-216000" algn="r" rtl="1">
+              <a:buClr>
+                <a:srgbClr val="ffffff"/>
+              </a:buClr>
               <a:buSzPct val="45000"/>
-              <a:buFont typeface="StarSymbol"/>
+              <a:buFont typeface="Wingdings" charset="2"/>
               <a:buChar char=""/>
             </a:pPr>
             <a:r>
-              <a:rPr lang="en-US">
+              <a:rPr lang="en-US" sz="1800" spc="-1">
                 <a:latin typeface="Vazir"/>
               </a:rPr>
               <a:t>دریافت از اجزای سخت افزاری</a:t>
@@ -3491,33 +3464,6 @@
       </p:sp>
     </p:spTree>
   </p:cSld>
-  <p:timing>
-    <p:tnLst>
-      <p:par>
-        <p:cTn id="23" dur="indefinite" restart="never" nodeType="tmRoot">
-          <p:childTnLst>
-            <p:seq>
-              <p:cTn id="24" nodeType="mainSeq"/>
-              <p:prevCondLst>
-                <p:cond delay="0" evt="onPrev">
-                  <p:tgtEl>
-                    <p:sldTgt/>
-                  </p:tgtEl>
-                </p:cond>
-              </p:prevCondLst>
-              <p:nextCondLst>
-                <p:cond delay="0" evt="onNext">
-                  <p:tgtEl>
-                    <p:sldTgt/>
-                  </p:tgtEl>
-                </p:cond>
-              </p:nextCondLst>
-            </p:seq>
-          </p:childTnLst>
-        </p:cTn>
-      </p:par>
-    </p:tnLst>
-  </p:timing>
 </p:sld>
 </file>
 
@@ -3560,15 +3506,15 @@
         <p:txBody>
           <a:bodyPr lIns="0" rIns="0" tIns="0" bIns="0" anchor="ctr"/>
           <a:p>
-            <a:pPr algn="ctr"/>
-            <a:r>
-              <a:rPr lang="en-US" sz="3600">
+            <a:pPr algn="ctr" rtl="1"/>
+            <a:r>
+              <a:rPr lang="en-US" sz="3600" spc="-1">
                 <a:latin typeface="Vazir"/>
               </a:rPr>
               <a:t>۲</a:t>
             </a:r>
             <a:r>
-              <a:rPr lang="en-US" sz="3600">
+              <a:rPr lang="en-US" sz="3600" spc="-1">
                 <a:latin typeface="Vazir"/>
               </a:rPr>
               <a:t>- پیوند داده: دریافت در یک فرم منسجم </a:t>
@@ -3622,13 +3568,16 @@
         <p:txBody>
           <a:bodyPr lIns="90000" rIns="90000" tIns="45000" bIns="45000"/>
           <a:p>
-            <a:pPr algn="r">
+            <a:pPr marL="216000" indent="-216000" algn="r" rtl="1">
+              <a:buClr>
+                <a:srgbClr val="ffffff"/>
+              </a:buClr>
               <a:buSzPct val="45000"/>
-              <a:buFont typeface="StarSymbol"/>
+              <a:buFont typeface="Wingdings" charset="2"/>
               <a:buChar char=""/>
             </a:pPr>
             <a:r>
-              <a:rPr lang="en-US">
+              <a:rPr lang="en-US" sz="1800" spc="-1">
                 <a:latin typeface="Vazir"/>
               </a:rPr>
               <a:t>دریافت داده در یک فرم منسجم و قابل رمز گشایی روی رسانه</a:t>
@@ -3636,13 +3585,16 @@
             <a:endParaRPr/>
           </a:p>
           <a:p>
-            <a:pPr algn="r">
+            <a:pPr marL="216000" indent="-216000" algn="r" rtl="1">
+              <a:buClr>
+                <a:srgbClr val="ffffff"/>
+              </a:buClr>
               <a:buSzPct val="45000"/>
-              <a:buFont typeface="StarSymbol"/>
+              <a:buFont typeface="Wingdings" charset="2"/>
               <a:buChar char=""/>
             </a:pPr>
             <a:r>
-              <a:rPr lang="en-US">
+              <a:rPr lang="en-US" sz="1800" spc="-1">
                 <a:latin typeface="Vazir"/>
               </a:rPr>
               <a:t>کشف خطا</a:t>
@@ -3653,33 +3605,6 @@
       </p:sp>
     </p:spTree>
   </p:cSld>
-  <p:timing>
-    <p:tnLst>
-      <p:par>
-        <p:cTn id="25" dur="indefinite" restart="never" nodeType="tmRoot">
-          <p:childTnLst>
-            <p:seq>
-              <p:cTn id="26" nodeType="mainSeq"/>
-              <p:prevCondLst>
-                <p:cond delay="0" evt="onPrev">
-                  <p:tgtEl>
-                    <p:sldTgt/>
-                  </p:tgtEl>
-                </p:cond>
-              </p:prevCondLst>
-              <p:nextCondLst>
-                <p:cond delay="0" evt="onNext">
-                  <p:tgtEl>
-                    <p:sldTgt/>
-                  </p:tgtEl>
-                </p:cond>
-              </p:nextCondLst>
-            </p:seq>
-          </p:childTnLst>
-        </p:cTn>
-      </p:par>
-    </p:tnLst>
-  </p:timing>
 </p:sld>
 </file>
 
@@ -3722,15 +3647,15 @@
         <p:txBody>
           <a:bodyPr lIns="0" rIns="0" tIns="0" bIns="0" anchor="ctr"/>
           <a:p>
-            <a:pPr algn="ctr"/>
-            <a:r>
-              <a:rPr lang="en-US" sz="3600">
+            <a:pPr algn="ctr" rtl="1"/>
+            <a:r>
+              <a:rPr lang="en-US" sz="3600" spc="-1">
                 <a:latin typeface="Vazir"/>
               </a:rPr>
               <a:t>۳</a:t>
             </a:r>
             <a:r>
-              <a:rPr lang="en-US" sz="3600">
+              <a:rPr lang="en-US" sz="3600" spc="-1">
                 <a:latin typeface="Vazir"/>
               </a:rPr>
               <a:t>- شبکه: هدایت بسته</a:t>
@@ -3784,13 +3709,16 @@
         <p:txBody>
           <a:bodyPr lIns="90000" rIns="90000" tIns="45000" bIns="45000"/>
           <a:p>
-            <a:pPr algn="r">
+            <a:pPr marL="216000" indent="-216000" algn="r" rtl="1">
+              <a:buClr>
+                <a:srgbClr val="ffffff"/>
+              </a:buClr>
               <a:buSzPct val="45000"/>
-              <a:buFont typeface="StarSymbol"/>
+              <a:buFont typeface="Wingdings" charset="2"/>
               <a:buChar char=""/>
             </a:pPr>
             <a:r>
-              <a:rPr lang="en-US">
+              <a:rPr lang="en-US" sz="1800" spc="-1">
                 <a:latin typeface="Vazir"/>
               </a:rPr>
               <a:t>هدایت بسته</a:t>
@@ -3798,13 +3726,16 @@
             <a:endParaRPr/>
           </a:p>
           <a:p>
-            <a:pPr algn="r">
+            <a:pPr marL="216000" indent="-216000" algn="r" rtl="1">
+              <a:buClr>
+                <a:srgbClr val="ffffff"/>
+              </a:buClr>
               <a:buSzPct val="45000"/>
-              <a:buFont typeface="StarSymbol"/>
+              <a:buFont typeface="Wingdings" charset="2"/>
               <a:buChar char=""/>
             </a:pPr>
             <a:r>
-              <a:rPr lang="en-US">
+              <a:rPr lang="en-US" sz="1800" spc="-1">
                 <a:latin typeface="Vazir"/>
               </a:rPr>
               <a:t>همگرایی روتر ها</a:t>
@@ -3815,33 +3746,6 @@
       </p:sp>
     </p:spTree>
   </p:cSld>
-  <p:timing>
-    <p:tnLst>
-      <p:par>
-        <p:cTn id="27" dur="indefinite" restart="never" nodeType="tmRoot">
-          <p:childTnLst>
-            <p:seq>
-              <p:cTn id="28" nodeType="mainSeq"/>
-              <p:prevCondLst>
-                <p:cond delay="0" evt="onPrev">
-                  <p:tgtEl>
-                    <p:sldTgt/>
-                  </p:tgtEl>
-                </p:cond>
-              </p:prevCondLst>
-              <p:nextCondLst>
-                <p:cond delay="0" evt="onNext">
-                  <p:tgtEl>
-                    <p:sldTgt/>
-                  </p:tgtEl>
-                </p:cond>
-              </p:nextCondLst>
-            </p:seq>
-          </p:childTnLst>
-        </p:cTn>
-      </p:par>
-    </p:tnLst>
-  </p:timing>
 </p:sld>
 </file>
 
@@ -3884,15 +3788,15 @@
         <p:txBody>
           <a:bodyPr lIns="0" rIns="0" tIns="0" bIns="0" anchor="ctr"/>
           <a:p>
-            <a:pPr algn="ctr"/>
-            <a:r>
-              <a:rPr lang="en-US" sz="3600">
+            <a:pPr algn="ctr" rtl="1"/>
+            <a:r>
+              <a:rPr lang="en-US" sz="3600" spc="-1">
                 <a:latin typeface="Vazir"/>
               </a:rPr>
               <a:t>۴</a:t>
             </a:r>
             <a:r>
-              <a:rPr lang="en-US" sz="3600">
+              <a:rPr lang="en-US" sz="3600" spc="-1">
                 <a:latin typeface="Vazir"/>
               </a:rPr>
               <a:t>-ارسال: دریافت داده</a:t>
@@ -3946,13 +3850,16 @@
         <p:txBody>
           <a:bodyPr lIns="90000" rIns="90000" tIns="45000" bIns="45000"/>
           <a:p>
-            <a:pPr algn="r">
+            <a:pPr marL="216000" indent="-216000" algn="r" rtl="1">
+              <a:buClr>
+                <a:srgbClr val="ffffff"/>
+              </a:buClr>
               <a:buSzPct val="45000"/>
-              <a:buFont typeface="StarSymbol"/>
+              <a:buFont typeface="Wingdings" charset="2"/>
               <a:buChar char=""/>
             </a:pPr>
             <a:r>
-              <a:rPr lang="en-US">
+              <a:rPr lang="en-US" sz="1800" spc="-1">
                 <a:latin typeface="Vazir"/>
               </a:rPr>
               <a:t>دایرکردن اتصال نقطه به نقطه</a:t>
@@ -3960,13 +3867,16 @@
             <a:endParaRPr/>
           </a:p>
           <a:p>
-            <a:pPr algn="r">
+            <a:pPr marL="216000" indent="-216000" algn="r" rtl="1">
+              <a:buClr>
+                <a:srgbClr val="ffffff"/>
+              </a:buClr>
               <a:buSzPct val="45000"/>
-              <a:buFont typeface="StarSymbol"/>
+              <a:buFont typeface="Wingdings" charset="2"/>
               <a:buChar char=""/>
             </a:pPr>
             <a:r>
-              <a:rPr lang="en-US">
+              <a:rPr lang="en-US" sz="1800" spc="-1">
                 <a:latin typeface="Vazir"/>
               </a:rPr>
               <a:t>انتقال اطلاعات</a:t>
@@ -3974,13 +3884,16 @@
             <a:endParaRPr/>
           </a:p>
           <a:p>
-            <a:pPr algn="r">
+            <a:pPr marL="216000" indent="-216000" algn="r" rtl="1">
+              <a:buClr>
+                <a:srgbClr val="ffffff"/>
+              </a:buClr>
               <a:buSzPct val="45000"/>
-              <a:buFont typeface="StarSymbol"/>
+              <a:buFont typeface="Wingdings" charset="2"/>
               <a:buChar char=""/>
             </a:pPr>
             <a:r>
-              <a:rPr lang="en-US">
+              <a:rPr lang="en-US" sz="1800" spc="-1">
                 <a:latin typeface="Vazir"/>
               </a:rPr>
               <a:t>بازیابی خطا</a:t>
@@ -3991,33 +3904,6 @@
       </p:sp>
     </p:spTree>
   </p:cSld>
-  <p:timing>
-    <p:tnLst>
-      <p:par>
-        <p:cTn id="29" dur="indefinite" restart="never" nodeType="tmRoot">
-          <p:childTnLst>
-            <p:seq>
-              <p:cTn id="30" nodeType="mainSeq"/>
-              <p:prevCondLst>
-                <p:cond delay="0" evt="onPrev">
-                  <p:tgtEl>
-                    <p:sldTgt/>
-                  </p:tgtEl>
-                </p:cond>
-              </p:prevCondLst>
-              <p:nextCondLst>
-                <p:cond delay="0" evt="onNext">
-                  <p:tgtEl>
-                    <p:sldTgt/>
-                  </p:tgtEl>
-                </p:cond>
-              </p:nextCondLst>
-            </p:seq>
-          </p:childTnLst>
-        </p:cTn>
-      </p:par>
-    </p:tnLst>
-  </p:timing>
 </p:sld>
 </file>
 
@@ -4060,15 +3946,15 @@
         <p:txBody>
           <a:bodyPr lIns="0" rIns="0" tIns="0" bIns="0" anchor="ctr"/>
           <a:p>
-            <a:pPr algn="ctr"/>
-            <a:r>
-              <a:rPr lang="en-US" sz="3600">
+            <a:pPr algn="ctr" rtl="1"/>
+            <a:r>
+              <a:rPr lang="en-US" sz="3600" spc="-1">
                 <a:latin typeface="Vazir"/>
               </a:rPr>
               <a:t>۵</a:t>
             </a:r>
             <a:r>
-              <a:rPr lang="en-US" sz="3600">
+              <a:rPr lang="en-US" sz="3600" spc="-1">
                 <a:latin typeface="Vazir"/>
               </a:rPr>
               <a:t>- نشست: اداره ی جلسه</a:t>
@@ -4122,13 +4008,16 @@
         <p:txBody>
           <a:bodyPr lIns="90000" rIns="90000" tIns="45000" bIns="45000"/>
           <a:p>
-            <a:pPr algn="r">
+            <a:pPr marL="216000" indent="-216000" algn="r" rtl="1">
+              <a:buClr>
+                <a:srgbClr val="ffffff"/>
+              </a:buClr>
               <a:buSzPct val="45000"/>
-              <a:buFont typeface="StarSymbol"/>
+              <a:buFont typeface="Wingdings" charset="2"/>
               <a:buChar char=""/>
             </a:pPr>
             <a:r>
-              <a:rPr lang="en-US">
+              <a:rPr lang="en-US" sz="1800" spc="-1">
                 <a:latin typeface="Arial"/>
               </a:rPr>
               <a:t>زمان برقراری ارتباط</a:t>
@@ -4136,13 +4025,16 @@
             <a:endParaRPr/>
           </a:p>
           <a:p>
-            <a:pPr algn="r">
+            <a:pPr marL="216000" indent="-216000" algn="r" rtl="1">
+              <a:buClr>
+                <a:srgbClr val="ffffff"/>
+              </a:buClr>
               <a:buSzPct val="45000"/>
-              <a:buFont typeface="StarSymbol"/>
+              <a:buFont typeface="Wingdings" charset="2"/>
               <a:buChar char=""/>
             </a:pPr>
             <a:r>
-              <a:rPr lang="en-US">
+              <a:rPr lang="en-US" sz="1800" spc="-1">
                 <a:latin typeface="Arial"/>
               </a:rPr>
               <a:t>اداره و نگهداری جلسه</a:t>
@@ -4150,13 +4042,16 @@
             <a:endParaRPr/>
           </a:p>
           <a:p>
-            <a:pPr algn="r">
+            <a:pPr marL="216000" indent="-216000" algn="r" rtl="1">
+              <a:buClr>
+                <a:srgbClr val="ffffff"/>
+              </a:buClr>
               <a:buSzPct val="45000"/>
-              <a:buFont typeface="StarSymbol"/>
+              <a:buFont typeface="Wingdings" charset="2"/>
               <a:buChar char=""/>
             </a:pPr>
             <a:r>
-              <a:rPr lang="en-US">
+              <a:rPr lang="en-US" sz="1800" spc="-1">
                 <a:latin typeface="Arial"/>
               </a:rPr>
               <a:t>توقف جلسه</a:t>
@@ -4167,33 +4062,6 @@
       </p:sp>
     </p:spTree>
   </p:cSld>
-  <p:timing>
-    <p:tnLst>
-      <p:par>
-        <p:cTn id="31" dur="indefinite" restart="never" nodeType="tmRoot">
-          <p:childTnLst>
-            <p:seq>
-              <p:cTn id="32" nodeType="mainSeq"/>
-              <p:prevCondLst>
-                <p:cond delay="0" evt="onPrev">
-                  <p:tgtEl>
-                    <p:sldTgt/>
-                  </p:tgtEl>
-                </p:cond>
-              </p:prevCondLst>
-              <p:nextCondLst>
-                <p:cond delay="0" evt="onNext">
-                  <p:tgtEl>
-                    <p:sldTgt/>
-                  </p:tgtEl>
-                </p:cond>
-              </p:nextCondLst>
-            </p:seq>
-          </p:childTnLst>
-        </p:cTn>
-      </p:par>
-    </p:tnLst>
-  </p:timing>
 </p:sld>
 </file>
 
@@ -4236,15 +4104,15 @@
         <p:txBody>
           <a:bodyPr lIns="0" rIns="0" tIns="0" bIns="0" anchor="ctr"/>
           <a:p>
-            <a:pPr algn="ctr"/>
-            <a:r>
-              <a:rPr lang="en-US" sz="3600">
+            <a:pPr algn="ctr" rtl="1"/>
+            <a:r>
+              <a:rPr lang="en-US" sz="3600" spc="-1">
                 <a:latin typeface="Vazir"/>
               </a:rPr>
               <a:t>۶</a:t>
             </a:r>
             <a:r>
-              <a:rPr lang="en-US" sz="3600">
+              <a:rPr lang="en-US" sz="3600" spc="-1">
                 <a:latin typeface="Vazir"/>
               </a:rPr>
               <a:t>- نمایش: رمزگشایی و فرمت دهی</a:t>
@@ -4298,13 +4166,16 @@
         <p:txBody>
           <a:bodyPr lIns="90000" rIns="90000" tIns="45000" bIns="45000"/>
           <a:p>
-            <a:pPr algn="r">
+            <a:pPr marL="216000" indent="-216000" algn="r" rtl="1">
+              <a:buClr>
+                <a:srgbClr val="ffffff"/>
+              </a:buClr>
               <a:buSzPct val="45000"/>
-              <a:buFont typeface="StarSymbol"/>
+              <a:buFont typeface="Wingdings" charset="2"/>
               <a:buChar char=""/>
             </a:pPr>
             <a:r>
-              <a:rPr lang="en-US">
+              <a:rPr lang="en-US" sz="1800" spc="-1">
                 <a:latin typeface="Vazir"/>
               </a:rPr>
               <a:t>تعیین فرمت</a:t>
@@ -4312,13 +4183,16 @@
             <a:endParaRPr/>
           </a:p>
           <a:p>
-            <a:pPr algn="r">
+            <a:pPr marL="216000" indent="-216000" algn="r" rtl="1">
+              <a:buClr>
+                <a:srgbClr val="ffffff"/>
+              </a:buClr>
               <a:buSzPct val="45000"/>
-              <a:buFont typeface="StarSymbol"/>
+              <a:buFont typeface="Wingdings" charset="2"/>
               <a:buChar char=""/>
             </a:pPr>
             <a:r>
-              <a:rPr lang="en-US">
+              <a:rPr lang="en-US" sz="1800" spc="-1">
                 <a:latin typeface="Vazir"/>
               </a:rPr>
               <a:t>رمزگشایی داده</a:t>
@@ -4329,33 +4203,6 @@
       </p:sp>
     </p:spTree>
   </p:cSld>
-  <p:timing>
-    <p:tnLst>
-      <p:par>
-        <p:cTn id="33" dur="indefinite" restart="never" nodeType="tmRoot">
-          <p:childTnLst>
-            <p:seq>
-              <p:cTn id="34" nodeType="mainSeq"/>
-              <p:prevCondLst>
-                <p:cond delay="0" evt="onPrev">
-                  <p:tgtEl>
-                    <p:sldTgt/>
-                  </p:tgtEl>
-                </p:cond>
-              </p:prevCondLst>
-              <p:nextCondLst>
-                <p:cond delay="0" evt="onNext">
-                  <p:tgtEl>
-                    <p:sldTgt/>
-                  </p:tgtEl>
-                </p:cond>
-              </p:nextCondLst>
-            </p:seq>
-          </p:childTnLst>
-        </p:cTn>
-      </p:par>
-    </p:tnLst>
-  </p:timing>
 </p:sld>
 </file>
 
@@ -4398,15 +4245,15 @@
         <p:txBody>
           <a:bodyPr lIns="0" rIns="0" tIns="0" bIns="0" anchor="ctr"/>
           <a:p>
-            <a:pPr algn="ctr"/>
-            <a:r>
-              <a:rPr lang="en-US" sz="3600">
+            <a:pPr algn="ctr" rtl="1"/>
+            <a:r>
+              <a:rPr lang="en-US" sz="3600" spc="-1">
                 <a:latin typeface="Vazir"/>
               </a:rPr>
               <a:t>۷</a:t>
             </a:r>
             <a:r>
-              <a:rPr lang="en-US" sz="3600">
+              <a:rPr lang="en-US" sz="3600" spc="-1">
                 <a:latin typeface="Vazir"/>
               </a:rPr>
               <a:t>- خروجی داده</a:t>
@@ -4460,13 +4307,16 @@
         <p:txBody>
           <a:bodyPr lIns="90000" rIns="90000" tIns="45000" bIns="45000"/>
           <a:p>
-            <a:pPr algn="r">
+            <a:pPr marL="216000" indent="-216000" algn="r" rtl="1">
+              <a:buClr>
+                <a:srgbClr val="ffffff"/>
+              </a:buClr>
               <a:buSzPct val="45000"/>
-              <a:buFont typeface="StarSymbol"/>
+              <a:buFont typeface="Wingdings" charset="2"/>
               <a:buChar char=""/>
             </a:pPr>
             <a:r>
-              <a:rPr lang="en-US">
+              <a:rPr lang="en-US" sz="1800" spc="-1">
                 <a:latin typeface="Vazir"/>
               </a:rPr>
               <a:t>پایان رویداد</a:t>
@@ -4477,33 +4327,6 @@
       </p:sp>
     </p:spTree>
   </p:cSld>
-  <p:timing>
-    <p:tnLst>
-      <p:par>
-        <p:cTn id="35" dur="indefinite" restart="never" nodeType="tmRoot">
-          <p:childTnLst>
-            <p:seq>
-              <p:cTn id="36" nodeType="mainSeq"/>
-              <p:prevCondLst>
-                <p:cond delay="0" evt="onPrev">
-                  <p:tgtEl>
-                    <p:sldTgt/>
-                  </p:tgtEl>
-                </p:cond>
-              </p:prevCondLst>
-              <p:nextCondLst>
-                <p:cond delay="0" evt="onNext">
-                  <p:tgtEl>
-                    <p:sldTgt/>
-                  </p:tgtEl>
-                </p:cond>
-              </p:nextCondLst>
-            </p:seq>
-          </p:childTnLst>
-        </p:cTn>
-      </p:par>
-    </p:tnLst>
-  </p:timing>
 </p:sld>
 </file>
 
@@ -4548,7 +4371,7 @@
           <a:p>
             <a:pPr algn="ctr"/>
             <a:r>
-              <a:rPr lang="en-US" sz="3600">
+              <a:rPr lang="en-US" sz="3600" spc="-1">
                 <a:latin typeface="Vazir"/>
               </a:rPr>
               <a:t>دریافت به وسیله ی نرم افزار</a:t>
@@ -4582,33 +4405,6 @@
       </p:pic>
     </p:spTree>
   </p:cSld>
-  <p:timing>
-    <p:tnLst>
-      <p:par>
-        <p:cTn id="37" dur="indefinite" restart="never" nodeType="tmRoot">
-          <p:childTnLst>
-            <p:seq>
-              <p:cTn id="38" nodeType="mainSeq"/>
-              <p:prevCondLst>
-                <p:cond delay="0" evt="onPrev">
-                  <p:tgtEl>
-                    <p:sldTgt/>
-                  </p:tgtEl>
-                </p:cond>
-              </p:prevCondLst>
-              <p:nextCondLst>
-                <p:cond delay="0" evt="onNext">
-                  <p:tgtEl>
-                    <p:sldTgt/>
-                  </p:tgtEl>
-                </p:cond>
-              </p:nextCondLst>
-            </p:seq>
-          </p:childTnLst>
-        </p:cTn>
-      </p:par>
-    </p:tnLst>
-  </p:timing>
 </p:sld>
 </file>
 
@@ -4651,21 +4447,21 @@
         <p:txBody>
           <a:bodyPr lIns="0" rIns="0" tIns="0" bIns="0" anchor="ctr"/>
           <a:p>
-            <a:pPr algn="ctr"/>
-            <a:r>
-              <a:rPr lang="en-US" sz="3600">
+            <a:pPr algn="ctr" rtl="1"/>
+            <a:r>
+              <a:rPr lang="en-US" sz="3600" spc="-1">
                 <a:latin typeface="Vazir"/>
               </a:rPr>
               <a:t>مدل </a:t>
             </a:r>
             <a:r>
-              <a:rPr lang="en-US" sz="3600">
+              <a:rPr lang="en-US" sz="3600" spc="-1">
                 <a:latin typeface="Vazir"/>
               </a:rPr>
               <a:t>OSI</a:t>
             </a:r>
             <a:r>
-              <a:rPr lang="en-US" sz="3600">
+              <a:rPr lang="en-US" sz="3600" spc="-1">
                 <a:latin typeface="Vazir"/>
               </a:rPr>
               <a:t> چیست؟</a:t>
@@ -4696,43 +4492,46 @@
         <p:txBody>
           <a:bodyPr lIns="0" rIns="0" tIns="0" bIns="0"/>
           <a:p>
-            <a:pPr algn="r">
+            <a:pPr marL="432000" indent="-324000" algn="r" rtl="1">
+              <a:buClr>
+                <a:srgbClr val="ffffff"/>
+              </a:buClr>
               <a:buSzPct val="45000"/>
-              <a:buFont typeface="StarSymbol"/>
+              <a:buFont typeface="Symbol" charset="2"/>
               <a:buChar char=""/>
             </a:pPr>
             <a:r>
-              <a:rPr lang="en-US">
+              <a:rPr lang="en-US" sz="1800" spc="-1">
                 <a:latin typeface="Vazir"/>
               </a:rPr>
               <a:t>OSI</a:t>
             </a:r>
             <a:r>
-              <a:rPr lang="en-US">
+              <a:rPr lang="en-US" sz="1800" spc="-1">
                 <a:latin typeface="Vazir"/>
               </a:rPr>
               <a:t> مخفف </a:t>
             </a:r>
             <a:r>
-              <a:rPr i="1" lang="en-US">
+              <a:rPr i="1" lang="en-US" sz="1800" spc="-1">
                 <a:latin typeface="Vazir"/>
               </a:rPr>
               <a:t>Open Systems Interconnection</a:t>
             </a:r>
             <a:r>
-              <a:rPr lang="en-US">
+              <a:rPr lang="en-US" sz="1800" spc="-1">
                 <a:latin typeface="Vazir"/>
               </a:rPr>
               <a:t> به معنای </a:t>
             </a:r>
             <a:r>
-              <a:rPr i="1" lang="en-US">
+              <a:rPr i="1" lang="en-US" sz="1800" spc="-1">
                 <a:latin typeface="Vazir"/>
               </a:rPr>
               <a:t>اتصال متقابل سامانه‌های باز</a:t>
             </a:r>
             <a:r>
-              <a:rPr lang="en-US">
+              <a:rPr lang="en-US" sz="1800" spc="-1">
                 <a:latin typeface="Vazir"/>
               </a:rPr>
               <a:t> می‌باشد </a:t>
@@ -4740,25 +4539,28 @@
             <a:endParaRPr/>
           </a:p>
           <a:p>
-            <a:pPr algn="r">
+            <a:pPr marL="432000" indent="-324000" algn="r" rtl="1">
+              <a:buClr>
+                <a:srgbClr val="ffffff"/>
+              </a:buClr>
               <a:buSzPct val="45000"/>
-              <a:buFont typeface="StarSymbol"/>
+              <a:buFont typeface="Symbol" charset="2"/>
               <a:buChar char=""/>
             </a:pPr>
             <a:r>
-              <a:rPr lang="en-US">
+              <a:rPr lang="en-US" sz="1800" spc="-1">
                 <a:latin typeface="Vazir"/>
               </a:rPr>
               <a:t>مدل </a:t>
             </a:r>
             <a:r>
-              <a:rPr lang="en-US">
+              <a:rPr lang="en-US" sz="1800" spc="-1">
                 <a:latin typeface="Vazir"/>
               </a:rPr>
               <a:t>OSI</a:t>
             </a:r>
             <a:r>
-              <a:rPr lang="en-US">
+              <a:rPr lang="en-US" sz="1800" spc="-1">
                 <a:latin typeface="Vazir"/>
               </a:rPr>
               <a:t> سعی بر توضیح چگونگی ارتباط دو سیستم انتقال اطلاعات بر پایه انواع رسانه ها در یک شبکه کامپیوتری را دارد.</a:t>
@@ -4766,25 +4568,28 @@
             <a:endParaRPr/>
           </a:p>
           <a:p>
-            <a:pPr algn="r">
+            <a:pPr marL="432000" indent="-324000" algn="r" rtl="1">
+              <a:buClr>
+                <a:srgbClr val="ffffff"/>
+              </a:buClr>
               <a:buSzPct val="45000"/>
-              <a:buFont typeface="StarSymbol"/>
+              <a:buFont typeface="Symbol" charset="2"/>
               <a:buChar char=""/>
             </a:pPr>
             <a:r>
-              <a:rPr lang="en-US">
+              <a:rPr lang="en-US" sz="1800" spc="-1">
                 <a:latin typeface="Vazir"/>
               </a:rPr>
               <a:t>مدل </a:t>
             </a:r>
             <a:r>
-              <a:rPr lang="en-US">
+              <a:rPr lang="en-US" sz="1800" spc="-1">
                 <a:latin typeface="Vazir"/>
               </a:rPr>
               <a:t>OSI</a:t>
             </a:r>
             <a:r>
-              <a:rPr lang="en-US">
+              <a:rPr lang="en-US" sz="1800" spc="-1">
                 <a:latin typeface="Vazir"/>
               </a:rPr>
               <a:t> یک معماری شبکه نیست، چون هیچ سرویس یا پروتکلی در آن تعریف نمی‌شود. بلکه یکی از مدل‌های استاندارد و پذیرفته شده است که برای طراحی یا توصیف شبکه‌های مخابراتی به کار می‌رود.</a:t>
@@ -4792,13 +4597,16 @@
             <a:endParaRPr/>
           </a:p>
           <a:p>
-            <a:pPr algn="r">
+            <a:pPr marL="432000" indent="-324000" algn="r" rtl="1">
+              <a:buClr>
+                <a:srgbClr val="ffffff"/>
+              </a:buClr>
               <a:buSzPct val="45000"/>
-              <a:buFont typeface="StarSymbol"/>
+              <a:buFont typeface="Symbol" charset="2"/>
               <a:buChar char=""/>
             </a:pPr>
             <a:r>
-              <a:rPr lang="en-US">
+              <a:rPr lang="en-US" sz="1800" spc="-1">
                 <a:latin typeface="Vazir"/>
               </a:rPr>
               <a:t>این مدل به هیچ وجه وجود نداشته و صرفاً برای یادگیری و رفع اشکال و همچنین طراحی ساختار شبکه به کار می‌رود.</a:t>
@@ -4806,13 +4614,16 @@
             <a:endParaRPr/>
           </a:p>
           <a:p>
-            <a:pPr algn="r">
+            <a:pPr marL="432000" indent="-324000" algn="r" rtl="1">
+              <a:buClr>
+                <a:srgbClr val="ffffff"/>
+              </a:buClr>
               <a:buSzPct val="45000"/>
-              <a:buFont typeface="StarSymbol"/>
+              <a:buFont typeface="Symbol" charset="2"/>
               <a:buChar char=""/>
             </a:pPr>
             <a:r>
-              <a:rPr lang="en-US">
+              <a:rPr lang="en-US" sz="1800" spc="-1">
                 <a:latin typeface="Vazir"/>
               </a:rPr>
               <a:t>در این مدل شبکه را به هفت لایه تقسیم‌بندی می‌کنیم که هر لایه به لایه پایین خود سرویس ارائه می‌کند و این درحالی است که هر لایه وظیفه ی خاص خود را نیر بر عهده دارد.</a:t>
@@ -4823,33 +4634,6 @@
       </p:sp>
     </p:spTree>
   </p:cSld>
-  <p:timing>
-    <p:tnLst>
-      <p:par>
-        <p:cTn id="3" dur="indefinite" restart="never" nodeType="tmRoot">
-          <p:childTnLst>
-            <p:seq>
-              <p:cTn id="4" nodeType="mainSeq"/>
-              <p:prevCondLst>
-                <p:cond delay="0" evt="onPrev">
-                  <p:tgtEl>
-                    <p:sldTgt/>
-                  </p:tgtEl>
-                </p:cond>
-              </p:prevCondLst>
-              <p:nextCondLst>
-                <p:cond delay="0" evt="onNext">
-                  <p:tgtEl>
-                    <p:sldTgt/>
-                  </p:tgtEl>
-                </p:cond>
-              </p:nextCondLst>
-            </p:seq>
-          </p:childTnLst>
-        </p:cTn>
-      </p:par>
-    </p:tnLst>
-  </p:timing>
 </p:sld>
 </file>
 
@@ -4894,7 +4678,7 @@
           <a:p>
             <a:pPr algn="ctr"/>
             <a:r>
-              <a:rPr lang="en-US" sz="4140">
+              <a:rPr lang="en-US" sz="4140" spc="-1">
                 <a:latin typeface="Vazir"/>
               </a:rPr>
               <a:t>سوال؟</a:t>
@@ -4925,9 +4709,9 @@
         <p:txBody>
           <a:bodyPr lIns="0" rIns="0" tIns="0" bIns="0"/>
           <a:p>
-            <a:pPr algn="ctr"/>
-            <a:r>
-              <a:rPr lang="en-US" sz="24000">
+            <a:pPr algn="ctr" rtl="1"/>
+            <a:r>
+              <a:rPr lang="en-US" sz="24000" spc="-1">
                 <a:latin typeface="Times New Roman"/>
               </a:rPr>
               <a:t>؟</a:t>
@@ -4938,33 +4722,6 @@
       </p:sp>
     </p:spTree>
   </p:cSld>
-  <p:timing>
-    <p:tnLst>
-      <p:par>
-        <p:cTn id="39" dur="indefinite" restart="never" nodeType="tmRoot">
-          <p:childTnLst>
-            <p:seq>
-              <p:cTn id="40" nodeType="mainSeq"/>
-              <p:prevCondLst>
-                <p:cond delay="0" evt="onPrev">
-                  <p:tgtEl>
-                    <p:sldTgt/>
-                  </p:tgtEl>
-                </p:cond>
-              </p:prevCondLst>
-              <p:nextCondLst>
-                <p:cond delay="0" evt="onNext">
-                  <p:tgtEl>
-                    <p:sldTgt/>
-                  </p:tgtEl>
-                </p:cond>
-              </p:nextCondLst>
-            </p:seq>
-          </p:childTnLst>
-        </p:cTn>
-      </p:par>
-    </p:tnLst>
-  </p:timing>
 </p:sld>
 </file>
 
@@ -5009,7 +4766,7 @@
           <a:p>
             <a:pPr algn="ctr"/>
             <a:r>
-              <a:rPr lang="en-US" sz="4140">
+              <a:rPr lang="en-US" sz="4140" spc="-1">
                 <a:latin typeface="Vazir"/>
               </a:rPr>
               <a:t>باتشکر</a:t>
@@ -5040,9 +4797,9 @@
         <p:txBody>
           <a:bodyPr lIns="0" rIns="0" tIns="0" bIns="0"/>
           <a:p>
-            <a:pPr algn="ctr"/>
-            <a:r>
-              <a:rPr lang="en-US" sz="3200">
+            <a:pPr algn="ctr" rtl="1"/>
+            <a:r>
+              <a:rPr lang="en-US" sz="3200" spc="-1">
                 <a:latin typeface="Vazir"/>
               </a:rPr>
               <a:t>نویسنده: سالار مقدم</a:t>
@@ -5050,15 +4807,15 @@
             <a:endParaRPr/>
           </a:p>
           <a:p>
-            <a:pPr algn="ctr"/>
-            <a:r>
-              <a:rPr lang="en-US" sz="3200">
+            <a:pPr algn="ctr" rtl="1"/>
+            <a:r>
+              <a:rPr lang="en-US" sz="3200" spc="-1">
                 <a:latin typeface="Vazir"/>
               </a:rPr>
               <a:t>گیت هاب: </a:t>
             </a:r>
             <a:r>
-              <a:rPr lang="en-US" sz="3200">
+              <a:rPr lang="en-US" sz="3200" spc="-1">
                 <a:latin typeface="Vazir"/>
               </a:rPr>
               <a:t>http://github.com/salarmgh</a:t>
@@ -5069,33 +4826,6 @@
       </p:sp>
     </p:spTree>
   </p:cSld>
-  <p:timing>
-    <p:tnLst>
-      <p:par>
-        <p:cTn id="41" dur="indefinite" restart="never" nodeType="tmRoot">
-          <p:childTnLst>
-            <p:seq>
-              <p:cTn id="42" nodeType="mainSeq"/>
-              <p:prevCondLst>
-                <p:cond delay="0" evt="onPrev">
-                  <p:tgtEl>
-                    <p:sldTgt/>
-                  </p:tgtEl>
-                </p:cond>
-              </p:prevCondLst>
-              <p:nextCondLst>
-                <p:cond delay="0" evt="onNext">
-                  <p:tgtEl>
-                    <p:sldTgt/>
-                  </p:tgtEl>
-                </p:cond>
-              </p:nextCondLst>
-            </p:seq>
-          </p:childTnLst>
-        </p:cTn>
-      </p:par>
-    </p:tnLst>
-  </p:timing>
 </p:sld>
 </file>
 
@@ -5138,21 +4868,21 @@
         <p:txBody>
           <a:bodyPr lIns="0" rIns="0" tIns="0" bIns="0" anchor="ctr"/>
           <a:p>
-            <a:pPr algn="ctr"/>
-            <a:r>
-              <a:rPr lang="en-US" sz="3600">
+            <a:pPr algn="ctr" rtl="1"/>
+            <a:r>
+              <a:rPr lang="en-US" sz="3600" spc="-1">
                 <a:latin typeface="Vazir"/>
               </a:rPr>
               <a:t>چرا مدل </a:t>
             </a:r>
             <a:r>
-              <a:rPr lang="en-US" sz="3600">
+              <a:rPr lang="en-US" sz="3600" spc="-1">
                 <a:latin typeface="Vazir"/>
               </a:rPr>
               <a:t>OSI</a:t>
             </a:r>
             <a:r>
-              <a:rPr lang="en-US" sz="3600">
+              <a:rPr lang="en-US" sz="3600" spc="-1">
                 <a:latin typeface="Vazir"/>
               </a:rPr>
               <a:t> را باید بلد باشیم؟</a:t>
@@ -5183,13 +4913,16 @@
         <p:txBody>
           <a:bodyPr lIns="0" rIns="0" tIns="0" bIns="0"/>
           <a:p>
-            <a:pPr algn="r">
+            <a:pPr marL="432000" indent="-324000" algn="r" rtl="1">
+              <a:buClr>
+                <a:srgbClr val="ffffff"/>
+              </a:buClr>
               <a:buSzPct val="45000"/>
-              <a:buFont typeface="StarSymbol"/>
+              <a:buFont typeface="Wingdings" charset="2"/>
               <a:buChar char=""/>
             </a:pPr>
             <a:r>
-              <a:rPr lang="en-US">
+              <a:rPr lang="en-US" sz="1800" spc="-1">
                 <a:latin typeface="Vazir"/>
               </a:rPr>
               <a:t>در صورت بروز مشکل می‌دانید باید در کجا دنبال مشکلات بگردید.</a:t>
@@ -5197,13 +4930,16 @@
             <a:endParaRPr/>
           </a:p>
           <a:p>
-            <a:pPr algn="r">
+            <a:pPr marL="432000" indent="-324000" algn="r" rtl="1">
+              <a:buClr>
+                <a:srgbClr val="ffffff"/>
+              </a:buClr>
               <a:buSzPct val="45000"/>
-              <a:buFont typeface="StarSymbol"/>
+              <a:buFont typeface="Wingdings" charset="2"/>
               <a:buChar char=""/>
             </a:pPr>
             <a:r>
-              <a:rPr lang="en-US">
+              <a:rPr lang="en-US" sz="1800" spc="-1">
                 <a:latin typeface="Vazir"/>
               </a:rPr>
               <a:t>درک خوبی از شبکه و تبادل های شبکه ای بدست می آورید.</a:t>
@@ -5214,33 +4950,6 @@
       </p:sp>
     </p:spTree>
   </p:cSld>
-  <p:timing>
-    <p:tnLst>
-      <p:par>
-        <p:cTn id="5" dur="indefinite" restart="never" nodeType="tmRoot">
-          <p:childTnLst>
-            <p:seq>
-              <p:cTn id="6" nodeType="mainSeq"/>
-              <p:prevCondLst>
-                <p:cond delay="0" evt="onPrev">
-                  <p:tgtEl>
-                    <p:sldTgt/>
-                  </p:tgtEl>
-                </p:cond>
-              </p:prevCondLst>
-              <p:nextCondLst>
-                <p:cond delay="0" evt="onNext">
-                  <p:tgtEl>
-                    <p:sldTgt/>
-                  </p:tgtEl>
-                </p:cond>
-              </p:nextCondLst>
-            </p:seq>
-          </p:childTnLst>
-        </p:cTn>
-      </p:par>
-    </p:tnLst>
-  </p:timing>
 </p:sld>
 </file>
 
@@ -5285,7 +4994,7 @@
           <a:p>
             <a:pPr algn="ctr"/>
             <a:r>
-              <a:rPr lang="en-US" sz="3600">
+              <a:rPr lang="en-US" sz="3600" spc="-1">
                 <a:latin typeface="Vazir"/>
               </a:rPr>
               <a:t>ارسال به وسیله ی نرم افزار</a:t>
@@ -5319,33 +5028,6 @@
       </p:pic>
     </p:spTree>
   </p:cSld>
-  <p:timing>
-    <p:tnLst>
-      <p:par>
-        <p:cTn id="7" dur="indefinite" restart="never" nodeType="tmRoot">
-          <p:childTnLst>
-            <p:seq>
-              <p:cTn id="8" nodeType="mainSeq"/>
-              <p:prevCondLst>
-                <p:cond delay="0" evt="onPrev">
-                  <p:tgtEl>
-                    <p:sldTgt/>
-                  </p:tgtEl>
-                </p:cond>
-              </p:prevCondLst>
-              <p:nextCondLst>
-                <p:cond delay="0" evt="onNext">
-                  <p:tgtEl>
-                    <p:sldTgt/>
-                  </p:tgtEl>
-                </p:cond>
-              </p:nextCondLst>
-            </p:seq>
-          </p:childTnLst>
-        </p:cTn>
-      </p:par>
-    </p:tnLst>
-  </p:timing>
 </p:sld>
 </file>
 
@@ -5388,15 +5070,15 @@
         <p:txBody>
           <a:bodyPr lIns="0" rIns="0" tIns="0" bIns="0" anchor="ctr"/>
           <a:p>
-            <a:pPr algn="ctr"/>
-            <a:r>
-              <a:rPr lang="en-US" sz="3600">
+            <a:pPr algn="ctr" rtl="1"/>
+            <a:r>
+              <a:rPr lang="en-US" sz="3600" spc="-1">
                 <a:latin typeface="Vazir"/>
               </a:rPr>
               <a:t>۷</a:t>
             </a:r>
             <a:r>
-              <a:rPr lang="en-US" sz="3600">
+              <a:rPr lang="en-US" sz="3600" spc="-1">
                 <a:latin typeface="Vazir"/>
               </a:rPr>
               <a:t>- کاربرد: رابط بین کاربر و سیستم عامل</a:t>
@@ -5450,13 +5132,16 @@
         <p:txBody>
           <a:bodyPr lIns="90000" rIns="90000" tIns="45000" bIns="45000"/>
           <a:p>
-            <a:pPr algn="r">
+            <a:pPr marL="216000" indent="-216000" algn="r" rtl="1">
+              <a:buClr>
+                <a:srgbClr val="ffffff"/>
+              </a:buClr>
               <a:buSzPct val="45000"/>
-              <a:buFont typeface="StarSymbol"/>
+              <a:buFont typeface="Wingdings" charset="2"/>
               <a:buChar char=""/>
             </a:pPr>
             <a:r>
-              <a:rPr lang="en-US">
+              <a:rPr lang="en-US" sz="1800" spc="-1">
                 <a:latin typeface="Vazir"/>
               </a:rPr>
               <a:t>آغاز رویداد</a:t>
@@ -5467,33 +5152,6 @@
       </p:sp>
     </p:spTree>
   </p:cSld>
-  <p:timing>
-    <p:tnLst>
-      <p:par>
-        <p:cTn id="9" dur="indefinite" restart="never" nodeType="tmRoot">
-          <p:childTnLst>
-            <p:seq>
-              <p:cTn id="10" nodeType="mainSeq"/>
-              <p:prevCondLst>
-                <p:cond delay="0" evt="onPrev">
-                  <p:tgtEl>
-                    <p:sldTgt/>
-                  </p:tgtEl>
-                </p:cond>
-              </p:prevCondLst>
-              <p:nextCondLst>
-                <p:cond delay="0" evt="onNext">
-                  <p:tgtEl>
-                    <p:sldTgt/>
-                  </p:tgtEl>
-                </p:cond>
-              </p:nextCondLst>
-            </p:seq>
-          </p:childTnLst>
-        </p:cTn>
-      </p:par>
-    </p:tnLst>
-  </p:timing>
 </p:sld>
 </file>
 
@@ -5536,15 +5194,15 @@
         <p:txBody>
           <a:bodyPr lIns="0" rIns="0" tIns="0" bIns="0" anchor="ctr"/>
           <a:p>
-            <a:pPr algn="ctr"/>
-            <a:r>
-              <a:rPr lang="en-US" sz="3600">
+            <a:pPr algn="ctr" rtl="1"/>
+            <a:r>
+              <a:rPr lang="en-US" sz="3600" spc="-1">
                 <a:latin typeface="Vazir"/>
               </a:rPr>
               <a:t>۶</a:t>
             </a:r>
             <a:r>
-              <a:rPr lang="en-US" sz="3600">
+              <a:rPr lang="en-US" sz="3600" spc="-1">
                 <a:latin typeface="Vazir"/>
               </a:rPr>
               <a:t>- نمایش: نحوه ی نمایش اطلاعات</a:t>
@@ -5598,13 +5256,16 @@
         <p:txBody>
           <a:bodyPr lIns="90000" rIns="90000" tIns="45000" bIns="45000"/>
           <a:p>
-            <a:pPr algn="r">
+            <a:pPr marL="216000" indent="-216000" algn="r" rtl="1">
+              <a:buClr>
+                <a:srgbClr val="ffffff"/>
+              </a:buClr>
               <a:buSzPct val="45000"/>
-              <a:buFont typeface="StarSymbol"/>
+              <a:buFont typeface="Wingdings" charset="2"/>
               <a:buChar char=""/>
             </a:pPr>
             <a:r>
-              <a:rPr lang="en-US">
+              <a:rPr lang="en-US" sz="1800" spc="-1">
                 <a:latin typeface="Vazir"/>
               </a:rPr>
               <a:t>تعیین فرمت</a:t>
@@ -5612,13 +5273,16 @@
             <a:endParaRPr/>
           </a:p>
           <a:p>
-            <a:pPr algn="r">
+            <a:pPr marL="216000" indent="-216000" algn="r" rtl="1">
+              <a:buClr>
+                <a:srgbClr val="ffffff"/>
+              </a:buClr>
               <a:buSzPct val="45000"/>
-              <a:buFont typeface="StarSymbol"/>
+              <a:buFont typeface="Wingdings" charset="2"/>
               <a:buChar char=""/>
             </a:pPr>
             <a:r>
-              <a:rPr lang="en-US">
+              <a:rPr lang="en-US" sz="1800" spc="-1">
                 <a:latin typeface="Vazir"/>
               </a:rPr>
               <a:t>رمزنگاری و فشرده سازی داده</a:t>
@@ -5629,33 +5293,6 @@
       </p:sp>
     </p:spTree>
   </p:cSld>
-  <p:timing>
-    <p:tnLst>
-      <p:par>
-        <p:cTn id="11" dur="indefinite" restart="never" nodeType="tmRoot">
-          <p:childTnLst>
-            <p:seq>
-              <p:cTn id="12" nodeType="mainSeq"/>
-              <p:prevCondLst>
-                <p:cond delay="0" evt="onPrev">
-                  <p:tgtEl>
-                    <p:sldTgt/>
-                  </p:tgtEl>
-                </p:cond>
-              </p:prevCondLst>
-              <p:nextCondLst>
-                <p:cond delay="0" evt="onNext">
-                  <p:tgtEl>
-                    <p:sldTgt/>
-                  </p:tgtEl>
-                </p:cond>
-              </p:nextCondLst>
-            </p:seq>
-          </p:childTnLst>
-        </p:cTn>
-      </p:par>
-    </p:tnLst>
-  </p:timing>
 </p:sld>
 </file>
 
@@ -5698,15 +5335,15 @@
         <p:txBody>
           <a:bodyPr lIns="0" rIns="0" tIns="0" bIns="0" anchor="ctr"/>
           <a:p>
-            <a:pPr algn="ctr"/>
-            <a:r>
-              <a:rPr lang="en-US" sz="3600">
+            <a:pPr algn="ctr" rtl="1"/>
+            <a:r>
+              <a:rPr lang="en-US" sz="3600" spc="-1">
                 <a:latin typeface="Vazir"/>
               </a:rPr>
               <a:t>۵</a:t>
             </a:r>
             <a:r>
-              <a:rPr lang="en-US" sz="3600">
+              <a:rPr lang="en-US" sz="3600" spc="-1">
                 <a:latin typeface="Vazir"/>
               </a:rPr>
               <a:t>- نشست: جزییاتی درباره ی اتصال</a:t>
@@ -5760,13 +5397,16 @@
         <p:txBody>
           <a:bodyPr lIns="90000" rIns="90000" tIns="45000" bIns="45000"/>
           <a:p>
-            <a:pPr algn="r">
+            <a:pPr marL="216000" indent="-216000" algn="r" rtl="1">
+              <a:buClr>
+                <a:srgbClr val="ffffff"/>
+              </a:buClr>
               <a:buSzPct val="45000"/>
-              <a:buFont typeface="StarSymbol"/>
+              <a:buFont typeface="Wingdings" charset="2"/>
               <a:buChar char=""/>
             </a:pPr>
             <a:r>
-              <a:rPr lang="en-US">
+              <a:rPr lang="en-US" sz="1800" spc="-1">
                 <a:latin typeface="Arial"/>
               </a:rPr>
               <a:t>زمان برقراری ارتباط</a:t>
@@ -5774,13 +5414,16 @@
             <a:endParaRPr/>
           </a:p>
           <a:p>
-            <a:pPr algn="r">
+            <a:pPr marL="216000" indent="-216000" algn="r" rtl="1">
+              <a:buClr>
+                <a:srgbClr val="ffffff"/>
+              </a:buClr>
               <a:buSzPct val="45000"/>
-              <a:buFont typeface="StarSymbol"/>
+              <a:buFont typeface="Wingdings" charset="2"/>
               <a:buChar char=""/>
             </a:pPr>
             <a:r>
-              <a:rPr lang="en-US">
+              <a:rPr lang="en-US" sz="1800" spc="-1">
                 <a:latin typeface="Arial"/>
               </a:rPr>
               <a:t>اداره و نگهداری جلسه</a:t>
@@ -5788,13 +5431,16 @@
             <a:endParaRPr/>
           </a:p>
           <a:p>
-            <a:pPr algn="r">
+            <a:pPr marL="216000" indent="-216000" algn="r" rtl="1">
+              <a:buClr>
+                <a:srgbClr val="ffffff"/>
+              </a:buClr>
               <a:buSzPct val="45000"/>
-              <a:buFont typeface="StarSymbol"/>
+              <a:buFont typeface="Wingdings" charset="2"/>
               <a:buChar char=""/>
             </a:pPr>
             <a:r>
-              <a:rPr lang="en-US">
+              <a:rPr lang="en-US" sz="1800" spc="-1">
                 <a:latin typeface="Arial"/>
               </a:rPr>
               <a:t>توقف جلسه</a:t>
@@ -5805,33 +5451,6 @@
       </p:sp>
     </p:spTree>
   </p:cSld>
-  <p:timing>
-    <p:tnLst>
-      <p:par>
-        <p:cTn id="13" dur="indefinite" restart="never" nodeType="tmRoot">
-          <p:childTnLst>
-            <p:seq>
-              <p:cTn id="14" nodeType="mainSeq"/>
-              <p:prevCondLst>
-                <p:cond delay="0" evt="onPrev">
-                  <p:tgtEl>
-                    <p:sldTgt/>
-                  </p:tgtEl>
-                </p:cond>
-              </p:prevCondLst>
-              <p:nextCondLst>
-                <p:cond delay="0" evt="onNext">
-                  <p:tgtEl>
-                    <p:sldTgt/>
-                  </p:tgtEl>
-                </p:cond>
-              </p:nextCondLst>
-            </p:seq>
-          </p:childTnLst>
-        </p:cTn>
-      </p:par>
-    </p:tnLst>
-  </p:timing>
 </p:sld>
 </file>
 
@@ -5874,15 +5493,15 @@
         <p:txBody>
           <a:bodyPr lIns="0" rIns="0" tIns="0" bIns="0" anchor="ctr"/>
           <a:p>
-            <a:pPr algn="ctr"/>
-            <a:r>
-              <a:rPr lang="en-US" sz="3600">
+            <a:pPr algn="ctr" rtl="1"/>
+            <a:r>
+              <a:rPr lang="en-US" sz="3600" spc="-1">
                 <a:latin typeface="Vazir"/>
               </a:rPr>
               <a:t>۴</a:t>
             </a:r>
             <a:r>
-              <a:rPr lang="en-US" sz="3600">
+              <a:rPr lang="en-US" sz="3600" spc="-1">
                 <a:latin typeface="Vazir"/>
               </a:rPr>
               <a:t>- ارسال: ایجاد اتصال منطقی</a:t>
@@ -5936,13 +5555,16 @@
         <p:txBody>
           <a:bodyPr lIns="90000" rIns="90000" tIns="45000" bIns="45000"/>
           <a:p>
-            <a:pPr algn="r">
+            <a:pPr marL="216000" indent="-216000" algn="r" rtl="1">
+              <a:buClr>
+                <a:srgbClr val="ffffff"/>
+              </a:buClr>
               <a:buSzPct val="45000"/>
-              <a:buFont typeface="StarSymbol"/>
+              <a:buFont typeface="Wingdings" charset="2"/>
               <a:buChar char=""/>
             </a:pPr>
             <a:r>
-              <a:rPr lang="en-US">
+              <a:rPr lang="en-US" sz="1800" spc="-1">
                 <a:latin typeface="Vazir"/>
               </a:rPr>
               <a:t>دایرکردن اتصال نقطه به نقطه</a:t>
@@ -5950,13 +5572,16 @@
             <a:endParaRPr/>
           </a:p>
           <a:p>
-            <a:pPr algn="r">
+            <a:pPr marL="216000" indent="-216000" algn="r" rtl="1">
+              <a:buClr>
+                <a:srgbClr val="ffffff"/>
+              </a:buClr>
               <a:buSzPct val="45000"/>
-              <a:buFont typeface="StarSymbol"/>
+              <a:buFont typeface="Wingdings" charset="2"/>
               <a:buChar char=""/>
             </a:pPr>
             <a:r>
-              <a:rPr lang="en-US">
+              <a:rPr lang="en-US" sz="1800" spc="-1">
                 <a:latin typeface="Vazir"/>
               </a:rPr>
               <a:t>انتقال اطلاعات</a:t>
@@ -5964,13 +5589,16 @@
             <a:endParaRPr/>
           </a:p>
           <a:p>
-            <a:pPr algn="r">
+            <a:pPr marL="216000" indent="-216000" algn="r" rtl="1">
+              <a:buClr>
+                <a:srgbClr val="ffffff"/>
+              </a:buClr>
               <a:buSzPct val="45000"/>
-              <a:buFont typeface="StarSymbol"/>
+              <a:buFont typeface="Wingdings" charset="2"/>
               <a:buChar char=""/>
             </a:pPr>
             <a:r>
-              <a:rPr lang="en-US">
+              <a:rPr lang="en-US" sz="1800" spc="-1">
                 <a:latin typeface="Vazir"/>
               </a:rPr>
               <a:t>بازیابی خطا</a:t>
@@ -5981,33 +5609,6 @@
       </p:sp>
     </p:spTree>
   </p:cSld>
-  <p:timing>
-    <p:tnLst>
-      <p:par>
-        <p:cTn id="15" dur="indefinite" restart="never" nodeType="tmRoot">
-          <p:childTnLst>
-            <p:seq>
-              <p:cTn id="16" nodeType="mainSeq"/>
-              <p:prevCondLst>
-                <p:cond delay="0" evt="onPrev">
-                  <p:tgtEl>
-                    <p:sldTgt/>
-                  </p:tgtEl>
-                </p:cond>
-              </p:prevCondLst>
-              <p:nextCondLst>
-                <p:cond delay="0" evt="onNext">
-                  <p:tgtEl>
-                    <p:sldTgt/>
-                  </p:tgtEl>
-                </p:cond>
-              </p:nextCondLst>
-            </p:seq>
-          </p:childTnLst>
-        </p:cTn>
-      </p:par>
-    </p:tnLst>
-  </p:timing>
 </p:sld>
 </file>
 
@@ -6050,15 +5651,15 @@
         <p:txBody>
           <a:bodyPr lIns="0" rIns="0" tIns="0" bIns="0" anchor="ctr"/>
           <a:p>
-            <a:pPr algn="ctr"/>
-            <a:r>
-              <a:rPr lang="en-US" sz="3600">
+            <a:pPr algn="ctr" rtl="1"/>
+            <a:r>
+              <a:rPr lang="en-US" sz="3600" spc="-1">
                 <a:latin typeface="Vazir"/>
               </a:rPr>
               <a:t>۳</a:t>
             </a:r>
             <a:r>
-              <a:rPr lang="en-US" sz="3600">
+              <a:rPr lang="en-US" sz="3600" spc="-1">
                 <a:latin typeface="Vazir"/>
               </a:rPr>
               <a:t>- شبکه: مسیریابی</a:t>
@@ -6112,13 +5713,16 @@
         <p:txBody>
           <a:bodyPr lIns="90000" rIns="90000" tIns="45000" bIns="45000"/>
           <a:p>
-            <a:pPr algn="r">
+            <a:pPr marL="216000" indent="-216000" algn="r" rtl="1">
+              <a:buClr>
+                <a:srgbClr val="ffffff"/>
+              </a:buClr>
               <a:buSzPct val="45000"/>
-              <a:buFont typeface="StarSymbol"/>
+              <a:buFont typeface="Wingdings" charset="2"/>
               <a:buChar char=""/>
             </a:pPr>
             <a:r>
-              <a:rPr lang="en-US">
+              <a:rPr lang="en-US" sz="1800" spc="-1">
                 <a:latin typeface="Vazir"/>
               </a:rPr>
               <a:t>هدایت بسته</a:t>
@@ -6126,13 +5730,16 @@
             <a:endParaRPr/>
           </a:p>
           <a:p>
-            <a:pPr algn="r">
+            <a:pPr marL="216000" indent="-216000" algn="r" rtl="1">
+              <a:buClr>
+                <a:srgbClr val="ffffff"/>
+              </a:buClr>
               <a:buSzPct val="45000"/>
-              <a:buFont typeface="StarSymbol"/>
+              <a:buFont typeface="Wingdings" charset="2"/>
               <a:buChar char=""/>
             </a:pPr>
             <a:r>
-              <a:rPr lang="en-US">
+              <a:rPr lang="en-US" sz="1800" spc="-1">
                 <a:latin typeface="Vazir"/>
               </a:rPr>
               <a:t>همگرایی روتر ها</a:t>
@@ -6143,33 +5750,6 @@
       </p:sp>
     </p:spTree>
   </p:cSld>
-  <p:timing>
-    <p:tnLst>
-      <p:par>
-        <p:cTn id="17" dur="indefinite" restart="never" nodeType="tmRoot">
-          <p:childTnLst>
-            <p:seq>
-              <p:cTn id="18" nodeType="mainSeq"/>
-              <p:prevCondLst>
-                <p:cond delay="0" evt="onPrev">
-                  <p:tgtEl>
-                    <p:sldTgt/>
-                  </p:tgtEl>
-                </p:cond>
-              </p:prevCondLst>
-              <p:nextCondLst>
-                <p:cond delay="0" evt="onNext">
-                  <p:tgtEl>
-                    <p:sldTgt/>
-                  </p:tgtEl>
-                </p:cond>
-              </p:nextCondLst>
-            </p:seq>
-          </p:childTnLst>
-        </p:cTn>
-      </p:par>
-    </p:tnLst>
-  </p:timing>
 </p:sld>
 </file>
 

</xml_diff>